<commit_message>
exanded on instructions with example pictures and all
</commit_message>
<xml_diff>
--- a/experiments/06_sentence_select_with_training/images/items.pptx
+++ b/experiments/06_sentence_select_with_training/images/items.pptx
@@ -5,7 +5,7 @@
     <p:sldMasterId id="2147483648" r:id="rId1"/>
   </p:sldMasterIdLst>
   <p:notesMasterIdLst>
-    <p:notesMasterId r:id="rId53"/>
+    <p:notesMasterId r:id="rId54"/>
   </p:notesMasterIdLst>
   <p:sldIdLst>
     <p:sldId id="319" r:id="rId2"/>
@@ -59,6 +59,7 @@
     <p:sldId id="286" r:id="rId50"/>
     <p:sldId id="292" r:id="rId51"/>
     <p:sldId id="259" r:id="rId52"/>
+    <p:sldId id="350" r:id="rId53"/>
   </p:sldIdLst>
   <p:sldSz cx="12192000" cy="6858000"/>
   <p:notesSz cx="6858000" cy="9144000"/>
@@ -250,7 +251,7 @@
           <a:p>
             <a:fld id="{22C25681-FCCF-1440-AC0A-42CC69BDB54B}" type="datetimeFigureOut">
               <a:rPr lang="de-DE" smtClean="0"/>
-              <a:t>05.04.19</a:t>
+              <a:t>14.04.19</a:t>
             </a:fld>
             <a:endParaRPr lang="de-DE"/>
           </a:p>
@@ -1993,7 +1994,7 @@
           <a:p>
             <a:fld id="{F68B239B-6DAA-4828-B244-F9B5344C9138}" type="datetimeFigureOut">
               <a:rPr lang="en-GB" smtClean="0"/>
-              <a:t>05/04/2019</a:t>
+              <a:t>14/04/2019</a:t>
             </a:fld>
             <a:endParaRPr lang="en-GB"/>
           </a:p>
@@ -2163,7 +2164,7 @@
           <a:p>
             <a:fld id="{F68B239B-6DAA-4828-B244-F9B5344C9138}" type="datetimeFigureOut">
               <a:rPr lang="en-GB" smtClean="0"/>
-              <a:t>05/04/2019</a:t>
+              <a:t>14/04/2019</a:t>
             </a:fld>
             <a:endParaRPr lang="en-GB"/>
           </a:p>
@@ -2343,7 +2344,7 @@
           <a:p>
             <a:fld id="{F68B239B-6DAA-4828-B244-F9B5344C9138}" type="datetimeFigureOut">
               <a:rPr lang="en-GB" smtClean="0"/>
-              <a:t>05/04/2019</a:t>
+              <a:t>14/04/2019</a:t>
             </a:fld>
             <a:endParaRPr lang="en-GB"/>
           </a:p>
@@ -2513,7 +2514,7 @@
           <a:p>
             <a:fld id="{F68B239B-6DAA-4828-B244-F9B5344C9138}" type="datetimeFigureOut">
               <a:rPr lang="en-GB" smtClean="0"/>
-              <a:t>05/04/2019</a:t>
+              <a:t>14/04/2019</a:t>
             </a:fld>
             <a:endParaRPr lang="en-GB"/>
           </a:p>
@@ -2759,7 +2760,7 @@
           <a:p>
             <a:fld id="{F68B239B-6DAA-4828-B244-F9B5344C9138}" type="datetimeFigureOut">
               <a:rPr lang="en-GB" smtClean="0"/>
-              <a:t>05/04/2019</a:t>
+              <a:t>14/04/2019</a:t>
             </a:fld>
             <a:endParaRPr lang="en-GB"/>
           </a:p>
@@ -2991,7 +2992,7 @@
           <a:p>
             <a:fld id="{F68B239B-6DAA-4828-B244-F9B5344C9138}" type="datetimeFigureOut">
               <a:rPr lang="en-GB" smtClean="0"/>
-              <a:t>05/04/2019</a:t>
+              <a:t>14/04/2019</a:t>
             </a:fld>
             <a:endParaRPr lang="en-GB"/>
           </a:p>
@@ -3358,7 +3359,7 @@
           <a:p>
             <a:fld id="{F68B239B-6DAA-4828-B244-F9B5344C9138}" type="datetimeFigureOut">
               <a:rPr lang="en-GB" smtClean="0"/>
-              <a:t>05/04/2019</a:t>
+              <a:t>14/04/2019</a:t>
             </a:fld>
             <a:endParaRPr lang="en-GB"/>
           </a:p>
@@ -3476,7 +3477,7 @@
           <a:p>
             <a:fld id="{F68B239B-6DAA-4828-B244-F9B5344C9138}" type="datetimeFigureOut">
               <a:rPr lang="en-GB" smtClean="0"/>
-              <a:t>05/04/2019</a:t>
+              <a:t>14/04/2019</a:t>
             </a:fld>
             <a:endParaRPr lang="en-GB"/>
           </a:p>
@@ -3571,7 +3572,7 @@
           <a:p>
             <a:fld id="{F68B239B-6DAA-4828-B244-F9B5344C9138}" type="datetimeFigureOut">
               <a:rPr lang="en-GB" smtClean="0"/>
-              <a:t>05/04/2019</a:t>
+              <a:t>14/04/2019</a:t>
             </a:fld>
             <a:endParaRPr lang="en-GB"/>
           </a:p>
@@ -3848,7 +3849,7 @@
           <a:p>
             <a:fld id="{F68B239B-6DAA-4828-B244-F9B5344C9138}" type="datetimeFigureOut">
               <a:rPr lang="en-GB" smtClean="0"/>
-              <a:t>05/04/2019</a:t>
+              <a:t>14/04/2019</a:t>
             </a:fld>
             <a:endParaRPr lang="en-GB"/>
           </a:p>
@@ -4101,7 +4102,7 @@
           <a:p>
             <a:fld id="{F68B239B-6DAA-4828-B244-F9B5344C9138}" type="datetimeFigureOut">
               <a:rPr lang="en-GB" smtClean="0"/>
-              <a:t>05/04/2019</a:t>
+              <a:t>14/04/2019</a:t>
             </a:fld>
             <a:endParaRPr lang="en-GB"/>
           </a:p>
@@ -4314,7 +4315,7 @@
           <a:p>
             <a:fld id="{F68B239B-6DAA-4828-B244-F9B5344C9138}" type="datetimeFigureOut">
               <a:rPr lang="en-GB" smtClean="0"/>
-              <a:t>05/04/2019</a:t>
+              <a:t>14/04/2019</a:t>
             </a:fld>
             <a:endParaRPr lang="en-GB"/>
           </a:p>
@@ -42117,6 +42118,884 @@
 </p:sld>
 </file>
 
+<file path=ppt/slides/slide52.xml><?xml version="1.0" encoding="utf-8"?>
+<p:sld xmlns:a="http://schemas.openxmlformats.org/drawingml/2006/main" xmlns:r="http://schemas.openxmlformats.org/officeDocument/2006/relationships" xmlns:p="http://schemas.openxmlformats.org/presentationml/2006/main">
+  <p:cSld>
+    <p:spTree>
+      <p:nvGrpSpPr>
+        <p:cNvPr id="1" name=""/>
+        <p:cNvGrpSpPr/>
+        <p:nvPr/>
+      </p:nvGrpSpPr>
+      <p:grpSpPr>
+        <a:xfrm>
+          <a:off x="0" y="0"/>
+          <a:ext cx="0" cy="0"/>
+          <a:chOff x="0" y="0"/>
+          <a:chExt cx="0" cy="0"/>
+        </a:xfrm>
+      </p:grpSpPr>
+      <p:sp>
+        <p:nvSpPr>
+          <p:cNvPr id="4" name="Rectangle 3"/>
+          <p:cNvSpPr>
+            <a:spLocks/>
+          </p:cNvSpPr>
+          <p:nvPr/>
+        </p:nvSpPr>
+        <p:spPr>
+          <a:xfrm>
+            <a:off x="6654749" y="401770"/>
+            <a:ext cx="3600000" cy="3600000"/>
+          </a:xfrm>
+          <a:prstGeom prst="rect">
+            <a:avLst/>
+          </a:prstGeom>
+          <a:noFill/>
+          <a:ln w="190500">
+            <a:solidFill>
+              <a:schemeClr val="bg2">
+                <a:lumMod val="25000"/>
+              </a:schemeClr>
+            </a:solidFill>
+          </a:ln>
+        </p:spPr>
+        <p:style>
+          <a:lnRef idx="2">
+            <a:schemeClr val="accent1">
+              <a:shade val="50000"/>
+            </a:schemeClr>
+          </a:lnRef>
+          <a:fillRef idx="1">
+            <a:schemeClr val="accent1"/>
+          </a:fillRef>
+          <a:effectRef idx="0">
+            <a:schemeClr val="accent1"/>
+          </a:effectRef>
+          <a:fontRef idx="minor">
+            <a:schemeClr val="lt1"/>
+          </a:fontRef>
+        </p:style>
+        <p:txBody>
+          <a:bodyPr rtlCol="0" anchor="ctr"/>
+          <a:lstStyle/>
+          <a:p>
+            <a:pPr algn="ctr"/>
+            <a:endParaRPr lang="en-GB" dirty="0"/>
+          </a:p>
+        </p:txBody>
+      </p:sp>
+      <p:sp>
+        <p:nvSpPr>
+          <p:cNvPr id="5" name="Rectangle 4"/>
+          <p:cNvSpPr>
+            <a:spLocks/>
+          </p:cNvSpPr>
+          <p:nvPr/>
+        </p:nvSpPr>
+        <p:spPr>
+          <a:xfrm>
+            <a:off x="2352591" y="401770"/>
+            <a:ext cx="3600000" cy="3600000"/>
+          </a:xfrm>
+          <a:prstGeom prst="rect">
+            <a:avLst/>
+          </a:prstGeom>
+          <a:noFill/>
+          <a:ln w="190500">
+            <a:solidFill>
+              <a:schemeClr val="bg2">
+                <a:lumMod val="25000"/>
+              </a:schemeClr>
+            </a:solidFill>
+          </a:ln>
+        </p:spPr>
+        <p:style>
+          <a:lnRef idx="2">
+            <a:schemeClr val="accent1">
+              <a:shade val="50000"/>
+            </a:schemeClr>
+          </a:lnRef>
+          <a:fillRef idx="1">
+            <a:schemeClr val="accent1"/>
+          </a:fillRef>
+          <a:effectRef idx="0">
+            <a:schemeClr val="accent1"/>
+          </a:effectRef>
+          <a:fontRef idx="minor">
+            <a:schemeClr val="lt1"/>
+          </a:fontRef>
+        </p:style>
+        <p:txBody>
+          <a:bodyPr rtlCol="0" anchor="ctr"/>
+          <a:lstStyle/>
+          <a:p>
+            <a:pPr algn="ctr"/>
+            <a:endParaRPr lang="en-GB" dirty="0">
+              <a:solidFill>
+                <a:schemeClr val="bg2">
+                  <a:lumMod val="75000"/>
+                </a:schemeClr>
+              </a:solidFill>
+              <a:latin typeface="Arial" panose="020B0604020202020204" pitchFamily="34" charset="0"/>
+              <a:cs typeface="Arial" panose="020B0604020202020204" pitchFamily="34" charset="0"/>
+            </a:endParaRPr>
+          </a:p>
+        </p:txBody>
+      </p:sp>
+      <p:pic>
+        <p:nvPicPr>
+          <p:cNvPr id="2" name="Picture 1"/>
+          <p:cNvPicPr>
+            <a:picLocks noChangeAspect="1"/>
+          </p:cNvPicPr>
+          <p:nvPr/>
+        </p:nvPicPr>
+        <p:blipFill>
+          <a:blip r:embed="rId2" cstate="print">
+            <a:duotone>
+              <a:prstClr val="black"/>
+              <a:srgbClr val="FFFF00">
+                <a:tint val="45000"/>
+                <a:satMod val="400000"/>
+              </a:srgbClr>
+            </a:duotone>
+            <a:extLst>
+              <a:ext uri="{28A0092B-C50C-407E-A947-70E740481C1C}">
+                <a14:useLocalDpi xmlns:a14="http://schemas.microsoft.com/office/drawing/2010/main" val="0"/>
+              </a:ext>
+            </a:extLst>
+          </a:blip>
+          <a:stretch>
+            <a:fillRect/>
+          </a:stretch>
+        </p:blipFill>
+        <p:spPr>
+          <a:xfrm>
+            <a:off x="8104528" y="1695507"/>
+            <a:ext cx="754431" cy="1012526"/>
+          </a:xfrm>
+          <a:prstGeom prst="rect">
+            <a:avLst/>
+          </a:prstGeom>
+        </p:spPr>
+      </p:pic>
+      <p:pic>
+        <p:nvPicPr>
+          <p:cNvPr id="7" name="Picture 6"/>
+          <p:cNvPicPr>
+            <a:picLocks noChangeAspect="1"/>
+          </p:cNvPicPr>
+          <p:nvPr/>
+        </p:nvPicPr>
+        <p:blipFill>
+          <a:blip r:embed="rId2" cstate="print">
+            <a:duotone>
+              <a:prstClr val="black"/>
+              <a:srgbClr val="FFFF00">
+                <a:tint val="45000"/>
+                <a:satMod val="400000"/>
+              </a:srgbClr>
+            </a:duotone>
+            <a:extLst>
+              <a:ext uri="{28A0092B-C50C-407E-A947-70E740481C1C}">
+                <a14:useLocalDpi xmlns:a14="http://schemas.microsoft.com/office/drawing/2010/main" val="0"/>
+              </a:ext>
+            </a:extLst>
+          </a:blip>
+          <a:stretch>
+            <a:fillRect/>
+          </a:stretch>
+        </p:blipFill>
+        <p:spPr>
+          <a:xfrm>
+            <a:off x="8104528" y="619826"/>
+            <a:ext cx="754431" cy="1012526"/>
+          </a:xfrm>
+          <a:prstGeom prst="rect">
+            <a:avLst/>
+          </a:prstGeom>
+        </p:spPr>
+      </p:pic>
+      <p:pic>
+        <p:nvPicPr>
+          <p:cNvPr id="12" name="Picture 11"/>
+          <p:cNvPicPr>
+            <a:picLocks noChangeAspect="1"/>
+          </p:cNvPicPr>
+          <p:nvPr/>
+        </p:nvPicPr>
+        <p:blipFill>
+          <a:blip r:embed="rId2" cstate="print">
+            <a:duotone>
+              <a:prstClr val="black"/>
+              <a:srgbClr val="FFFF00">
+                <a:tint val="45000"/>
+                <a:satMod val="400000"/>
+              </a:srgbClr>
+            </a:duotone>
+            <a:extLst>
+              <a:ext uri="{28A0092B-C50C-407E-A947-70E740481C1C}">
+                <a14:useLocalDpi xmlns:a14="http://schemas.microsoft.com/office/drawing/2010/main" val="0"/>
+              </a:ext>
+            </a:extLst>
+          </a:blip>
+          <a:stretch>
+            <a:fillRect/>
+          </a:stretch>
+        </p:blipFill>
+        <p:spPr>
+          <a:xfrm>
+            <a:off x="9066689" y="619826"/>
+            <a:ext cx="754431" cy="1012526"/>
+          </a:xfrm>
+          <a:prstGeom prst="rect">
+            <a:avLst/>
+          </a:prstGeom>
+        </p:spPr>
+      </p:pic>
+      <p:pic>
+        <p:nvPicPr>
+          <p:cNvPr id="13" name="Picture 12"/>
+          <p:cNvPicPr>
+            <a:picLocks noChangeAspect="1"/>
+          </p:cNvPicPr>
+          <p:nvPr/>
+        </p:nvPicPr>
+        <p:blipFill>
+          <a:blip r:embed="rId2" cstate="print">
+            <a:duotone>
+              <a:prstClr val="black"/>
+              <a:srgbClr val="FFFF00">
+                <a:tint val="45000"/>
+                <a:satMod val="400000"/>
+              </a:srgbClr>
+            </a:duotone>
+            <a:extLst>
+              <a:ext uri="{28A0092B-C50C-407E-A947-70E740481C1C}">
+                <a14:useLocalDpi xmlns:a14="http://schemas.microsoft.com/office/drawing/2010/main" val="0"/>
+              </a:ext>
+            </a:extLst>
+          </a:blip>
+          <a:stretch>
+            <a:fillRect/>
+          </a:stretch>
+        </p:blipFill>
+        <p:spPr>
+          <a:xfrm>
+            <a:off x="9117599" y="2771188"/>
+            <a:ext cx="754431" cy="1012526"/>
+          </a:xfrm>
+          <a:prstGeom prst="rect">
+            <a:avLst/>
+          </a:prstGeom>
+        </p:spPr>
+      </p:pic>
+      <p:pic>
+        <p:nvPicPr>
+          <p:cNvPr id="14" name="Picture 13"/>
+          <p:cNvPicPr>
+            <a:picLocks noChangeAspect="1"/>
+          </p:cNvPicPr>
+          <p:nvPr/>
+        </p:nvPicPr>
+        <p:blipFill>
+          <a:blip r:embed="rId2" cstate="print">
+            <a:duotone>
+              <a:prstClr val="black"/>
+              <a:srgbClr val="FFFF00">
+                <a:tint val="45000"/>
+                <a:satMod val="400000"/>
+              </a:srgbClr>
+            </a:duotone>
+            <a:extLst>
+              <a:ext uri="{28A0092B-C50C-407E-A947-70E740481C1C}">
+                <a14:useLocalDpi xmlns:a14="http://schemas.microsoft.com/office/drawing/2010/main" val="0"/>
+              </a:ext>
+            </a:extLst>
+          </a:blip>
+          <a:stretch>
+            <a:fillRect/>
+          </a:stretch>
+        </p:blipFill>
+        <p:spPr>
+          <a:xfrm>
+            <a:off x="7091457" y="1695507"/>
+            <a:ext cx="754431" cy="1012526"/>
+          </a:xfrm>
+          <a:prstGeom prst="rect">
+            <a:avLst/>
+          </a:prstGeom>
+        </p:spPr>
+      </p:pic>
+      <p:pic>
+        <p:nvPicPr>
+          <p:cNvPr id="15" name="Picture 14"/>
+          <p:cNvPicPr>
+            <a:picLocks noChangeAspect="1"/>
+          </p:cNvPicPr>
+          <p:nvPr/>
+        </p:nvPicPr>
+        <p:blipFill>
+          <a:blip r:embed="rId2" cstate="print">
+            <a:duotone>
+              <a:prstClr val="black"/>
+              <a:srgbClr val="FFFF00">
+                <a:tint val="45000"/>
+                <a:satMod val="400000"/>
+              </a:srgbClr>
+            </a:duotone>
+            <a:extLst>
+              <a:ext uri="{28A0092B-C50C-407E-A947-70E740481C1C}">
+                <a14:useLocalDpi xmlns:a14="http://schemas.microsoft.com/office/drawing/2010/main" val="0"/>
+              </a:ext>
+            </a:extLst>
+          </a:blip>
+          <a:stretch>
+            <a:fillRect/>
+          </a:stretch>
+        </p:blipFill>
+        <p:spPr>
+          <a:xfrm>
+            <a:off x="7091457" y="619826"/>
+            <a:ext cx="754431" cy="1012526"/>
+          </a:xfrm>
+          <a:prstGeom prst="rect">
+            <a:avLst/>
+          </a:prstGeom>
+        </p:spPr>
+      </p:pic>
+      <p:pic>
+        <p:nvPicPr>
+          <p:cNvPr id="25" name="Picture 24"/>
+          <p:cNvPicPr>
+            <a:picLocks noChangeAspect="1"/>
+          </p:cNvPicPr>
+          <p:nvPr/>
+        </p:nvPicPr>
+        <p:blipFill>
+          <a:blip r:embed="rId2" cstate="print">
+            <a:duotone>
+              <a:prstClr val="black"/>
+              <a:srgbClr val="FF99CC">
+                <a:tint val="45000"/>
+                <a:satMod val="400000"/>
+              </a:srgbClr>
+            </a:duotone>
+            <a:extLst>
+              <a:ext uri="{28A0092B-C50C-407E-A947-70E740481C1C}">
+                <a14:useLocalDpi xmlns:a14="http://schemas.microsoft.com/office/drawing/2010/main" val="0"/>
+              </a:ext>
+            </a:extLst>
+          </a:blip>
+          <a:stretch>
+            <a:fillRect/>
+          </a:stretch>
+        </p:blipFill>
+        <p:spPr>
+          <a:xfrm>
+            <a:off x="3770248" y="1695507"/>
+            <a:ext cx="754431" cy="1012526"/>
+          </a:xfrm>
+          <a:prstGeom prst="rect">
+            <a:avLst/>
+          </a:prstGeom>
+        </p:spPr>
+      </p:pic>
+      <p:pic>
+        <p:nvPicPr>
+          <p:cNvPr id="26" name="Picture 25"/>
+          <p:cNvPicPr>
+            <a:picLocks noChangeAspect="1"/>
+          </p:cNvPicPr>
+          <p:nvPr/>
+        </p:nvPicPr>
+        <p:blipFill>
+          <a:blip r:embed="rId2" cstate="print">
+            <a:duotone>
+              <a:prstClr val="black"/>
+              <a:srgbClr val="FF99CC">
+                <a:tint val="45000"/>
+                <a:satMod val="400000"/>
+              </a:srgbClr>
+            </a:duotone>
+            <a:extLst>
+              <a:ext uri="{28A0092B-C50C-407E-A947-70E740481C1C}">
+                <a14:useLocalDpi xmlns:a14="http://schemas.microsoft.com/office/drawing/2010/main" val="0"/>
+              </a:ext>
+            </a:extLst>
+          </a:blip>
+          <a:stretch>
+            <a:fillRect/>
+          </a:stretch>
+        </p:blipFill>
+        <p:spPr>
+          <a:xfrm>
+            <a:off x="4732409" y="1695507"/>
+            <a:ext cx="754431" cy="1012526"/>
+          </a:xfrm>
+          <a:prstGeom prst="rect">
+            <a:avLst/>
+          </a:prstGeom>
+        </p:spPr>
+      </p:pic>
+      <p:pic>
+        <p:nvPicPr>
+          <p:cNvPr id="27" name="Picture 26"/>
+          <p:cNvPicPr>
+            <a:picLocks noChangeAspect="1"/>
+          </p:cNvPicPr>
+          <p:nvPr/>
+        </p:nvPicPr>
+        <p:blipFill>
+          <a:blip r:embed="rId2" cstate="print">
+            <a:duotone>
+              <a:prstClr val="black"/>
+              <a:srgbClr val="FF99CC">
+                <a:tint val="45000"/>
+                <a:satMod val="400000"/>
+              </a:srgbClr>
+            </a:duotone>
+            <a:extLst>
+              <a:ext uri="{28A0092B-C50C-407E-A947-70E740481C1C}">
+                <a14:useLocalDpi xmlns:a14="http://schemas.microsoft.com/office/drawing/2010/main" val="0"/>
+              </a:ext>
+            </a:extLst>
+          </a:blip>
+          <a:stretch>
+            <a:fillRect/>
+          </a:stretch>
+        </p:blipFill>
+        <p:spPr>
+          <a:xfrm>
+            <a:off x="4732409" y="619826"/>
+            <a:ext cx="754431" cy="1012526"/>
+          </a:xfrm>
+          <a:prstGeom prst="rect">
+            <a:avLst/>
+          </a:prstGeom>
+        </p:spPr>
+      </p:pic>
+      <p:pic>
+        <p:nvPicPr>
+          <p:cNvPr id="28" name="Picture 27"/>
+          <p:cNvPicPr>
+            <a:picLocks noChangeAspect="1"/>
+          </p:cNvPicPr>
+          <p:nvPr/>
+        </p:nvPicPr>
+        <p:blipFill>
+          <a:blip r:embed="rId2" cstate="print">
+            <a:duotone>
+              <a:prstClr val="black"/>
+              <a:srgbClr val="FF99CC">
+                <a:tint val="45000"/>
+                <a:satMod val="400000"/>
+              </a:srgbClr>
+            </a:duotone>
+            <a:extLst>
+              <a:ext uri="{28A0092B-C50C-407E-A947-70E740481C1C}">
+                <a14:useLocalDpi xmlns:a14="http://schemas.microsoft.com/office/drawing/2010/main" val="0"/>
+              </a:ext>
+            </a:extLst>
+          </a:blip>
+          <a:stretch>
+            <a:fillRect/>
+          </a:stretch>
+        </p:blipFill>
+        <p:spPr>
+          <a:xfrm>
+            <a:off x="2757177" y="619826"/>
+            <a:ext cx="754431" cy="1012526"/>
+          </a:xfrm>
+          <a:prstGeom prst="rect">
+            <a:avLst/>
+          </a:prstGeom>
+        </p:spPr>
+      </p:pic>
+      <p:pic>
+        <p:nvPicPr>
+          <p:cNvPr id="29" name="Picture 28"/>
+          <p:cNvPicPr>
+            <a:picLocks noChangeAspect="1"/>
+          </p:cNvPicPr>
+          <p:nvPr/>
+        </p:nvPicPr>
+        <p:blipFill>
+          <a:blip r:embed="rId2" cstate="print">
+            <a:duotone>
+              <a:prstClr val="black"/>
+              <a:srgbClr val="FF99CC">
+                <a:tint val="45000"/>
+                <a:satMod val="400000"/>
+              </a:srgbClr>
+            </a:duotone>
+            <a:extLst>
+              <a:ext uri="{28A0092B-C50C-407E-A947-70E740481C1C}">
+                <a14:useLocalDpi xmlns:a14="http://schemas.microsoft.com/office/drawing/2010/main" val="0"/>
+              </a:ext>
+            </a:extLst>
+          </a:blip>
+          <a:stretch>
+            <a:fillRect/>
+          </a:stretch>
+        </p:blipFill>
+        <p:spPr>
+          <a:xfrm>
+            <a:off x="2757177" y="2771188"/>
+            <a:ext cx="754431" cy="1012526"/>
+          </a:xfrm>
+          <a:prstGeom prst="rect">
+            <a:avLst/>
+          </a:prstGeom>
+        </p:spPr>
+      </p:pic>
+      <p:pic>
+        <p:nvPicPr>
+          <p:cNvPr id="33" name="Picture 32"/>
+          <p:cNvPicPr>
+            <a:picLocks noChangeAspect="1"/>
+          </p:cNvPicPr>
+          <p:nvPr/>
+        </p:nvPicPr>
+        <p:blipFill>
+          <a:blip r:embed="rId3">
+            <a:duotone>
+              <a:prstClr val="black"/>
+              <a:srgbClr val="FF99CC">
+                <a:tint val="45000"/>
+                <a:satMod val="400000"/>
+              </a:srgbClr>
+            </a:duotone>
+            <a:extLst>
+              <a:ext uri="{28A0092B-C50C-407E-A947-70E740481C1C}">
+                <a14:useLocalDpi xmlns:a14="http://schemas.microsoft.com/office/drawing/2010/main" val="0"/>
+              </a:ext>
+            </a:extLst>
+          </a:blip>
+          <a:stretch>
+            <a:fillRect/>
+          </a:stretch>
+        </p:blipFill>
+        <p:spPr>
+          <a:xfrm>
+            <a:off x="3665211" y="709561"/>
+            <a:ext cx="802932" cy="833055"/>
+          </a:xfrm>
+          <a:prstGeom prst="rect">
+            <a:avLst/>
+          </a:prstGeom>
+        </p:spPr>
+      </p:pic>
+      <p:pic>
+        <p:nvPicPr>
+          <p:cNvPr id="34" name="Picture 33"/>
+          <p:cNvPicPr>
+            <a:picLocks noChangeAspect="1"/>
+          </p:cNvPicPr>
+          <p:nvPr/>
+        </p:nvPicPr>
+        <p:blipFill>
+          <a:blip r:embed="rId3">
+            <a:duotone>
+              <a:prstClr val="black"/>
+              <a:srgbClr val="FF99CC">
+                <a:tint val="45000"/>
+                <a:satMod val="400000"/>
+              </a:srgbClr>
+            </a:duotone>
+            <a:extLst>
+              <a:ext uri="{28A0092B-C50C-407E-A947-70E740481C1C}">
+                <a14:useLocalDpi xmlns:a14="http://schemas.microsoft.com/office/drawing/2010/main" val="0"/>
+              </a:ext>
+            </a:extLst>
+          </a:blip>
+          <a:stretch>
+            <a:fillRect/>
+          </a:stretch>
+        </p:blipFill>
+        <p:spPr>
+          <a:xfrm>
+            <a:off x="2757177" y="1737417"/>
+            <a:ext cx="802932" cy="833055"/>
+          </a:xfrm>
+          <a:prstGeom prst="rect">
+            <a:avLst/>
+          </a:prstGeom>
+        </p:spPr>
+      </p:pic>
+      <p:pic>
+        <p:nvPicPr>
+          <p:cNvPr id="35" name="Picture 34"/>
+          <p:cNvPicPr>
+            <a:picLocks noChangeAspect="1"/>
+          </p:cNvPicPr>
+          <p:nvPr/>
+        </p:nvPicPr>
+        <p:blipFill>
+          <a:blip r:embed="rId3">
+            <a:duotone>
+              <a:prstClr val="black"/>
+              <a:srgbClr val="FF99CC">
+                <a:tint val="45000"/>
+                <a:satMod val="400000"/>
+              </a:srgbClr>
+            </a:duotone>
+            <a:extLst>
+              <a:ext uri="{28A0092B-C50C-407E-A947-70E740481C1C}">
+                <a14:useLocalDpi xmlns:a14="http://schemas.microsoft.com/office/drawing/2010/main" val="0"/>
+              </a:ext>
+            </a:extLst>
+          </a:blip>
+          <a:stretch>
+            <a:fillRect/>
+          </a:stretch>
+        </p:blipFill>
+        <p:spPr>
+          <a:xfrm>
+            <a:off x="3745997" y="2925307"/>
+            <a:ext cx="802932" cy="833055"/>
+          </a:xfrm>
+          <a:prstGeom prst="rect">
+            <a:avLst/>
+          </a:prstGeom>
+        </p:spPr>
+      </p:pic>
+      <p:pic>
+        <p:nvPicPr>
+          <p:cNvPr id="36" name="Picture 35"/>
+          <p:cNvPicPr>
+            <a:picLocks noChangeAspect="1"/>
+          </p:cNvPicPr>
+          <p:nvPr/>
+        </p:nvPicPr>
+        <p:blipFill>
+          <a:blip r:embed="rId3">
+            <a:duotone>
+              <a:prstClr val="black"/>
+              <a:srgbClr val="FF99CC">
+                <a:tint val="45000"/>
+                <a:satMod val="400000"/>
+              </a:srgbClr>
+            </a:duotone>
+            <a:extLst>
+              <a:ext uri="{28A0092B-C50C-407E-A947-70E740481C1C}">
+                <a14:useLocalDpi xmlns:a14="http://schemas.microsoft.com/office/drawing/2010/main" val="0"/>
+              </a:ext>
+            </a:extLst>
+          </a:blip>
+          <a:stretch>
+            <a:fillRect/>
+          </a:stretch>
+        </p:blipFill>
+        <p:spPr>
+          <a:xfrm>
+            <a:off x="4849294" y="2950659"/>
+            <a:ext cx="802932" cy="833055"/>
+          </a:xfrm>
+          <a:prstGeom prst="rect">
+            <a:avLst/>
+          </a:prstGeom>
+        </p:spPr>
+      </p:pic>
+      <p:pic>
+        <p:nvPicPr>
+          <p:cNvPr id="37" name="Picture 36"/>
+          <p:cNvPicPr>
+            <a:picLocks noChangeAspect="1"/>
+          </p:cNvPicPr>
+          <p:nvPr/>
+        </p:nvPicPr>
+        <p:blipFill>
+          <a:blip r:embed="rId3">
+            <a:duotone>
+              <a:prstClr val="black"/>
+              <a:srgbClr val="FFFF00">
+                <a:tint val="45000"/>
+                <a:satMod val="400000"/>
+              </a:srgbClr>
+            </a:duotone>
+            <a:extLst>
+              <a:ext uri="{28A0092B-C50C-407E-A947-70E740481C1C}">
+                <a14:useLocalDpi xmlns:a14="http://schemas.microsoft.com/office/drawing/2010/main" val="0"/>
+              </a:ext>
+            </a:extLst>
+          </a:blip>
+          <a:stretch>
+            <a:fillRect/>
+          </a:stretch>
+        </p:blipFill>
+        <p:spPr>
+          <a:xfrm>
+            <a:off x="7105186" y="2925307"/>
+            <a:ext cx="802932" cy="833055"/>
+          </a:xfrm>
+          <a:prstGeom prst="rect">
+            <a:avLst/>
+          </a:prstGeom>
+        </p:spPr>
+      </p:pic>
+      <p:pic>
+        <p:nvPicPr>
+          <p:cNvPr id="38" name="Picture 37"/>
+          <p:cNvPicPr>
+            <a:picLocks noChangeAspect="1"/>
+          </p:cNvPicPr>
+          <p:nvPr/>
+        </p:nvPicPr>
+        <p:blipFill>
+          <a:blip r:embed="rId3">
+            <a:duotone>
+              <a:prstClr val="black"/>
+              <a:srgbClr val="FFFF00">
+                <a:tint val="45000"/>
+                <a:satMod val="400000"/>
+              </a:srgbClr>
+            </a:duotone>
+            <a:extLst>
+              <a:ext uri="{28A0092B-C50C-407E-A947-70E740481C1C}">
+                <a14:useLocalDpi xmlns:a14="http://schemas.microsoft.com/office/drawing/2010/main" val="0"/>
+              </a:ext>
+            </a:extLst>
+          </a:blip>
+          <a:stretch>
+            <a:fillRect/>
+          </a:stretch>
+        </p:blipFill>
+        <p:spPr>
+          <a:xfrm>
+            <a:off x="8208483" y="2950659"/>
+            <a:ext cx="802932" cy="833055"/>
+          </a:xfrm>
+          <a:prstGeom prst="rect">
+            <a:avLst/>
+          </a:prstGeom>
+        </p:spPr>
+      </p:pic>
+      <p:pic>
+        <p:nvPicPr>
+          <p:cNvPr id="39" name="Picture 38"/>
+          <p:cNvPicPr>
+            <a:picLocks noChangeAspect="1"/>
+          </p:cNvPicPr>
+          <p:nvPr/>
+        </p:nvPicPr>
+        <p:blipFill>
+          <a:blip r:embed="rId3">
+            <a:duotone>
+              <a:prstClr val="black"/>
+              <a:srgbClr val="FFFF00">
+                <a:tint val="45000"/>
+                <a:satMod val="400000"/>
+              </a:srgbClr>
+            </a:duotone>
+            <a:extLst>
+              <a:ext uri="{28A0092B-C50C-407E-A947-70E740481C1C}">
+                <a14:useLocalDpi xmlns:a14="http://schemas.microsoft.com/office/drawing/2010/main" val="0"/>
+              </a:ext>
+            </a:extLst>
+          </a:blip>
+          <a:stretch>
+            <a:fillRect/>
+          </a:stretch>
+        </p:blipFill>
+        <p:spPr>
+          <a:xfrm>
+            <a:off x="9093348" y="1807129"/>
+            <a:ext cx="802932" cy="833055"/>
+          </a:xfrm>
+          <a:prstGeom prst="rect">
+            <a:avLst/>
+          </a:prstGeom>
+        </p:spPr>
+      </p:pic>
+      <p:sp>
+        <p:nvSpPr>
+          <p:cNvPr id="40" name="TextBox 39"/>
+          <p:cNvSpPr txBox="1"/>
+          <p:nvPr/>
+        </p:nvSpPr>
+        <p:spPr>
+          <a:xfrm>
+            <a:off x="18742" y="26236"/>
+            <a:ext cx="1575241" cy="1384995"/>
+          </a:xfrm>
+          <a:prstGeom prst="rect">
+            <a:avLst/>
+          </a:prstGeom>
+          <a:noFill/>
+        </p:spPr>
+        <p:txBody>
+          <a:bodyPr wrap="square" rtlCol="0">
+            <a:spAutoFit/>
+          </a:bodyPr>
+          <a:lstStyle/>
+          <a:p>
+            <a:r>
+              <a:rPr lang="en-GB" sz="2800" dirty="0"/>
+              <a:t>Guesser view: none</a:t>
+            </a:r>
+          </a:p>
+        </p:txBody>
+      </p:sp>
+      <p:sp>
+        <p:nvSpPr>
+          <p:cNvPr id="24" name="TextBox 23">
+            <a:extLst>
+              <a:ext uri="{FF2B5EF4-FFF2-40B4-BE49-F238E27FC236}">
+                <a16:creationId xmlns:a16="http://schemas.microsoft.com/office/drawing/2014/main" id="{52E9930D-9093-F34B-A9B8-B858501D36A2}"/>
+              </a:ext>
+            </a:extLst>
+          </p:cNvPr>
+          <p:cNvSpPr txBox="1"/>
+          <p:nvPr/>
+        </p:nvSpPr>
+        <p:spPr>
+          <a:xfrm>
+            <a:off x="1593983" y="4522063"/>
+            <a:ext cx="9705389" cy="769441"/>
+          </a:xfrm>
+          <a:prstGeom prst="rect">
+            <a:avLst/>
+          </a:prstGeom>
+          <a:noFill/>
+        </p:spPr>
+        <p:txBody>
+          <a:bodyPr wrap="square" rtlCol="0">
+            <a:spAutoFit/>
+          </a:bodyPr>
+          <a:lstStyle/>
+          <a:p>
+            <a:r>
+              <a:rPr lang="en-GB" sz="2200" dirty="0"/>
+              <a:t>The describer said: </a:t>
+            </a:r>
+            <a:r>
+              <a:rPr lang="en-GB" sz="2200" b="1" dirty="0"/>
+              <a:t>The green card is the card where none of the objects are pink.</a:t>
+            </a:r>
+          </a:p>
+          <a:p>
+            <a:r>
+              <a:rPr lang="en-GB" sz="2200" dirty="0"/>
+              <a:t>Click on the card you think is the green card!</a:t>
+            </a:r>
+          </a:p>
+        </p:txBody>
+      </p:sp>
+    </p:spTree>
+    <p:extLst>
+      <p:ext uri="{BB962C8B-B14F-4D97-AF65-F5344CB8AC3E}">
+        <p14:creationId xmlns:p14="http://schemas.microsoft.com/office/powerpoint/2010/main" val="2298093483"/>
+      </p:ext>
+    </p:extLst>
+  </p:cSld>
+  <p:clrMapOvr>
+    <a:masterClrMapping/>
+  </p:clrMapOvr>
+</p:sld>
+</file>
+
 <file path=ppt/slides/slide6.xml><?xml version="1.0" encoding="utf-8"?>
 <p:sld xmlns:a="http://schemas.openxmlformats.org/drawingml/2006/main" xmlns:r="http://schemas.openxmlformats.org/officeDocument/2006/relationships" xmlns:p="http://schemas.openxmlformats.org/presentationml/2006/main">
   <p:cSld>

</xml_diff>

<commit_message>
V06 started guesser trial rounds
</commit_message>
<xml_diff>
--- a/experiments/06_sentence_select_with_training/images/items.pptx
+++ b/experiments/06_sentence_select_with_training/images/items.pptx
@@ -5,7 +5,7 @@
     <p:sldMasterId id="2147483648" r:id="rId1"/>
   </p:sldMasterIdLst>
   <p:notesMasterIdLst>
-    <p:notesMasterId r:id="rId54"/>
+    <p:notesMasterId r:id="rId58"/>
   </p:notesMasterIdLst>
   <p:sldIdLst>
     <p:sldId id="319" r:id="rId2"/>
@@ -60,6 +60,10 @@
     <p:sldId id="292" r:id="rId51"/>
     <p:sldId id="259" r:id="rId52"/>
     <p:sldId id="350" r:id="rId53"/>
+    <p:sldId id="351" r:id="rId54"/>
+    <p:sldId id="352" r:id="rId55"/>
+    <p:sldId id="353" r:id="rId56"/>
+    <p:sldId id="354" r:id="rId57"/>
   </p:sldIdLst>
   <p:sldSz cx="12192000" cy="6858000"/>
   <p:notesSz cx="6858000" cy="9144000"/>
@@ -1191,6 +1195,258 @@
 </p:notes>
 </file>
 
+<file path=ppt/notesSlides/notesSlide17.xml><?xml version="1.0" encoding="utf-8"?>
+<p:notes xmlns:a="http://schemas.openxmlformats.org/drawingml/2006/main" xmlns:r="http://schemas.openxmlformats.org/officeDocument/2006/relationships" xmlns:p="http://schemas.openxmlformats.org/presentationml/2006/main">
+  <p:cSld>
+    <p:spTree>
+      <p:nvGrpSpPr>
+        <p:cNvPr id="1" name=""/>
+        <p:cNvGrpSpPr/>
+        <p:nvPr/>
+      </p:nvGrpSpPr>
+      <p:grpSpPr>
+        <a:xfrm>
+          <a:off x="0" y="0"/>
+          <a:ext cx="0" cy="0"/>
+          <a:chOff x="0" y="0"/>
+          <a:chExt cx="0" cy="0"/>
+        </a:xfrm>
+      </p:grpSpPr>
+      <p:sp>
+        <p:nvSpPr>
+          <p:cNvPr id="2" name="Slide Image Placeholder 1"/>
+          <p:cNvSpPr>
+            <a:spLocks noGrp="1" noRot="1" noChangeAspect="1"/>
+          </p:cNvSpPr>
+          <p:nvPr>
+            <p:ph type="sldImg"/>
+          </p:nvPr>
+        </p:nvSpPr>
+        <p:spPr/>
+      </p:sp>
+      <p:sp>
+        <p:nvSpPr>
+          <p:cNvPr id="3" name="Notes Placeholder 2"/>
+          <p:cNvSpPr>
+            <a:spLocks noGrp="1"/>
+          </p:cNvSpPr>
+          <p:nvPr>
+            <p:ph type="body" idx="1"/>
+          </p:nvPr>
+        </p:nvSpPr>
+        <p:spPr/>
+        <p:txBody>
+          <a:bodyPr/>
+          <a:lstStyle/>
+          <a:p>
+            <a:endParaRPr lang="de-DE" dirty="0"/>
+          </a:p>
+        </p:txBody>
+      </p:sp>
+      <p:sp>
+        <p:nvSpPr>
+          <p:cNvPr id="4" name="Slide Number Placeholder 3"/>
+          <p:cNvSpPr>
+            <a:spLocks noGrp="1"/>
+          </p:cNvSpPr>
+          <p:nvPr>
+            <p:ph type="sldNum" sz="quarter" idx="5"/>
+          </p:nvPr>
+        </p:nvSpPr>
+        <p:spPr/>
+        <p:txBody>
+          <a:bodyPr/>
+          <a:lstStyle/>
+          <a:p>
+            <a:fld id="{48EA92E9-48F7-5345-AFBD-FA4269ABE060}" type="slidenum">
+              <a:rPr lang="de-DE" smtClean="0"/>
+              <a:t>53</a:t>
+            </a:fld>
+            <a:endParaRPr lang="de-DE"/>
+          </a:p>
+        </p:txBody>
+      </p:sp>
+    </p:spTree>
+    <p:extLst>
+      <p:ext uri="{BB962C8B-B14F-4D97-AF65-F5344CB8AC3E}">
+        <p14:creationId xmlns:p14="http://schemas.microsoft.com/office/powerpoint/2010/main" val="3075358402"/>
+      </p:ext>
+    </p:extLst>
+  </p:cSld>
+  <p:clrMapOvr>
+    <a:masterClrMapping/>
+  </p:clrMapOvr>
+</p:notes>
+</file>
+
+<file path=ppt/notesSlides/notesSlide18.xml><?xml version="1.0" encoding="utf-8"?>
+<p:notes xmlns:a="http://schemas.openxmlformats.org/drawingml/2006/main" xmlns:r="http://schemas.openxmlformats.org/officeDocument/2006/relationships" xmlns:p="http://schemas.openxmlformats.org/presentationml/2006/main">
+  <p:cSld>
+    <p:spTree>
+      <p:nvGrpSpPr>
+        <p:cNvPr id="1" name=""/>
+        <p:cNvGrpSpPr/>
+        <p:nvPr/>
+      </p:nvGrpSpPr>
+      <p:grpSpPr>
+        <a:xfrm>
+          <a:off x="0" y="0"/>
+          <a:ext cx="0" cy="0"/>
+          <a:chOff x="0" y="0"/>
+          <a:chExt cx="0" cy="0"/>
+        </a:xfrm>
+      </p:grpSpPr>
+      <p:sp>
+        <p:nvSpPr>
+          <p:cNvPr id="2" name="Slide Image Placeholder 1"/>
+          <p:cNvSpPr>
+            <a:spLocks noGrp="1" noRot="1" noChangeAspect="1"/>
+          </p:cNvSpPr>
+          <p:nvPr>
+            <p:ph type="sldImg"/>
+          </p:nvPr>
+        </p:nvSpPr>
+        <p:spPr/>
+      </p:sp>
+      <p:sp>
+        <p:nvSpPr>
+          <p:cNvPr id="3" name="Notes Placeholder 2"/>
+          <p:cNvSpPr>
+            <a:spLocks noGrp="1"/>
+          </p:cNvSpPr>
+          <p:nvPr>
+            <p:ph type="body" idx="1"/>
+          </p:nvPr>
+        </p:nvSpPr>
+        <p:spPr/>
+        <p:txBody>
+          <a:bodyPr/>
+          <a:lstStyle/>
+          <a:p>
+            <a:endParaRPr lang="de-DE" dirty="0"/>
+          </a:p>
+        </p:txBody>
+      </p:sp>
+      <p:sp>
+        <p:nvSpPr>
+          <p:cNvPr id="4" name="Slide Number Placeholder 3"/>
+          <p:cNvSpPr>
+            <a:spLocks noGrp="1"/>
+          </p:cNvSpPr>
+          <p:nvPr>
+            <p:ph type="sldNum" sz="quarter" idx="5"/>
+          </p:nvPr>
+        </p:nvSpPr>
+        <p:spPr/>
+        <p:txBody>
+          <a:bodyPr/>
+          <a:lstStyle/>
+          <a:p>
+            <a:fld id="{48EA92E9-48F7-5345-AFBD-FA4269ABE060}" type="slidenum">
+              <a:rPr lang="de-DE" smtClean="0"/>
+              <a:t>54</a:t>
+            </a:fld>
+            <a:endParaRPr lang="de-DE"/>
+          </a:p>
+        </p:txBody>
+      </p:sp>
+    </p:spTree>
+    <p:extLst>
+      <p:ext uri="{BB962C8B-B14F-4D97-AF65-F5344CB8AC3E}">
+        <p14:creationId xmlns:p14="http://schemas.microsoft.com/office/powerpoint/2010/main" val="2490712687"/>
+      </p:ext>
+    </p:extLst>
+  </p:cSld>
+  <p:clrMapOvr>
+    <a:masterClrMapping/>
+  </p:clrMapOvr>
+</p:notes>
+</file>
+
+<file path=ppt/notesSlides/notesSlide19.xml><?xml version="1.0" encoding="utf-8"?>
+<p:notes xmlns:a="http://schemas.openxmlformats.org/drawingml/2006/main" xmlns:r="http://schemas.openxmlformats.org/officeDocument/2006/relationships" xmlns:p="http://schemas.openxmlformats.org/presentationml/2006/main">
+  <p:cSld>
+    <p:spTree>
+      <p:nvGrpSpPr>
+        <p:cNvPr id="1" name=""/>
+        <p:cNvGrpSpPr/>
+        <p:nvPr/>
+      </p:nvGrpSpPr>
+      <p:grpSpPr>
+        <a:xfrm>
+          <a:off x="0" y="0"/>
+          <a:ext cx="0" cy="0"/>
+          <a:chOff x="0" y="0"/>
+          <a:chExt cx="0" cy="0"/>
+        </a:xfrm>
+      </p:grpSpPr>
+      <p:sp>
+        <p:nvSpPr>
+          <p:cNvPr id="2" name="Slide Image Placeholder 1"/>
+          <p:cNvSpPr>
+            <a:spLocks noGrp="1" noRot="1" noChangeAspect="1"/>
+          </p:cNvSpPr>
+          <p:nvPr>
+            <p:ph type="sldImg"/>
+          </p:nvPr>
+        </p:nvSpPr>
+        <p:spPr/>
+      </p:sp>
+      <p:sp>
+        <p:nvSpPr>
+          <p:cNvPr id="3" name="Notes Placeholder 2"/>
+          <p:cNvSpPr>
+            <a:spLocks noGrp="1"/>
+          </p:cNvSpPr>
+          <p:nvPr>
+            <p:ph type="body" idx="1"/>
+          </p:nvPr>
+        </p:nvSpPr>
+        <p:spPr/>
+        <p:txBody>
+          <a:bodyPr/>
+          <a:lstStyle/>
+          <a:p>
+            <a:endParaRPr lang="de-DE" dirty="0"/>
+          </a:p>
+        </p:txBody>
+      </p:sp>
+      <p:sp>
+        <p:nvSpPr>
+          <p:cNvPr id="4" name="Slide Number Placeholder 3"/>
+          <p:cNvSpPr>
+            <a:spLocks noGrp="1"/>
+          </p:cNvSpPr>
+          <p:nvPr>
+            <p:ph type="sldNum" sz="quarter" idx="5"/>
+          </p:nvPr>
+        </p:nvSpPr>
+        <p:spPr/>
+        <p:txBody>
+          <a:bodyPr/>
+          <a:lstStyle/>
+          <a:p>
+            <a:fld id="{48EA92E9-48F7-5345-AFBD-FA4269ABE060}" type="slidenum">
+              <a:rPr lang="de-DE" smtClean="0"/>
+              <a:t>55</a:t>
+            </a:fld>
+            <a:endParaRPr lang="de-DE"/>
+          </a:p>
+        </p:txBody>
+      </p:sp>
+    </p:spTree>
+    <p:extLst>
+      <p:ext uri="{BB962C8B-B14F-4D97-AF65-F5344CB8AC3E}">
+        <p14:creationId xmlns:p14="http://schemas.microsoft.com/office/powerpoint/2010/main" val="2591643029"/>
+      </p:ext>
+    </p:extLst>
+  </p:cSld>
+  <p:clrMapOvr>
+    <a:masterClrMapping/>
+  </p:clrMapOvr>
+</p:notes>
+</file>
+
 <file path=ppt/notesSlides/notesSlide2.xml><?xml version="1.0" encoding="utf-8"?>
 <p:notes xmlns:a="http://schemas.openxmlformats.org/drawingml/2006/main" xmlns:r="http://schemas.openxmlformats.org/officeDocument/2006/relationships" xmlns:p="http://schemas.openxmlformats.org/presentationml/2006/main">
   <p:cSld>
@@ -1266,6 +1522,90 @@
     <p:extLst>
       <p:ext uri="{BB962C8B-B14F-4D97-AF65-F5344CB8AC3E}">
         <p14:creationId xmlns:p14="http://schemas.microsoft.com/office/powerpoint/2010/main" val="1537932413"/>
+      </p:ext>
+    </p:extLst>
+  </p:cSld>
+  <p:clrMapOvr>
+    <a:masterClrMapping/>
+  </p:clrMapOvr>
+</p:notes>
+</file>
+
+<file path=ppt/notesSlides/notesSlide20.xml><?xml version="1.0" encoding="utf-8"?>
+<p:notes xmlns:a="http://schemas.openxmlformats.org/drawingml/2006/main" xmlns:r="http://schemas.openxmlformats.org/officeDocument/2006/relationships" xmlns:p="http://schemas.openxmlformats.org/presentationml/2006/main">
+  <p:cSld>
+    <p:spTree>
+      <p:nvGrpSpPr>
+        <p:cNvPr id="1" name=""/>
+        <p:cNvGrpSpPr/>
+        <p:nvPr/>
+      </p:nvGrpSpPr>
+      <p:grpSpPr>
+        <a:xfrm>
+          <a:off x="0" y="0"/>
+          <a:ext cx="0" cy="0"/>
+          <a:chOff x="0" y="0"/>
+          <a:chExt cx="0" cy="0"/>
+        </a:xfrm>
+      </p:grpSpPr>
+      <p:sp>
+        <p:nvSpPr>
+          <p:cNvPr id="2" name="Slide Image Placeholder 1"/>
+          <p:cNvSpPr>
+            <a:spLocks noGrp="1" noRot="1" noChangeAspect="1"/>
+          </p:cNvSpPr>
+          <p:nvPr>
+            <p:ph type="sldImg"/>
+          </p:nvPr>
+        </p:nvSpPr>
+        <p:spPr/>
+      </p:sp>
+      <p:sp>
+        <p:nvSpPr>
+          <p:cNvPr id="3" name="Notes Placeholder 2"/>
+          <p:cNvSpPr>
+            <a:spLocks noGrp="1"/>
+          </p:cNvSpPr>
+          <p:nvPr>
+            <p:ph type="body" idx="1"/>
+          </p:nvPr>
+        </p:nvSpPr>
+        <p:spPr/>
+        <p:txBody>
+          <a:bodyPr/>
+          <a:lstStyle/>
+          <a:p>
+            <a:endParaRPr lang="de-DE" dirty="0"/>
+          </a:p>
+        </p:txBody>
+      </p:sp>
+      <p:sp>
+        <p:nvSpPr>
+          <p:cNvPr id="4" name="Slide Number Placeholder 3"/>
+          <p:cNvSpPr>
+            <a:spLocks noGrp="1"/>
+          </p:cNvSpPr>
+          <p:nvPr>
+            <p:ph type="sldNum" sz="quarter" idx="5"/>
+          </p:nvPr>
+        </p:nvSpPr>
+        <p:spPr/>
+        <p:txBody>
+          <a:bodyPr/>
+          <a:lstStyle/>
+          <a:p>
+            <a:fld id="{48EA92E9-48F7-5345-AFBD-FA4269ABE060}" type="slidenum">
+              <a:rPr lang="de-DE" smtClean="0"/>
+              <a:t>56</a:t>
+            </a:fld>
+            <a:endParaRPr lang="de-DE"/>
+          </a:p>
+        </p:txBody>
+      </p:sp>
+    </p:spTree>
+    <p:extLst>
+      <p:ext uri="{BB962C8B-B14F-4D97-AF65-F5344CB8AC3E}">
+        <p14:creationId xmlns:p14="http://schemas.microsoft.com/office/powerpoint/2010/main" val="482682328"/>
       </p:ext>
     </p:extLst>
   </p:cSld>
@@ -42996,6 +43336,3854 @@
 </p:sld>
 </file>
 
+<file path=ppt/slides/slide53.xml><?xml version="1.0" encoding="utf-8"?>
+<p:sld xmlns:a="http://schemas.openxmlformats.org/drawingml/2006/main" xmlns:r="http://schemas.openxmlformats.org/officeDocument/2006/relationships" xmlns:p="http://schemas.openxmlformats.org/presentationml/2006/main">
+  <p:cSld>
+    <p:spTree>
+      <p:nvGrpSpPr>
+        <p:cNvPr id="1" name=""/>
+        <p:cNvGrpSpPr/>
+        <p:nvPr/>
+      </p:nvGrpSpPr>
+      <p:grpSpPr>
+        <a:xfrm>
+          <a:off x="0" y="0"/>
+          <a:ext cx="0" cy="0"/>
+          <a:chOff x="0" y="0"/>
+          <a:chExt cx="0" cy="0"/>
+        </a:xfrm>
+      </p:grpSpPr>
+      <p:sp>
+        <p:nvSpPr>
+          <p:cNvPr id="4" name="Rectangle 3"/>
+          <p:cNvSpPr>
+            <a:spLocks/>
+          </p:cNvSpPr>
+          <p:nvPr/>
+        </p:nvSpPr>
+        <p:spPr>
+          <a:xfrm>
+            <a:off x="2202652" y="1407271"/>
+            <a:ext cx="3600000" cy="3600000"/>
+          </a:xfrm>
+          <a:prstGeom prst="rect">
+            <a:avLst/>
+          </a:prstGeom>
+          <a:noFill/>
+          <a:ln w="190500">
+            <a:solidFill>
+              <a:schemeClr val="tx1">
+                <a:lumMod val="75000"/>
+                <a:lumOff val="25000"/>
+              </a:schemeClr>
+            </a:solidFill>
+          </a:ln>
+        </p:spPr>
+        <p:style>
+          <a:lnRef idx="2">
+            <a:schemeClr val="accent1">
+              <a:shade val="50000"/>
+            </a:schemeClr>
+          </a:lnRef>
+          <a:fillRef idx="1">
+            <a:schemeClr val="accent1"/>
+          </a:fillRef>
+          <a:effectRef idx="0">
+            <a:schemeClr val="accent1"/>
+          </a:effectRef>
+          <a:fontRef idx="minor">
+            <a:schemeClr val="lt1"/>
+          </a:fontRef>
+        </p:style>
+        <p:txBody>
+          <a:bodyPr rtlCol="0" anchor="ctr"/>
+          <a:lstStyle/>
+          <a:p>
+            <a:pPr algn="ctr"/>
+            <a:endParaRPr lang="en-GB"/>
+          </a:p>
+        </p:txBody>
+      </p:sp>
+      <p:sp>
+        <p:nvSpPr>
+          <p:cNvPr id="5" name="Rectangle 4"/>
+          <p:cNvSpPr>
+            <a:spLocks/>
+          </p:cNvSpPr>
+          <p:nvPr/>
+        </p:nvSpPr>
+        <p:spPr>
+          <a:xfrm>
+            <a:off x="6331185" y="1405046"/>
+            <a:ext cx="3600000" cy="3600000"/>
+          </a:xfrm>
+          <a:prstGeom prst="rect">
+            <a:avLst/>
+          </a:prstGeom>
+          <a:noFill/>
+          <a:ln w="190500">
+            <a:solidFill>
+              <a:schemeClr val="tx1">
+                <a:lumMod val="75000"/>
+                <a:lumOff val="25000"/>
+              </a:schemeClr>
+            </a:solidFill>
+          </a:ln>
+        </p:spPr>
+        <p:style>
+          <a:lnRef idx="2">
+            <a:schemeClr val="accent1">
+              <a:shade val="50000"/>
+            </a:schemeClr>
+          </a:lnRef>
+          <a:fillRef idx="1">
+            <a:schemeClr val="accent1"/>
+          </a:fillRef>
+          <a:effectRef idx="0">
+            <a:schemeClr val="accent1"/>
+          </a:effectRef>
+          <a:fontRef idx="minor">
+            <a:schemeClr val="lt1"/>
+          </a:fontRef>
+        </p:style>
+        <p:txBody>
+          <a:bodyPr rtlCol="0" anchor="ctr"/>
+          <a:lstStyle/>
+          <a:p>
+            <a:pPr algn="ctr"/>
+            <a:endParaRPr lang="en-GB" dirty="0">
+              <a:solidFill>
+                <a:schemeClr val="bg2">
+                  <a:lumMod val="75000"/>
+                </a:schemeClr>
+              </a:solidFill>
+              <a:latin typeface="Arial" panose="020B0604020202020204" pitchFamily="34" charset="0"/>
+              <a:cs typeface="Arial" panose="020B0604020202020204" pitchFamily="34" charset="0"/>
+            </a:endParaRPr>
+          </a:p>
+        </p:txBody>
+      </p:sp>
+      <p:pic>
+        <p:nvPicPr>
+          <p:cNvPr id="14" name="Picture 13"/>
+          <p:cNvPicPr>
+            <a:picLocks noChangeAspect="1"/>
+          </p:cNvPicPr>
+          <p:nvPr/>
+        </p:nvPicPr>
+        <p:blipFill>
+          <a:blip r:embed="rId3" cstate="print">
+            <a:duotone>
+              <a:prstClr val="black"/>
+              <a:srgbClr val="FF99CC">
+                <a:tint val="45000"/>
+                <a:satMod val="400000"/>
+              </a:srgbClr>
+            </a:duotone>
+            <a:extLst>
+              <a:ext uri="{28A0092B-C50C-407E-A947-70E740481C1C}">
+                <a14:useLocalDpi xmlns:a14="http://schemas.microsoft.com/office/drawing/2010/main" val="0"/>
+              </a:ext>
+            </a:extLst>
+          </a:blip>
+          <a:stretch>
+            <a:fillRect/>
+          </a:stretch>
+        </p:blipFill>
+        <p:spPr>
+          <a:xfrm>
+            <a:off x="3453918" y="1609759"/>
+            <a:ext cx="976119" cy="946591"/>
+          </a:xfrm>
+          <a:prstGeom prst="rect">
+            <a:avLst/>
+          </a:prstGeom>
+        </p:spPr>
+      </p:pic>
+      <p:pic>
+        <p:nvPicPr>
+          <p:cNvPr id="16" name="Picture 15"/>
+          <p:cNvPicPr>
+            <a:picLocks noChangeAspect="1"/>
+          </p:cNvPicPr>
+          <p:nvPr/>
+        </p:nvPicPr>
+        <p:blipFill>
+          <a:blip r:embed="rId3" cstate="print">
+            <a:duotone>
+              <a:prstClr val="black"/>
+              <a:srgbClr val="FF99CC">
+                <a:tint val="45000"/>
+                <a:satMod val="400000"/>
+              </a:srgbClr>
+            </a:duotone>
+            <a:extLst>
+              <a:ext uri="{28A0092B-C50C-407E-A947-70E740481C1C}">
+                <a14:useLocalDpi xmlns:a14="http://schemas.microsoft.com/office/drawing/2010/main" val="0"/>
+              </a:ext>
+            </a:extLst>
+          </a:blip>
+          <a:stretch>
+            <a:fillRect/>
+          </a:stretch>
+        </p:blipFill>
+        <p:spPr>
+          <a:xfrm>
+            <a:off x="4430037" y="1609759"/>
+            <a:ext cx="976119" cy="946591"/>
+          </a:xfrm>
+          <a:prstGeom prst="rect">
+            <a:avLst/>
+          </a:prstGeom>
+        </p:spPr>
+      </p:pic>
+      <p:pic>
+        <p:nvPicPr>
+          <p:cNvPr id="18" name="Picture 17"/>
+          <p:cNvPicPr>
+            <a:picLocks noChangeAspect="1"/>
+          </p:cNvPicPr>
+          <p:nvPr/>
+        </p:nvPicPr>
+        <p:blipFill>
+          <a:blip r:embed="rId3" cstate="print">
+            <a:duotone>
+              <a:prstClr val="black"/>
+              <a:srgbClr val="FF99CC">
+                <a:tint val="45000"/>
+                <a:satMod val="400000"/>
+              </a:srgbClr>
+            </a:duotone>
+            <a:extLst>
+              <a:ext uri="{28A0092B-C50C-407E-A947-70E740481C1C}">
+                <a14:useLocalDpi xmlns:a14="http://schemas.microsoft.com/office/drawing/2010/main" val="0"/>
+              </a:ext>
+            </a:extLst>
+          </a:blip>
+          <a:stretch>
+            <a:fillRect/>
+          </a:stretch>
+        </p:blipFill>
+        <p:spPr>
+          <a:xfrm>
+            <a:off x="2477799" y="1609758"/>
+            <a:ext cx="976119" cy="946591"/>
+          </a:xfrm>
+          <a:prstGeom prst="rect">
+            <a:avLst/>
+          </a:prstGeom>
+        </p:spPr>
+      </p:pic>
+      <p:pic>
+        <p:nvPicPr>
+          <p:cNvPr id="24" name="Picture 23"/>
+          <p:cNvPicPr>
+            <a:picLocks noChangeAspect="1"/>
+          </p:cNvPicPr>
+          <p:nvPr/>
+        </p:nvPicPr>
+        <p:blipFill>
+          <a:blip r:embed="rId4" cstate="print">
+            <a:duotone>
+              <a:prstClr val="black"/>
+              <a:srgbClr val="FF99CC">
+                <a:tint val="45000"/>
+                <a:satMod val="400000"/>
+              </a:srgbClr>
+            </a:duotone>
+            <a:extLst>
+              <a:ext uri="{28A0092B-C50C-407E-A947-70E740481C1C}">
+                <a14:useLocalDpi xmlns:a14="http://schemas.microsoft.com/office/drawing/2010/main" val="0"/>
+              </a:ext>
+            </a:extLst>
+          </a:blip>
+          <a:stretch>
+            <a:fillRect/>
+          </a:stretch>
+        </p:blipFill>
+        <p:spPr>
+          <a:xfrm>
+            <a:off x="7692121" y="1889030"/>
+            <a:ext cx="974999" cy="503810"/>
+          </a:xfrm>
+          <a:prstGeom prst="rect">
+            <a:avLst/>
+          </a:prstGeom>
+        </p:spPr>
+      </p:pic>
+      <p:pic>
+        <p:nvPicPr>
+          <p:cNvPr id="25" name="Picture 24"/>
+          <p:cNvPicPr>
+            <a:picLocks noChangeAspect="1"/>
+          </p:cNvPicPr>
+          <p:nvPr/>
+        </p:nvPicPr>
+        <p:blipFill>
+          <a:blip r:embed="rId4" cstate="print">
+            <a:duotone>
+              <a:prstClr val="black"/>
+              <a:srgbClr val="FF99CC">
+                <a:tint val="45000"/>
+                <a:satMod val="400000"/>
+              </a:srgbClr>
+            </a:duotone>
+            <a:extLst>
+              <a:ext uri="{28A0092B-C50C-407E-A947-70E740481C1C}">
+                <a14:useLocalDpi xmlns:a14="http://schemas.microsoft.com/office/drawing/2010/main" val="0"/>
+              </a:ext>
+            </a:extLst>
+          </a:blip>
+          <a:stretch>
+            <a:fillRect/>
+          </a:stretch>
+        </p:blipFill>
+        <p:spPr>
+          <a:xfrm>
+            <a:off x="6609188" y="1889030"/>
+            <a:ext cx="974999" cy="503810"/>
+          </a:xfrm>
+          <a:prstGeom prst="rect">
+            <a:avLst/>
+          </a:prstGeom>
+        </p:spPr>
+      </p:pic>
+      <p:pic>
+        <p:nvPicPr>
+          <p:cNvPr id="26" name="Picture 25"/>
+          <p:cNvPicPr>
+            <a:picLocks noChangeAspect="1"/>
+          </p:cNvPicPr>
+          <p:nvPr/>
+        </p:nvPicPr>
+        <p:blipFill>
+          <a:blip r:embed="rId4" cstate="print">
+            <a:duotone>
+              <a:prstClr val="black"/>
+              <a:srgbClr val="FF99CC">
+                <a:tint val="45000"/>
+                <a:satMod val="400000"/>
+              </a:srgbClr>
+            </a:duotone>
+            <a:extLst>
+              <a:ext uri="{28A0092B-C50C-407E-A947-70E740481C1C}">
+                <a14:useLocalDpi xmlns:a14="http://schemas.microsoft.com/office/drawing/2010/main" val="0"/>
+              </a:ext>
+            </a:extLst>
+          </a:blip>
+          <a:stretch>
+            <a:fillRect/>
+          </a:stretch>
+        </p:blipFill>
+        <p:spPr>
+          <a:xfrm>
+            <a:off x="8753803" y="1889030"/>
+            <a:ext cx="974999" cy="503810"/>
+          </a:xfrm>
+          <a:prstGeom prst="rect">
+            <a:avLst/>
+          </a:prstGeom>
+        </p:spPr>
+      </p:pic>
+      <p:pic>
+        <p:nvPicPr>
+          <p:cNvPr id="27" name="Picture 26"/>
+          <p:cNvPicPr>
+            <a:picLocks noChangeAspect="1"/>
+          </p:cNvPicPr>
+          <p:nvPr/>
+        </p:nvPicPr>
+        <p:blipFill>
+          <a:blip r:embed="rId4" cstate="print">
+            <a:duotone>
+              <a:prstClr val="black"/>
+              <a:srgbClr val="FF99CC">
+                <a:tint val="45000"/>
+                <a:satMod val="400000"/>
+              </a:srgbClr>
+            </a:duotone>
+            <a:extLst>
+              <a:ext uri="{28A0092B-C50C-407E-A947-70E740481C1C}">
+                <a14:useLocalDpi xmlns:a14="http://schemas.microsoft.com/office/drawing/2010/main" val="0"/>
+              </a:ext>
+            </a:extLst>
+          </a:blip>
+          <a:stretch>
+            <a:fillRect/>
+          </a:stretch>
+        </p:blipFill>
+        <p:spPr>
+          <a:xfrm>
+            <a:off x="7692121" y="2876824"/>
+            <a:ext cx="974999" cy="503810"/>
+          </a:xfrm>
+          <a:prstGeom prst="rect">
+            <a:avLst/>
+          </a:prstGeom>
+        </p:spPr>
+      </p:pic>
+      <p:pic>
+        <p:nvPicPr>
+          <p:cNvPr id="28" name="Picture 27"/>
+          <p:cNvPicPr>
+            <a:picLocks noChangeAspect="1"/>
+          </p:cNvPicPr>
+          <p:nvPr/>
+        </p:nvPicPr>
+        <p:blipFill>
+          <a:blip r:embed="rId4" cstate="print">
+            <a:duotone>
+              <a:prstClr val="black"/>
+              <a:srgbClr val="FF99CC">
+                <a:tint val="45000"/>
+                <a:satMod val="400000"/>
+              </a:srgbClr>
+            </a:duotone>
+            <a:extLst>
+              <a:ext uri="{28A0092B-C50C-407E-A947-70E740481C1C}">
+                <a14:useLocalDpi xmlns:a14="http://schemas.microsoft.com/office/drawing/2010/main" val="0"/>
+              </a:ext>
+            </a:extLst>
+          </a:blip>
+          <a:stretch>
+            <a:fillRect/>
+          </a:stretch>
+        </p:blipFill>
+        <p:spPr>
+          <a:xfrm>
+            <a:off x="6609188" y="2876824"/>
+            <a:ext cx="974999" cy="503810"/>
+          </a:xfrm>
+          <a:prstGeom prst="rect">
+            <a:avLst/>
+          </a:prstGeom>
+        </p:spPr>
+      </p:pic>
+      <p:pic>
+        <p:nvPicPr>
+          <p:cNvPr id="29" name="Picture 28"/>
+          <p:cNvPicPr>
+            <a:picLocks noChangeAspect="1"/>
+          </p:cNvPicPr>
+          <p:nvPr/>
+        </p:nvPicPr>
+        <p:blipFill>
+          <a:blip r:embed="rId4" cstate="print">
+            <a:duotone>
+              <a:prstClr val="black"/>
+              <a:srgbClr val="FF99CC">
+                <a:tint val="45000"/>
+                <a:satMod val="400000"/>
+              </a:srgbClr>
+            </a:duotone>
+            <a:extLst>
+              <a:ext uri="{28A0092B-C50C-407E-A947-70E740481C1C}">
+                <a14:useLocalDpi xmlns:a14="http://schemas.microsoft.com/office/drawing/2010/main" val="0"/>
+              </a:ext>
+            </a:extLst>
+          </a:blip>
+          <a:stretch>
+            <a:fillRect/>
+          </a:stretch>
+        </p:blipFill>
+        <p:spPr>
+          <a:xfrm>
+            <a:off x="8753803" y="2876824"/>
+            <a:ext cx="974999" cy="503810"/>
+          </a:xfrm>
+          <a:prstGeom prst="rect">
+            <a:avLst/>
+          </a:prstGeom>
+        </p:spPr>
+      </p:pic>
+      <p:pic>
+        <p:nvPicPr>
+          <p:cNvPr id="30" name="Picture 29"/>
+          <p:cNvPicPr>
+            <a:picLocks noChangeAspect="1"/>
+          </p:cNvPicPr>
+          <p:nvPr/>
+        </p:nvPicPr>
+        <p:blipFill>
+          <a:blip r:embed="rId4" cstate="print">
+            <a:duotone>
+              <a:prstClr val="black"/>
+              <a:srgbClr val="00FF00">
+                <a:tint val="45000"/>
+                <a:satMod val="400000"/>
+              </a:srgbClr>
+            </a:duotone>
+            <a:extLst>
+              <a:ext uri="{28A0092B-C50C-407E-A947-70E740481C1C}">
+                <a14:useLocalDpi xmlns:a14="http://schemas.microsoft.com/office/drawing/2010/main" val="0"/>
+              </a:ext>
+            </a:extLst>
+          </a:blip>
+          <a:stretch>
+            <a:fillRect/>
+          </a:stretch>
+        </p:blipFill>
+        <p:spPr>
+          <a:xfrm>
+            <a:off x="7692121" y="3942047"/>
+            <a:ext cx="974999" cy="503810"/>
+          </a:xfrm>
+          <a:prstGeom prst="rect">
+            <a:avLst/>
+          </a:prstGeom>
+        </p:spPr>
+      </p:pic>
+      <p:pic>
+        <p:nvPicPr>
+          <p:cNvPr id="31" name="Picture 30"/>
+          <p:cNvPicPr>
+            <a:picLocks noChangeAspect="1"/>
+          </p:cNvPicPr>
+          <p:nvPr/>
+        </p:nvPicPr>
+        <p:blipFill>
+          <a:blip r:embed="rId4" cstate="print">
+            <a:duotone>
+              <a:prstClr val="black"/>
+              <a:srgbClr val="00FF00">
+                <a:tint val="45000"/>
+                <a:satMod val="400000"/>
+              </a:srgbClr>
+            </a:duotone>
+            <a:extLst>
+              <a:ext uri="{28A0092B-C50C-407E-A947-70E740481C1C}">
+                <a14:useLocalDpi xmlns:a14="http://schemas.microsoft.com/office/drawing/2010/main" val="0"/>
+              </a:ext>
+            </a:extLst>
+          </a:blip>
+          <a:stretch>
+            <a:fillRect/>
+          </a:stretch>
+        </p:blipFill>
+        <p:spPr>
+          <a:xfrm>
+            <a:off x="6609188" y="3942047"/>
+            <a:ext cx="974999" cy="503810"/>
+          </a:xfrm>
+          <a:prstGeom prst="rect">
+            <a:avLst/>
+          </a:prstGeom>
+        </p:spPr>
+      </p:pic>
+      <p:pic>
+        <p:nvPicPr>
+          <p:cNvPr id="33" name="Picture 32"/>
+          <p:cNvPicPr>
+            <a:picLocks noChangeAspect="1"/>
+          </p:cNvPicPr>
+          <p:nvPr/>
+        </p:nvPicPr>
+        <p:blipFill>
+          <a:blip r:embed="rId4" cstate="print">
+            <a:duotone>
+              <a:prstClr val="black"/>
+              <a:srgbClr val="00FF00">
+                <a:tint val="45000"/>
+                <a:satMod val="400000"/>
+              </a:srgbClr>
+            </a:duotone>
+            <a:extLst>
+              <a:ext uri="{28A0092B-C50C-407E-A947-70E740481C1C}">
+                <a14:useLocalDpi xmlns:a14="http://schemas.microsoft.com/office/drawing/2010/main" val="0"/>
+              </a:ext>
+            </a:extLst>
+          </a:blip>
+          <a:stretch>
+            <a:fillRect/>
+          </a:stretch>
+        </p:blipFill>
+        <p:spPr>
+          <a:xfrm>
+            <a:off x="8753803" y="3942047"/>
+            <a:ext cx="974999" cy="503810"/>
+          </a:xfrm>
+          <a:prstGeom prst="rect">
+            <a:avLst/>
+          </a:prstGeom>
+        </p:spPr>
+      </p:pic>
+      <p:sp>
+        <p:nvSpPr>
+          <p:cNvPr id="34" name="TextBox 33"/>
+          <p:cNvSpPr txBox="1"/>
+          <p:nvPr/>
+        </p:nvSpPr>
+        <p:spPr>
+          <a:xfrm>
+            <a:off x="0" y="0"/>
+            <a:ext cx="4555671" cy="523220"/>
+          </a:xfrm>
+          <a:prstGeom prst="rect">
+            <a:avLst/>
+          </a:prstGeom>
+          <a:noFill/>
+        </p:spPr>
+        <p:txBody>
+          <a:bodyPr wrap="square" rtlCol="0">
+            <a:spAutoFit/>
+          </a:bodyPr>
+          <a:lstStyle/>
+          <a:p>
+            <a:r>
+              <a:rPr lang="en-GB" sz="2800" dirty="0"/>
+              <a:t>Guesser Training 1 – all true</a:t>
+            </a:r>
+          </a:p>
+        </p:txBody>
+      </p:sp>
+      <p:pic>
+        <p:nvPicPr>
+          <p:cNvPr id="35" name="Picture 34"/>
+          <p:cNvPicPr>
+            <a:picLocks noChangeAspect="1"/>
+          </p:cNvPicPr>
+          <p:nvPr/>
+        </p:nvPicPr>
+        <p:blipFill>
+          <a:blip r:embed="rId3" cstate="print">
+            <a:duotone>
+              <a:prstClr val="black"/>
+              <a:srgbClr val="00FF00">
+                <a:tint val="45000"/>
+                <a:satMod val="400000"/>
+              </a:srgbClr>
+            </a:duotone>
+            <a:extLst>
+              <a:ext uri="{28A0092B-C50C-407E-A947-70E740481C1C}">
+                <a14:useLocalDpi xmlns:a14="http://schemas.microsoft.com/office/drawing/2010/main" val="0"/>
+              </a:ext>
+            </a:extLst>
+          </a:blip>
+          <a:stretch>
+            <a:fillRect/>
+          </a:stretch>
+        </p:blipFill>
+        <p:spPr>
+          <a:xfrm>
+            <a:off x="3453918" y="2663887"/>
+            <a:ext cx="976119" cy="946591"/>
+          </a:xfrm>
+          <a:prstGeom prst="rect">
+            <a:avLst/>
+          </a:prstGeom>
+        </p:spPr>
+      </p:pic>
+      <p:pic>
+        <p:nvPicPr>
+          <p:cNvPr id="36" name="Picture 35"/>
+          <p:cNvPicPr>
+            <a:picLocks noChangeAspect="1"/>
+          </p:cNvPicPr>
+          <p:nvPr/>
+        </p:nvPicPr>
+        <p:blipFill>
+          <a:blip r:embed="rId3" cstate="print">
+            <a:duotone>
+              <a:prstClr val="black"/>
+              <a:srgbClr val="00FF00">
+                <a:tint val="45000"/>
+                <a:satMod val="400000"/>
+              </a:srgbClr>
+            </a:duotone>
+            <a:extLst>
+              <a:ext uri="{28A0092B-C50C-407E-A947-70E740481C1C}">
+                <a14:useLocalDpi xmlns:a14="http://schemas.microsoft.com/office/drawing/2010/main" val="0"/>
+              </a:ext>
+            </a:extLst>
+          </a:blip>
+          <a:stretch>
+            <a:fillRect/>
+          </a:stretch>
+        </p:blipFill>
+        <p:spPr>
+          <a:xfrm>
+            <a:off x="4430037" y="2663887"/>
+            <a:ext cx="976119" cy="946591"/>
+          </a:xfrm>
+          <a:prstGeom prst="rect">
+            <a:avLst/>
+          </a:prstGeom>
+        </p:spPr>
+      </p:pic>
+      <p:pic>
+        <p:nvPicPr>
+          <p:cNvPr id="37" name="Picture 36"/>
+          <p:cNvPicPr>
+            <a:picLocks noChangeAspect="1"/>
+          </p:cNvPicPr>
+          <p:nvPr/>
+        </p:nvPicPr>
+        <p:blipFill>
+          <a:blip r:embed="rId3" cstate="print">
+            <a:duotone>
+              <a:prstClr val="black"/>
+              <a:srgbClr val="00FF00">
+                <a:tint val="45000"/>
+                <a:satMod val="400000"/>
+              </a:srgbClr>
+            </a:duotone>
+            <a:extLst>
+              <a:ext uri="{28A0092B-C50C-407E-A947-70E740481C1C}">
+                <a14:useLocalDpi xmlns:a14="http://schemas.microsoft.com/office/drawing/2010/main" val="0"/>
+              </a:ext>
+            </a:extLst>
+          </a:blip>
+          <a:stretch>
+            <a:fillRect/>
+          </a:stretch>
+        </p:blipFill>
+        <p:spPr>
+          <a:xfrm>
+            <a:off x="2477799" y="2663886"/>
+            <a:ext cx="976119" cy="946591"/>
+          </a:xfrm>
+          <a:prstGeom prst="rect">
+            <a:avLst/>
+          </a:prstGeom>
+        </p:spPr>
+      </p:pic>
+      <p:pic>
+        <p:nvPicPr>
+          <p:cNvPr id="38" name="Picture 37"/>
+          <p:cNvPicPr>
+            <a:picLocks noChangeAspect="1"/>
+          </p:cNvPicPr>
+          <p:nvPr/>
+        </p:nvPicPr>
+        <p:blipFill>
+          <a:blip r:embed="rId3" cstate="print">
+            <a:duotone>
+              <a:prstClr val="black"/>
+              <a:srgbClr val="FF99CC">
+                <a:tint val="45000"/>
+                <a:satMod val="400000"/>
+              </a:srgbClr>
+            </a:duotone>
+            <a:extLst>
+              <a:ext uri="{28A0092B-C50C-407E-A947-70E740481C1C}">
+                <a14:useLocalDpi xmlns:a14="http://schemas.microsoft.com/office/drawing/2010/main" val="0"/>
+              </a:ext>
+            </a:extLst>
+          </a:blip>
+          <a:stretch>
+            <a:fillRect/>
+          </a:stretch>
+        </p:blipFill>
+        <p:spPr>
+          <a:xfrm>
+            <a:off x="3453918" y="3718013"/>
+            <a:ext cx="976119" cy="946591"/>
+          </a:xfrm>
+          <a:prstGeom prst="rect">
+            <a:avLst/>
+          </a:prstGeom>
+        </p:spPr>
+      </p:pic>
+      <p:pic>
+        <p:nvPicPr>
+          <p:cNvPr id="39" name="Picture 38"/>
+          <p:cNvPicPr>
+            <a:picLocks noChangeAspect="1"/>
+          </p:cNvPicPr>
+          <p:nvPr/>
+        </p:nvPicPr>
+        <p:blipFill>
+          <a:blip r:embed="rId3" cstate="print">
+            <a:duotone>
+              <a:prstClr val="black"/>
+              <a:srgbClr val="FF99CC">
+                <a:tint val="45000"/>
+                <a:satMod val="400000"/>
+              </a:srgbClr>
+            </a:duotone>
+            <a:extLst>
+              <a:ext uri="{28A0092B-C50C-407E-A947-70E740481C1C}">
+                <a14:useLocalDpi xmlns:a14="http://schemas.microsoft.com/office/drawing/2010/main" val="0"/>
+              </a:ext>
+            </a:extLst>
+          </a:blip>
+          <a:stretch>
+            <a:fillRect/>
+          </a:stretch>
+        </p:blipFill>
+        <p:spPr>
+          <a:xfrm>
+            <a:off x="4430037" y="3718013"/>
+            <a:ext cx="976119" cy="946591"/>
+          </a:xfrm>
+          <a:prstGeom prst="rect">
+            <a:avLst/>
+          </a:prstGeom>
+        </p:spPr>
+      </p:pic>
+      <p:pic>
+        <p:nvPicPr>
+          <p:cNvPr id="40" name="Picture 39"/>
+          <p:cNvPicPr>
+            <a:picLocks noChangeAspect="1"/>
+          </p:cNvPicPr>
+          <p:nvPr/>
+        </p:nvPicPr>
+        <p:blipFill>
+          <a:blip r:embed="rId3" cstate="print">
+            <a:duotone>
+              <a:prstClr val="black"/>
+              <a:srgbClr val="FF99CC">
+                <a:tint val="45000"/>
+                <a:satMod val="400000"/>
+              </a:srgbClr>
+            </a:duotone>
+            <a:extLst>
+              <a:ext uri="{28A0092B-C50C-407E-A947-70E740481C1C}">
+                <a14:useLocalDpi xmlns:a14="http://schemas.microsoft.com/office/drawing/2010/main" val="0"/>
+              </a:ext>
+            </a:extLst>
+          </a:blip>
+          <a:stretch>
+            <a:fillRect/>
+          </a:stretch>
+        </p:blipFill>
+        <p:spPr>
+          <a:xfrm>
+            <a:off x="2477799" y="3718012"/>
+            <a:ext cx="976119" cy="946591"/>
+          </a:xfrm>
+          <a:prstGeom prst="rect">
+            <a:avLst/>
+          </a:prstGeom>
+        </p:spPr>
+      </p:pic>
+      <p:sp>
+        <p:nvSpPr>
+          <p:cNvPr id="41" name="TextBox 40">
+            <a:extLst>
+              <a:ext uri="{FF2B5EF4-FFF2-40B4-BE49-F238E27FC236}">
+                <a16:creationId xmlns:a16="http://schemas.microsoft.com/office/drawing/2014/main" id="{ACA4C32D-846A-5640-99D6-B15DA7393D6B}"/>
+              </a:ext>
+            </a:extLst>
+          </p:cNvPr>
+          <p:cNvSpPr txBox="1"/>
+          <p:nvPr/>
+        </p:nvSpPr>
+        <p:spPr>
+          <a:xfrm>
+            <a:off x="492369" y="5891322"/>
+            <a:ext cx="11230708" cy="523220"/>
+          </a:xfrm>
+          <a:prstGeom prst="rect">
+            <a:avLst/>
+          </a:prstGeom>
+          <a:noFill/>
+        </p:spPr>
+        <p:txBody>
+          <a:bodyPr wrap="square" rtlCol="0">
+            <a:spAutoFit/>
+          </a:bodyPr>
+          <a:lstStyle/>
+          <a:p>
+            <a:r>
+              <a:rPr lang="en-GB" sz="2800" dirty="0"/>
+              <a:t>The green card is the card where all of the objects are hats. </a:t>
+            </a:r>
+          </a:p>
+        </p:txBody>
+      </p:sp>
+    </p:spTree>
+    <p:extLst>
+      <p:ext uri="{BB962C8B-B14F-4D97-AF65-F5344CB8AC3E}">
+        <p14:creationId xmlns:p14="http://schemas.microsoft.com/office/powerpoint/2010/main" val="2643592233"/>
+      </p:ext>
+    </p:extLst>
+  </p:cSld>
+  <p:clrMapOvr>
+    <a:masterClrMapping/>
+  </p:clrMapOvr>
+</p:sld>
+</file>
+
+<file path=ppt/slides/slide54.xml><?xml version="1.0" encoding="utf-8"?>
+<p:sld xmlns:a="http://schemas.openxmlformats.org/drawingml/2006/main" xmlns:r="http://schemas.openxmlformats.org/officeDocument/2006/relationships" xmlns:p="http://schemas.openxmlformats.org/presentationml/2006/main">
+  <p:cSld>
+    <p:spTree>
+      <p:nvGrpSpPr>
+        <p:cNvPr id="1" name=""/>
+        <p:cNvGrpSpPr/>
+        <p:nvPr/>
+      </p:nvGrpSpPr>
+      <p:grpSpPr>
+        <a:xfrm>
+          <a:off x="0" y="0"/>
+          <a:ext cx="0" cy="0"/>
+          <a:chOff x="0" y="0"/>
+          <a:chExt cx="0" cy="0"/>
+        </a:xfrm>
+      </p:grpSpPr>
+      <p:sp>
+        <p:nvSpPr>
+          <p:cNvPr id="34" name="TextBox 33"/>
+          <p:cNvSpPr txBox="1"/>
+          <p:nvPr/>
+        </p:nvSpPr>
+        <p:spPr>
+          <a:xfrm>
+            <a:off x="-1" y="0"/>
+            <a:ext cx="6188529" cy="523220"/>
+          </a:xfrm>
+          <a:prstGeom prst="rect">
+            <a:avLst/>
+          </a:prstGeom>
+          <a:noFill/>
+        </p:spPr>
+        <p:txBody>
+          <a:bodyPr wrap="square" rtlCol="0">
+            <a:spAutoFit/>
+          </a:bodyPr>
+          <a:lstStyle/>
+          <a:p>
+            <a:r>
+              <a:rPr lang="en-GB" sz="2800" dirty="0"/>
+              <a:t>Guesser Training 2 – all ambiguous</a:t>
+            </a:r>
+          </a:p>
+        </p:txBody>
+      </p:sp>
+      <p:sp>
+        <p:nvSpPr>
+          <p:cNvPr id="41" name="TextBox 40">
+            <a:extLst>
+              <a:ext uri="{FF2B5EF4-FFF2-40B4-BE49-F238E27FC236}">
+                <a16:creationId xmlns:a16="http://schemas.microsoft.com/office/drawing/2014/main" id="{ACA4C32D-846A-5640-99D6-B15DA7393D6B}"/>
+              </a:ext>
+            </a:extLst>
+          </p:cNvPr>
+          <p:cNvSpPr txBox="1"/>
+          <p:nvPr/>
+        </p:nvSpPr>
+        <p:spPr>
+          <a:xfrm>
+            <a:off x="492369" y="5891322"/>
+            <a:ext cx="11230708" cy="523220"/>
+          </a:xfrm>
+          <a:prstGeom prst="rect">
+            <a:avLst/>
+          </a:prstGeom>
+          <a:noFill/>
+        </p:spPr>
+        <p:txBody>
+          <a:bodyPr wrap="square" rtlCol="0">
+            <a:spAutoFit/>
+          </a:bodyPr>
+          <a:lstStyle/>
+          <a:p>
+            <a:r>
+              <a:rPr lang="en-GB" sz="2800" dirty="0"/>
+              <a:t>The green card is the card where all of the objects are </a:t>
+            </a:r>
+            <a:r>
+              <a:rPr lang="en-GB" sz="2800" dirty="0" err="1"/>
+              <a:t>colored</a:t>
+            </a:r>
+            <a:r>
+              <a:rPr lang="en-GB" sz="2800" dirty="0"/>
+              <a:t>. </a:t>
+            </a:r>
+          </a:p>
+        </p:txBody>
+      </p:sp>
+      <p:sp>
+        <p:nvSpPr>
+          <p:cNvPr id="32" name="Rectangle 31">
+            <a:extLst>
+              <a:ext uri="{FF2B5EF4-FFF2-40B4-BE49-F238E27FC236}">
+                <a16:creationId xmlns:a16="http://schemas.microsoft.com/office/drawing/2014/main" id="{616763E9-63E9-CF4D-95BF-6552DAF91F92}"/>
+              </a:ext>
+            </a:extLst>
+          </p:cNvPr>
+          <p:cNvSpPr>
+            <a:spLocks/>
+          </p:cNvSpPr>
+          <p:nvPr/>
+        </p:nvSpPr>
+        <p:spPr>
+          <a:xfrm>
+            <a:off x="2308160" y="1290040"/>
+            <a:ext cx="3600000" cy="3600000"/>
+          </a:xfrm>
+          <a:prstGeom prst="rect">
+            <a:avLst/>
+          </a:prstGeom>
+          <a:noFill/>
+          <a:ln w="190500">
+            <a:solidFill>
+              <a:schemeClr val="tx1">
+                <a:lumMod val="85000"/>
+                <a:lumOff val="15000"/>
+              </a:schemeClr>
+            </a:solidFill>
+          </a:ln>
+        </p:spPr>
+        <p:style>
+          <a:lnRef idx="2">
+            <a:schemeClr val="accent1">
+              <a:shade val="50000"/>
+            </a:schemeClr>
+          </a:lnRef>
+          <a:fillRef idx="1">
+            <a:schemeClr val="accent1"/>
+          </a:fillRef>
+          <a:effectRef idx="0">
+            <a:schemeClr val="accent1"/>
+          </a:effectRef>
+          <a:fontRef idx="minor">
+            <a:schemeClr val="lt1"/>
+          </a:fontRef>
+        </p:style>
+        <p:txBody>
+          <a:bodyPr rtlCol="0" anchor="ctr"/>
+          <a:lstStyle/>
+          <a:p>
+            <a:pPr algn="ctr"/>
+            <a:endParaRPr lang="en-GB"/>
+          </a:p>
+        </p:txBody>
+      </p:sp>
+      <p:sp>
+        <p:nvSpPr>
+          <p:cNvPr id="42" name="Rectangle 41">
+            <a:extLst>
+              <a:ext uri="{FF2B5EF4-FFF2-40B4-BE49-F238E27FC236}">
+                <a16:creationId xmlns:a16="http://schemas.microsoft.com/office/drawing/2014/main" id="{AAE378C3-0001-674E-8D03-F591D551CE8B}"/>
+              </a:ext>
+            </a:extLst>
+          </p:cNvPr>
+          <p:cNvSpPr>
+            <a:spLocks/>
+          </p:cNvSpPr>
+          <p:nvPr/>
+        </p:nvSpPr>
+        <p:spPr>
+          <a:xfrm>
+            <a:off x="6436693" y="1287815"/>
+            <a:ext cx="3600000" cy="3600000"/>
+          </a:xfrm>
+          <a:prstGeom prst="rect">
+            <a:avLst/>
+          </a:prstGeom>
+          <a:noFill/>
+          <a:ln w="190500">
+            <a:solidFill>
+              <a:schemeClr val="tx1">
+                <a:lumMod val="85000"/>
+                <a:lumOff val="15000"/>
+              </a:schemeClr>
+            </a:solidFill>
+          </a:ln>
+        </p:spPr>
+        <p:style>
+          <a:lnRef idx="2">
+            <a:schemeClr val="accent1">
+              <a:shade val="50000"/>
+            </a:schemeClr>
+          </a:lnRef>
+          <a:fillRef idx="1">
+            <a:schemeClr val="accent1"/>
+          </a:fillRef>
+          <a:effectRef idx="0">
+            <a:schemeClr val="accent1"/>
+          </a:effectRef>
+          <a:fontRef idx="minor">
+            <a:schemeClr val="lt1"/>
+          </a:fontRef>
+        </p:style>
+        <p:txBody>
+          <a:bodyPr rtlCol="0" anchor="ctr"/>
+          <a:lstStyle/>
+          <a:p>
+            <a:pPr algn="ctr"/>
+            <a:endParaRPr lang="en-GB" dirty="0">
+              <a:solidFill>
+                <a:schemeClr val="bg2">
+                  <a:lumMod val="75000"/>
+                </a:schemeClr>
+              </a:solidFill>
+              <a:latin typeface="Arial" panose="020B0604020202020204" pitchFamily="34" charset="0"/>
+              <a:cs typeface="Arial" panose="020B0604020202020204" pitchFamily="34" charset="0"/>
+            </a:endParaRPr>
+          </a:p>
+        </p:txBody>
+      </p:sp>
+      <p:pic>
+        <p:nvPicPr>
+          <p:cNvPr id="43" name="Picture 42">
+            <a:extLst>
+              <a:ext uri="{FF2B5EF4-FFF2-40B4-BE49-F238E27FC236}">
+                <a16:creationId xmlns:a16="http://schemas.microsoft.com/office/drawing/2014/main" id="{B9530BCD-C4F0-3F43-AFDD-9E79F24B53F2}"/>
+              </a:ext>
+            </a:extLst>
+          </p:cNvPr>
+          <p:cNvPicPr>
+            <a:picLocks noChangeAspect="1"/>
+          </p:cNvPicPr>
+          <p:nvPr/>
+        </p:nvPicPr>
+        <p:blipFill>
+          <a:blip r:embed="rId3" cstate="print">
+            <a:duotone>
+              <a:prstClr val="black"/>
+              <a:srgbClr val="0099FF">
+                <a:tint val="45000"/>
+                <a:satMod val="400000"/>
+              </a:srgbClr>
+            </a:duotone>
+            <a:extLst>
+              <a:ext uri="{28A0092B-C50C-407E-A947-70E740481C1C}">
+                <a14:useLocalDpi xmlns:a14="http://schemas.microsoft.com/office/drawing/2010/main" val="0"/>
+              </a:ext>
+            </a:extLst>
+          </a:blip>
+          <a:stretch>
+            <a:fillRect/>
+          </a:stretch>
+        </p:blipFill>
+        <p:spPr>
+          <a:xfrm>
+            <a:off x="7701976" y="2758060"/>
+            <a:ext cx="1073825" cy="656823"/>
+          </a:xfrm>
+          <a:prstGeom prst="rect">
+            <a:avLst/>
+          </a:prstGeom>
+        </p:spPr>
+      </p:pic>
+      <p:pic>
+        <p:nvPicPr>
+          <p:cNvPr id="44" name="Picture 43">
+            <a:extLst>
+              <a:ext uri="{FF2B5EF4-FFF2-40B4-BE49-F238E27FC236}">
+                <a16:creationId xmlns:a16="http://schemas.microsoft.com/office/drawing/2014/main" id="{7AB07731-B763-9D48-ACAD-6B281F92C3CB}"/>
+              </a:ext>
+            </a:extLst>
+          </p:cNvPr>
+          <p:cNvPicPr>
+            <a:picLocks noChangeAspect="1"/>
+          </p:cNvPicPr>
+          <p:nvPr/>
+        </p:nvPicPr>
+        <p:blipFill>
+          <a:blip r:embed="rId4">
+            <a:duotone>
+              <a:prstClr val="black"/>
+              <a:srgbClr val="0099FF">
+                <a:tint val="45000"/>
+                <a:satMod val="400000"/>
+              </a:srgbClr>
+            </a:duotone>
+            <a:extLst>
+              <a:ext uri="{28A0092B-C50C-407E-A947-70E740481C1C}">
+                <a14:useLocalDpi xmlns:a14="http://schemas.microsoft.com/office/drawing/2010/main" val="0"/>
+              </a:ext>
+            </a:extLst>
+          </a:blip>
+          <a:stretch>
+            <a:fillRect/>
+          </a:stretch>
+        </p:blipFill>
+        <p:spPr>
+          <a:xfrm>
+            <a:off x="3960891" y="3634360"/>
+            <a:ext cx="355190" cy="1139573"/>
+          </a:xfrm>
+          <a:prstGeom prst="rect">
+            <a:avLst/>
+          </a:prstGeom>
+        </p:spPr>
+      </p:pic>
+      <p:pic>
+        <p:nvPicPr>
+          <p:cNvPr id="45" name="Picture 44">
+            <a:extLst>
+              <a:ext uri="{FF2B5EF4-FFF2-40B4-BE49-F238E27FC236}">
+                <a16:creationId xmlns:a16="http://schemas.microsoft.com/office/drawing/2014/main" id="{84FE933D-4236-A44D-BF6F-976AC93E7059}"/>
+              </a:ext>
+            </a:extLst>
+          </p:cNvPr>
+          <p:cNvPicPr>
+            <a:picLocks noChangeAspect="1"/>
+          </p:cNvPicPr>
+          <p:nvPr/>
+        </p:nvPicPr>
+        <p:blipFill>
+          <a:blip r:embed="rId4">
+            <a:duotone>
+              <a:prstClr val="black"/>
+              <a:srgbClr val="FFFF00">
+                <a:tint val="45000"/>
+                <a:satMod val="400000"/>
+              </a:srgbClr>
+            </a:duotone>
+            <a:extLst>
+              <a:ext uri="{28A0092B-C50C-407E-A947-70E740481C1C}">
+                <a14:useLocalDpi xmlns:a14="http://schemas.microsoft.com/office/drawing/2010/main" val="0"/>
+              </a:ext>
+            </a:extLst>
+          </a:blip>
+          <a:stretch>
+            <a:fillRect/>
+          </a:stretch>
+        </p:blipFill>
+        <p:spPr>
+          <a:xfrm>
+            <a:off x="3960891" y="2494787"/>
+            <a:ext cx="355190" cy="1139573"/>
+          </a:xfrm>
+          <a:prstGeom prst="rect">
+            <a:avLst/>
+          </a:prstGeom>
+        </p:spPr>
+      </p:pic>
+      <p:pic>
+        <p:nvPicPr>
+          <p:cNvPr id="46" name="Picture 45">
+            <a:extLst>
+              <a:ext uri="{FF2B5EF4-FFF2-40B4-BE49-F238E27FC236}">
+                <a16:creationId xmlns:a16="http://schemas.microsoft.com/office/drawing/2014/main" id="{37CE010A-C368-C046-805B-93F6DDB3D4B5}"/>
+              </a:ext>
+            </a:extLst>
+          </p:cNvPr>
+          <p:cNvPicPr>
+            <a:picLocks noChangeAspect="1"/>
+          </p:cNvPicPr>
+          <p:nvPr/>
+        </p:nvPicPr>
+        <p:blipFill>
+          <a:blip r:embed="rId4">
+            <a:duotone>
+              <a:prstClr val="black"/>
+              <a:srgbClr val="FFFF00">
+                <a:tint val="45000"/>
+                <a:satMod val="400000"/>
+              </a:srgbClr>
+            </a:duotone>
+            <a:extLst>
+              <a:ext uri="{28A0092B-C50C-407E-A947-70E740481C1C}">
+                <a14:useLocalDpi xmlns:a14="http://schemas.microsoft.com/office/drawing/2010/main" val="0"/>
+              </a:ext>
+            </a:extLst>
+          </a:blip>
+          <a:stretch>
+            <a:fillRect/>
+          </a:stretch>
+        </p:blipFill>
+        <p:spPr>
+          <a:xfrm>
+            <a:off x="3960891" y="1355214"/>
+            <a:ext cx="355190" cy="1139573"/>
+          </a:xfrm>
+          <a:prstGeom prst="rect">
+            <a:avLst/>
+          </a:prstGeom>
+        </p:spPr>
+      </p:pic>
+      <p:pic>
+        <p:nvPicPr>
+          <p:cNvPr id="47" name="Picture 46">
+            <a:extLst>
+              <a:ext uri="{FF2B5EF4-FFF2-40B4-BE49-F238E27FC236}">
+                <a16:creationId xmlns:a16="http://schemas.microsoft.com/office/drawing/2014/main" id="{9DA88B05-AB03-A941-B964-7155854C1343}"/>
+              </a:ext>
+            </a:extLst>
+          </p:cNvPr>
+          <p:cNvPicPr>
+            <a:picLocks noChangeAspect="1"/>
+          </p:cNvPicPr>
+          <p:nvPr/>
+        </p:nvPicPr>
+        <p:blipFill>
+          <a:blip r:embed="rId4">
+            <a:duotone>
+              <a:prstClr val="black"/>
+              <a:srgbClr val="0099FF">
+                <a:tint val="45000"/>
+                <a:satMod val="400000"/>
+              </a:srgbClr>
+            </a:duotone>
+            <a:extLst>
+              <a:ext uri="{28A0092B-C50C-407E-A947-70E740481C1C}">
+                <a14:useLocalDpi xmlns:a14="http://schemas.microsoft.com/office/drawing/2010/main" val="0"/>
+              </a:ext>
+            </a:extLst>
+          </a:blip>
+          <a:stretch>
+            <a:fillRect/>
+          </a:stretch>
+        </p:blipFill>
+        <p:spPr>
+          <a:xfrm>
+            <a:off x="4940213" y="3634360"/>
+            <a:ext cx="355190" cy="1139573"/>
+          </a:xfrm>
+          <a:prstGeom prst="rect">
+            <a:avLst/>
+          </a:prstGeom>
+        </p:spPr>
+      </p:pic>
+      <p:pic>
+        <p:nvPicPr>
+          <p:cNvPr id="48" name="Picture 47">
+            <a:extLst>
+              <a:ext uri="{FF2B5EF4-FFF2-40B4-BE49-F238E27FC236}">
+                <a16:creationId xmlns:a16="http://schemas.microsoft.com/office/drawing/2014/main" id="{7B86AD8E-3633-414E-8A48-8AADDFB31511}"/>
+              </a:ext>
+            </a:extLst>
+          </p:cNvPr>
+          <p:cNvPicPr>
+            <a:picLocks noChangeAspect="1"/>
+          </p:cNvPicPr>
+          <p:nvPr/>
+        </p:nvPicPr>
+        <p:blipFill>
+          <a:blip r:embed="rId4">
+            <a:duotone>
+              <a:prstClr val="black"/>
+              <a:srgbClr val="FFFF00">
+                <a:tint val="45000"/>
+                <a:satMod val="400000"/>
+              </a:srgbClr>
+            </a:duotone>
+            <a:extLst>
+              <a:ext uri="{28A0092B-C50C-407E-A947-70E740481C1C}">
+                <a14:useLocalDpi xmlns:a14="http://schemas.microsoft.com/office/drawing/2010/main" val="0"/>
+              </a:ext>
+            </a:extLst>
+          </a:blip>
+          <a:stretch>
+            <a:fillRect/>
+          </a:stretch>
+        </p:blipFill>
+        <p:spPr>
+          <a:xfrm>
+            <a:off x="4940213" y="2494787"/>
+            <a:ext cx="355190" cy="1139573"/>
+          </a:xfrm>
+          <a:prstGeom prst="rect">
+            <a:avLst/>
+          </a:prstGeom>
+        </p:spPr>
+      </p:pic>
+      <p:pic>
+        <p:nvPicPr>
+          <p:cNvPr id="49" name="Picture 48">
+            <a:extLst>
+              <a:ext uri="{FF2B5EF4-FFF2-40B4-BE49-F238E27FC236}">
+                <a16:creationId xmlns:a16="http://schemas.microsoft.com/office/drawing/2014/main" id="{A8DF51DC-886A-C947-BB25-69BA5CC43320}"/>
+              </a:ext>
+            </a:extLst>
+          </p:cNvPr>
+          <p:cNvPicPr>
+            <a:picLocks noChangeAspect="1"/>
+          </p:cNvPicPr>
+          <p:nvPr/>
+        </p:nvPicPr>
+        <p:blipFill>
+          <a:blip r:embed="rId4">
+            <a:duotone>
+              <a:prstClr val="black"/>
+              <a:srgbClr val="FFFF00">
+                <a:tint val="45000"/>
+                <a:satMod val="400000"/>
+              </a:srgbClr>
+            </a:duotone>
+            <a:extLst>
+              <a:ext uri="{28A0092B-C50C-407E-A947-70E740481C1C}">
+                <a14:useLocalDpi xmlns:a14="http://schemas.microsoft.com/office/drawing/2010/main" val="0"/>
+              </a:ext>
+            </a:extLst>
+          </a:blip>
+          <a:stretch>
+            <a:fillRect/>
+          </a:stretch>
+        </p:blipFill>
+        <p:spPr>
+          <a:xfrm>
+            <a:off x="4940213" y="1355214"/>
+            <a:ext cx="355190" cy="1139573"/>
+          </a:xfrm>
+          <a:prstGeom prst="rect">
+            <a:avLst/>
+          </a:prstGeom>
+        </p:spPr>
+      </p:pic>
+      <p:pic>
+        <p:nvPicPr>
+          <p:cNvPr id="50" name="Picture 49">
+            <a:extLst>
+              <a:ext uri="{FF2B5EF4-FFF2-40B4-BE49-F238E27FC236}">
+                <a16:creationId xmlns:a16="http://schemas.microsoft.com/office/drawing/2014/main" id="{413BC27F-8622-274A-BCEB-05379969BBBA}"/>
+              </a:ext>
+            </a:extLst>
+          </p:cNvPr>
+          <p:cNvPicPr>
+            <a:picLocks noChangeAspect="1"/>
+          </p:cNvPicPr>
+          <p:nvPr/>
+        </p:nvPicPr>
+        <p:blipFill>
+          <a:blip r:embed="rId4">
+            <a:duotone>
+              <a:prstClr val="black"/>
+              <a:srgbClr val="0099FF">
+                <a:tint val="45000"/>
+                <a:satMod val="400000"/>
+              </a:srgbClr>
+            </a:duotone>
+            <a:extLst>
+              <a:ext uri="{28A0092B-C50C-407E-A947-70E740481C1C}">
+                <a14:useLocalDpi xmlns:a14="http://schemas.microsoft.com/office/drawing/2010/main" val="0"/>
+              </a:ext>
+            </a:extLst>
+          </a:blip>
+          <a:stretch>
+            <a:fillRect/>
+          </a:stretch>
+        </p:blipFill>
+        <p:spPr>
+          <a:xfrm>
+            <a:off x="2956931" y="3634360"/>
+            <a:ext cx="355190" cy="1139573"/>
+          </a:xfrm>
+          <a:prstGeom prst="rect">
+            <a:avLst/>
+          </a:prstGeom>
+        </p:spPr>
+      </p:pic>
+      <p:pic>
+        <p:nvPicPr>
+          <p:cNvPr id="51" name="Picture 50">
+            <a:extLst>
+              <a:ext uri="{FF2B5EF4-FFF2-40B4-BE49-F238E27FC236}">
+                <a16:creationId xmlns:a16="http://schemas.microsoft.com/office/drawing/2014/main" id="{10967A89-6F90-E548-BD78-BFBC0166A398}"/>
+              </a:ext>
+            </a:extLst>
+          </p:cNvPr>
+          <p:cNvPicPr>
+            <a:picLocks noChangeAspect="1"/>
+          </p:cNvPicPr>
+          <p:nvPr/>
+        </p:nvPicPr>
+        <p:blipFill>
+          <a:blip r:embed="rId4">
+            <a:duotone>
+              <a:prstClr val="black"/>
+              <a:srgbClr val="FFFF00">
+                <a:tint val="45000"/>
+                <a:satMod val="400000"/>
+              </a:srgbClr>
+            </a:duotone>
+            <a:extLst>
+              <a:ext uri="{28A0092B-C50C-407E-A947-70E740481C1C}">
+                <a14:useLocalDpi xmlns:a14="http://schemas.microsoft.com/office/drawing/2010/main" val="0"/>
+              </a:ext>
+            </a:extLst>
+          </a:blip>
+          <a:stretch>
+            <a:fillRect/>
+          </a:stretch>
+        </p:blipFill>
+        <p:spPr>
+          <a:xfrm>
+            <a:off x="2956931" y="2494787"/>
+            <a:ext cx="355190" cy="1139573"/>
+          </a:xfrm>
+          <a:prstGeom prst="rect">
+            <a:avLst/>
+          </a:prstGeom>
+        </p:spPr>
+      </p:pic>
+      <p:pic>
+        <p:nvPicPr>
+          <p:cNvPr id="52" name="Picture 51">
+            <a:extLst>
+              <a:ext uri="{FF2B5EF4-FFF2-40B4-BE49-F238E27FC236}">
+                <a16:creationId xmlns:a16="http://schemas.microsoft.com/office/drawing/2014/main" id="{7F88E203-4AF9-4340-A6C9-823EDF9A6D9E}"/>
+              </a:ext>
+            </a:extLst>
+          </p:cNvPr>
+          <p:cNvPicPr>
+            <a:picLocks noChangeAspect="1"/>
+          </p:cNvPicPr>
+          <p:nvPr/>
+        </p:nvPicPr>
+        <p:blipFill>
+          <a:blip r:embed="rId4">
+            <a:duotone>
+              <a:prstClr val="black"/>
+              <a:srgbClr val="FFFF00">
+                <a:tint val="45000"/>
+                <a:satMod val="400000"/>
+              </a:srgbClr>
+            </a:duotone>
+            <a:extLst>
+              <a:ext uri="{28A0092B-C50C-407E-A947-70E740481C1C}">
+                <a14:useLocalDpi xmlns:a14="http://schemas.microsoft.com/office/drawing/2010/main" val="0"/>
+              </a:ext>
+            </a:extLst>
+          </a:blip>
+          <a:stretch>
+            <a:fillRect/>
+          </a:stretch>
+        </p:blipFill>
+        <p:spPr>
+          <a:xfrm>
+            <a:off x="2956931" y="1355214"/>
+            <a:ext cx="355190" cy="1139573"/>
+          </a:xfrm>
+          <a:prstGeom prst="rect">
+            <a:avLst/>
+          </a:prstGeom>
+        </p:spPr>
+      </p:pic>
+      <p:pic>
+        <p:nvPicPr>
+          <p:cNvPr id="53" name="Picture 52">
+            <a:extLst>
+              <a:ext uri="{FF2B5EF4-FFF2-40B4-BE49-F238E27FC236}">
+                <a16:creationId xmlns:a16="http://schemas.microsoft.com/office/drawing/2014/main" id="{614578C8-9D5F-F948-9A32-DE050508BF1F}"/>
+              </a:ext>
+            </a:extLst>
+          </p:cNvPr>
+          <p:cNvPicPr>
+            <a:picLocks noChangeAspect="1"/>
+          </p:cNvPicPr>
+          <p:nvPr/>
+        </p:nvPicPr>
+        <p:blipFill>
+          <a:blip r:embed="rId3" cstate="print">
+            <a:duotone>
+              <a:prstClr val="black"/>
+              <a:srgbClr val="FFFF00">
+                <a:tint val="45000"/>
+                <a:satMod val="400000"/>
+              </a:srgbClr>
+            </a:duotone>
+            <a:extLst>
+              <a:ext uri="{28A0092B-C50C-407E-A947-70E740481C1C}">
+                <a14:useLocalDpi xmlns:a14="http://schemas.microsoft.com/office/drawing/2010/main" val="0"/>
+              </a:ext>
+            </a:extLst>
+          </a:blip>
+          <a:stretch>
+            <a:fillRect/>
+          </a:stretch>
+        </p:blipFill>
+        <p:spPr>
+          <a:xfrm>
+            <a:off x="8819793" y="2758060"/>
+            <a:ext cx="1073825" cy="656823"/>
+          </a:xfrm>
+          <a:prstGeom prst="rect">
+            <a:avLst/>
+          </a:prstGeom>
+        </p:spPr>
+      </p:pic>
+      <p:pic>
+        <p:nvPicPr>
+          <p:cNvPr id="54" name="Picture 53">
+            <a:extLst>
+              <a:ext uri="{FF2B5EF4-FFF2-40B4-BE49-F238E27FC236}">
+                <a16:creationId xmlns:a16="http://schemas.microsoft.com/office/drawing/2014/main" id="{A4BF52AE-547E-4540-8E2D-C8B725793845}"/>
+              </a:ext>
+            </a:extLst>
+          </p:cNvPr>
+          <p:cNvPicPr>
+            <a:picLocks noChangeAspect="1"/>
+          </p:cNvPicPr>
+          <p:nvPr/>
+        </p:nvPicPr>
+        <p:blipFill>
+          <a:blip r:embed="rId3" cstate="print">
+            <a:duotone>
+              <a:prstClr val="black"/>
+              <a:srgbClr val="FFFF00">
+                <a:tint val="45000"/>
+                <a:satMod val="400000"/>
+              </a:srgbClr>
+            </a:duotone>
+            <a:extLst>
+              <a:ext uri="{28A0092B-C50C-407E-A947-70E740481C1C}">
+                <a14:useLocalDpi xmlns:a14="http://schemas.microsoft.com/office/drawing/2010/main" val="0"/>
+              </a:ext>
+            </a:extLst>
+          </a:blip>
+          <a:stretch>
+            <a:fillRect/>
+          </a:stretch>
+        </p:blipFill>
+        <p:spPr>
+          <a:xfrm>
+            <a:off x="6579123" y="2758060"/>
+            <a:ext cx="1073825" cy="656823"/>
+          </a:xfrm>
+          <a:prstGeom prst="rect">
+            <a:avLst/>
+          </a:prstGeom>
+        </p:spPr>
+      </p:pic>
+      <p:pic>
+        <p:nvPicPr>
+          <p:cNvPr id="55" name="Picture 54">
+            <a:extLst>
+              <a:ext uri="{FF2B5EF4-FFF2-40B4-BE49-F238E27FC236}">
+                <a16:creationId xmlns:a16="http://schemas.microsoft.com/office/drawing/2014/main" id="{7B34DD4F-29A8-8342-8AB1-E96F1908BA34}"/>
+              </a:ext>
+            </a:extLst>
+          </p:cNvPr>
+          <p:cNvPicPr>
+            <a:picLocks noChangeAspect="1"/>
+          </p:cNvPicPr>
+          <p:nvPr/>
+        </p:nvPicPr>
+        <p:blipFill>
+          <a:blip r:embed="rId3" cstate="print">
+            <a:duotone>
+              <a:prstClr val="black"/>
+              <a:srgbClr val="FFFF00">
+                <a:tint val="45000"/>
+                <a:satMod val="400000"/>
+              </a:srgbClr>
+            </a:duotone>
+            <a:extLst>
+              <a:ext uri="{28A0092B-C50C-407E-A947-70E740481C1C}">
+                <a14:useLocalDpi xmlns:a14="http://schemas.microsoft.com/office/drawing/2010/main" val="0"/>
+              </a:ext>
+            </a:extLst>
+          </a:blip>
+          <a:stretch>
+            <a:fillRect/>
+          </a:stretch>
+        </p:blipFill>
+        <p:spPr>
+          <a:xfrm>
+            <a:off x="7701976" y="1694526"/>
+            <a:ext cx="1073825" cy="656823"/>
+          </a:xfrm>
+          <a:prstGeom prst="rect">
+            <a:avLst/>
+          </a:prstGeom>
+        </p:spPr>
+      </p:pic>
+      <p:pic>
+        <p:nvPicPr>
+          <p:cNvPr id="56" name="Picture 55">
+            <a:extLst>
+              <a:ext uri="{FF2B5EF4-FFF2-40B4-BE49-F238E27FC236}">
+                <a16:creationId xmlns:a16="http://schemas.microsoft.com/office/drawing/2014/main" id="{3576878D-F0EA-4642-80DB-3182697656E5}"/>
+              </a:ext>
+            </a:extLst>
+          </p:cNvPr>
+          <p:cNvPicPr>
+            <a:picLocks noChangeAspect="1"/>
+          </p:cNvPicPr>
+          <p:nvPr/>
+        </p:nvPicPr>
+        <p:blipFill>
+          <a:blip r:embed="rId3" cstate="print">
+            <a:duotone>
+              <a:prstClr val="black"/>
+              <a:srgbClr val="0099FF">
+                <a:tint val="45000"/>
+                <a:satMod val="400000"/>
+              </a:srgbClr>
+            </a:duotone>
+            <a:extLst>
+              <a:ext uri="{28A0092B-C50C-407E-A947-70E740481C1C}">
+                <a14:useLocalDpi xmlns:a14="http://schemas.microsoft.com/office/drawing/2010/main" val="0"/>
+              </a:ext>
+            </a:extLst>
+          </a:blip>
+          <a:stretch>
+            <a:fillRect/>
+          </a:stretch>
+        </p:blipFill>
+        <p:spPr>
+          <a:xfrm>
+            <a:off x="8819793" y="1694526"/>
+            <a:ext cx="1073825" cy="656823"/>
+          </a:xfrm>
+          <a:prstGeom prst="rect">
+            <a:avLst/>
+          </a:prstGeom>
+        </p:spPr>
+      </p:pic>
+      <p:pic>
+        <p:nvPicPr>
+          <p:cNvPr id="57" name="Picture 56">
+            <a:extLst>
+              <a:ext uri="{FF2B5EF4-FFF2-40B4-BE49-F238E27FC236}">
+                <a16:creationId xmlns:a16="http://schemas.microsoft.com/office/drawing/2014/main" id="{68B43913-0480-234C-BE79-CD99B6674AAB}"/>
+              </a:ext>
+            </a:extLst>
+          </p:cNvPr>
+          <p:cNvPicPr>
+            <a:picLocks noChangeAspect="1"/>
+          </p:cNvPicPr>
+          <p:nvPr/>
+        </p:nvPicPr>
+        <p:blipFill>
+          <a:blip r:embed="rId3" cstate="print">
+            <a:duotone>
+              <a:prstClr val="black"/>
+              <a:srgbClr val="FFFF00">
+                <a:tint val="45000"/>
+                <a:satMod val="400000"/>
+              </a:srgbClr>
+            </a:duotone>
+            <a:extLst>
+              <a:ext uri="{28A0092B-C50C-407E-A947-70E740481C1C}">
+                <a14:useLocalDpi xmlns:a14="http://schemas.microsoft.com/office/drawing/2010/main" val="0"/>
+              </a:ext>
+            </a:extLst>
+          </a:blip>
+          <a:stretch>
+            <a:fillRect/>
+          </a:stretch>
+        </p:blipFill>
+        <p:spPr>
+          <a:xfrm>
+            <a:off x="6579123" y="1694526"/>
+            <a:ext cx="1073825" cy="656823"/>
+          </a:xfrm>
+          <a:prstGeom prst="rect">
+            <a:avLst/>
+          </a:prstGeom>
+        </p:spPr>
+      </p:pic>
+      <p:pic>
+        <p:nvPicPr>
+          <p:cNvPr id="58" name="Picture 57">
+            <a:extLst>
+              <a:ext uri="{FF2B5EF4-FFF2-40B4-BE49-F238E27FC236}">
+                <a16:creationId xmlns:a16="http://schemas.microsoft.com/office/drawing/2014/main" id="{C6BD0824-37EB-DD4D-BEA3-3159A81DC05C}"/>
+              </a:ext>
+            </a:extLst>
+          </p:cNvPr>
+          <p:cNvPicPr>
+            <a:picLocks noChangeAspect="1"/>
+          </p:cNvPicPr>
+          <p:nvPr/>
+        </p:nvPicPr>
+        <p:blipFill>
+          <a:blip r:embed="rId3" cstate="print">
+            <a:duotone>
+              <a:prstClr val="black"/>
+              <a:srgbClr val="FFFF00">
+                <a:tint val="45000"/>
+                <a:satMod val="400000"/>
+              </a:srgbClr>
+            </a:duotone>
+            <a:extLst>
+              <a:ext uri="{28A0092B-C50C-407E-A947-70E740481C1C}">
+                <a14:useLocalDpi xmlns:a14="http://schemas.microsoft.com/office/drawing/2010/main" val="0"/>
+              </a:ext>
+            </a:extLst>
+          </a:blip>
+          <a:stretch>
+            <a:fillRect/>
+          </a:stretch>
+        </p:blipFill>
+        <p:spPr>
+          <a:xfrm>
+            <a:off x="7705541" y="3824768"/>
+            <a:ext cx="1073825" cy="656823"/>
+          </a:xfrm>
+          <a:prstGeom prst="rect">
+            <a:avLst/>
+          </a:prstGeom>
+        </p:spPr>
+      </p:pic>
+      <p:pic>
+        <p:nvPicPr>
+          <p:cNvPr id="59" name="Picture 58">
+            <a:extLst>
+              <a:ext uri="{FF2B5EF4-FFF2-40B4-BE49-F238E27FC236}">
+                <a16:creationId xmlns:a16="http://schemas.microsoft.com/office/drawing/2014/main" id="{68F53F72-06DB-A940-9CC4-18C25959870F}"/>
+              </a:ext>
+            </a:extLst>
+          </p:cNvPr>
+          <p:cNvPicPr>
+            <a:picLocks noChangeAspect="1"/>
+          </p:cNvPicPr>
+          <p:nvPr/>
+        </p:nvPicPr>
+        <p:blipFill>
+          <a:blip r:embed="rId3" cstate="print">
+            <a:duotone>
+              <a:prstClr val="black"/>
+              <a:srgbClr val="FFFF00">
+                <a:tint val="45000"/>
+                <a:satMod val="400000"/>
+              </a:srgbClr>
+            </a:duotone>
+            <a:extLst>
+              <a:ext uri="{28A0092B-C50C-407E-A947-70E740481C1C}">
+                <a14:useLocalDpi xmlns:a14="http://schemas.microsoft.com/office/drawing/2010/main" val="0"/>
+              </a:ext>
+            </a:extLst>
+          </a:blip>
+          <a:stretch>
+            <a:fillRect/>
+          </a:stretch>
+        </p:blipFill>
+        <p:spPr>
+          <a:xfrm>
+            <a:off x="8823358" y="3824768"/>
+            <a:ext cx="1073825" cy="656823"/>
+          </a:xfrm>
+          <a:prstGeom prst="rect">
+            <a:avLst/>
+          </a:prstGeom>
+        </p:spPr>
+      </p:pic>
+      <p:pic>
+        <p:nvPicPr>
+          <p:cNvPr id="60" name="Picture 59">
+            <a:extLst>
+              <a:ext uri="{FF2B5EF4-FFF2-40B4-BE49-F238E27FC236}">
+                <a16:creationId xmlns:a16="http://schemas.microsoft.com/office/drawing/2014/main" id="{4F4574A6-A15A-EB40-BD16-13DB212C6DFD}"/>
+              </a:ext>
+            </a:extLst>
+          </p:cNvPr>
+          <p:cNvPicPr>
+            <a:picLocks noChangeAspect="1"/>
+          </p:cNvPicPr>
+          <p:nvPr/>
+        </p:nvPicPr>
+        <p:blipFill>
+          <a:blip r:embed="rId3" cstate="print">
+            <a:duotone>
+              <a:prstClr val="black"/>
+              <a:srgbClr val="0099FF">
+                <a:tint val="45000"/>
+                <a:satMod val="400000"/>
+              </a:srgbClr>
+            </a:duotone>
+            <a:extLst>
+              <a:ext uri="{28A0092B-C50C-407E-A947-70E740481C1C}">
+                <a14:useLocalDpi xmlns:a14="http://schemas.microsoft.com/office/drawing/2010/main" val="0"/>
+              </a:ext>
+            </a:extLst>
+          </a:blip>
+          <a:stretch>
+            <a:fillRect/>
+          </a:stretch>
+        </p:blipFill>
+        <p:spPr>
+          <a:xfrm>
+            <a:off x="6582688" y="3824768"/>
+            <a:ext cx="1073825" cy="656823"/>
+          </a:xfrm>
+          <a:prstGeom prst="rect">
+            <a:avLst/>
+          </a:prstGeom>
+        </p:spPr>
+      </p:pic>
+    </p:spTree>
+    <p:extLst>
+      <p:ext uri="{BB962C8B-B14F-4D97-AF65-F5344CB8AC3E}">
+        <p14:creationId xmlns:p14="http://schemas.microsoft.com/office/powerpoint/2010/main" val="1044712122"/>
+      </p:ext>
+    </p:extLst>
+  </p:cSld>
+  <p:clrMapOvr>
+    <a:masterClrMapping/>
+  </p:clrMapOvr>
+</p:sld>
+</file>
+
+<file path=ppt/slides/slide55.xml><?xml version="1.0" encoding="utf-8"?>
+<p:sld xmlns:a="http://schemas.openxmlformats.org/drawingml/2006/main" xmlns:r="http://schemas.openxmlformats.org/officeDocument/2006/relationships" xmlns:p="http://schemas.openxmlformats.org/presentationml/2006/main">
+  <p:cSld>
+    <p:spTree>
+      <p:nvGrpSpPr>
+        <p:cNvPr id="1" name=""/>
+        <p:cNvGrpSpPr/>
+        <p:nvPr/>
+      </p:nvGrpSpPr>
+      <p:grpSpPr>
+        <a:xfrm>
+          <a:off x="0" y="0"/>
+          <a:ext cx="0" cy="0"/>
+          <a:chOff x="0" y="0"/>
+          <a:chExt cx="0" cy="0"/>
+        </a:xfrm>
+      </p:grpSpPr>
+      <p:sp>
+        <p:nvSpPr>
+          <p:cNvPr id="34" name="TextBox 33"/>
+          <p:cNvSpPr txBox="1"/>
+          <p:nvPr/>
+        </p:nvSpPr>
+        <p:spPr>
+          <a:xfrm>
+            <a:off x="-1" y="0"/>
+            <a:ext cx="6188529" cy="523220"/>
+          </a:xfrm>
+          <a:prstGeom prst="rect">
+            <a:avLst/>
+          </a:prstGeom>
+          <a:noFill/>
+        </p:spPr>
+        <p:txBody>
+          <a:bodyPr wrap="square" rtlCol="0">
+            <a:spAutoFit/>
+          </a:bodyPr>
+          <a:lstStyle/>
+          <a:p>
+            <a:r>
+              <a:rPr lang="en-GB" sz="2800" dirty="0"/>
+              <a:t>Guesser Training 3 – none true</a:t>
+            </a:r>
+          </a:p>
+        </p:txBody>
+      </p:sp>
+      <p:sp>
+        <p:nvSpPr>
+          <p:cNvPr id="41" name="TextBox 40">
+            <a:extLst>
+              <a:ext uri="{FF2B5EF4-FFF2-40B4-BE49-F238E27FC236}">
+                <a16:creationId xmlns:a16="http://schemas.microsoft.com/office/drawing/2014/main" id="{ACA4C32D-846A-5640-99D6-B15DA7393D6B}"/>
+              </a:ext>
+            </a:extLst>
+          </p:cNvPr>
+          <p:cNvSpPr txBox="1"/>
+          <p:nvPr/>
+        </p:nvSpPr>
+        <p:spPr>
+          <a:xfrm>
+            <a:off x="492369" y="5891322"/>
+            <a:ext cx="11230708" cy="523220"/>
+          </a:xfrm>
+          <a:prstGeom prst="rect">
+            <a:avLst/>
+          </a:prstGeom>
+          <a:noFill/>
+        </p:spPr>
+        <p:txBody>
+          <a:bodyPr wrap="square" rtlCol="0">
+            <a:spAutoFit/>
+          </a:bodyPr>
+          <a:lstStyle/>
+          <a:p>
+            <a:r>
+              <a:rPr lang="en-GB" sz="2800" dirty="0"/>
+              <a:t>The green card is the card where none of the objects are yellow. </a:t>
+            </a:r>
+          </a:p>
+        </p:txBody>
+      </p:sp>
+      <p:sp>
+        <p:nvSpPr>
+          <p:cNvPr id="24" name="Rectangle 23">
+            <a:extLst>
+              <a:ext uri="{FF2B5EF4-FFF2-40B4-BE49-F238E27FC236}">
+                <a16:creationId xmlns:a16="http://schemas.microsoft.com/office/drawing/2014/main" id="{36495A83-1372-A74E-A840-79C6061F3832}"/>
+              </a:ext>
+            </a:extLst>
+          </p:cNvPr>
+          <p:cNvSpPr>
+            <a:spLocks/>
+          </p:cNvSpPr>
+          <p:nvPr/>
+        </p:nvSpPr>
+        <p:spPr>
+          <a:xfrm>
+            <a:off x="2262104" y="1408383"/>
+            <a:ext cx="3600000" cy="3600000"/>
+          </a:xfrm>
+          <a:prstGeom prst="rect">
+            <a:avLst/>
+          </a:prstGeom>
+          <a:noFill/>
+          <a:ln w="190500">
+            <a:solidFill>
+              <a:schemeClr val="tx1">
+                <a:lumMod val="85000"/>
+                <a:lumOff val="15000"/>
+              </a:schemeClr>
+            </a:solidFill>
+          </a:ln>
+        </p:spPr>
+        <p:style>
+          <a:lnRef idx="2">
+            <a:schemeClr val="accent1">
+              <a:shade val="50000"/>
+            </a:schemeClr>
+          </a:lnRef>
+          <a:fillRef idx="1">
+            <a:schemeClr val="accent1"/>
+          </a:fillRef>
+          <a:effectRef idx="0">
+            <a:schemeClr val="accent1"/>
+          </a:effectRef>
+          <a:fontRef idx="minor">
+            <a:schemeClr val="lt1"/>
+          </a:fontRef>
+        </p:style>
+        <p:txBody>
+          <a:bodyPr rtlCol="0" anchor="ctr"/>
+          <a:lstStyle/>
+          <a:p>
+            <a:pPr algn="ctr"/>
+            <a:endParaRPr lang="en-GB"/>
+          </a:p>
+        </p:txBody>
+      </p:sp>
+      <p:sp>
+        <p:nvSpPr>
+          <p:cNvPr id="25" name="Rectangle 24">
+            <a:extLst>
+              <a:ext uri="{FF2B5EF4-FFF2-40B4-BE49-F238E27FC236}">
+                <a16:creationId xmlns:a16="http://schemas.microsoft.com/office/drawing/2014/main" id="{DF9B32FD-1423-EA4F-8F02-3A2E732C50A8}"/>
+              </a:ext>
+            </a:extLst>
+          </p:cNvPr>
+          <p:cNvSpPr>
+            <a:spLocks/>
+          </p:cNvSpPr>
+          <p:nvPr/>
+        </p:nvSpPr>
+        <p:spPr>
+          <a:xfrm>
+            <a:off x="6390637" y="1406158"/>
+            <a:ext cx="3600000" cy="3600000"/>
+          </a:xfrm>
+          <a:prstGeom prst="rect">
+            <a:avLst/>
+          </a:prstGeom>
+          <a:noFill/>
+          <a:ln w="190500">
+            <a:solidFill>
+              <a:schemeClr val="tx1">
+                <a:lumMod val="85000"/>
+                <a:lumOff val="15000"/>
+              </a:schemeClr>
+            </a:solidFill>
+          </a:ln>
+        </p:spPr>
+        <p:style>
+          <a:lnRef idx="2">
+            <a:schemeClr val="accent1">
+              <a:shade val="50000"/>
+            </a:schemeClr>
+          </a:lnRef>
+          <a:fillRef idx="1">
+            <a:schemeClr val="accent1"/>
+          </a:fillRef>
+          <a:effectRef idx="0">
+            <a:schemeClr val="accent1"/>
+          </a:effectRef>
+          <a:fontRef idx="minor">
+            <a:schemeClr val="lt1"/>
+          </a:fontRef>
+        </p:style>
+        <p:txBody>
+          <a:bodyPr rtlCol="0" anchor="ctr"/>
+          <a:lstStyle/>
+          <a:p>
+            <a:pPr algn="ctr"/>
+            <a:endParaRPr lang="en-GB" dirty="0">
+              <a:solidFill>
+                <a:schemeClr val="bg2">
+                  <a:lumMod val="75000"/>
+                </a:schemeClr>
+              </a:solidFill>
+              <a:latin typeface="Arial" panose="020B0604020202020204" pitchFamily="34" charset="0"/>
+              <a:cs typeface="Arial" panose="020B0604020202020204" pitchFamily="34" charset="0"/>
+            </a:endParaRPr>
+          </a:p>
+        </p:txBody>
+      </p:sp>
+      <p:pic>
+        <p:nvPicPr>
+          <p:cNvPr id="26" name="Picture 25">
+            <a:extLst>
+              <a:ext uri="{FF2B5EF4-FFF2-40B4-BE49-F238E27FC236}">
+                <a16:creationId xmlns:a16="http://schemas.microsoft.com/office/drawing/2014/main" id="{346CEEC6-B0D8-F744-8686-1B22F72305CC}"/>
+              </a:ext>
+            </a:extLst>
+          </p:cNvPr>
+          <p:cNvPicPr>
+            <a:picLocks noChangeAspect="1"/>
+          </p:cNvPicPr>
+          <p:nvPr/>
+        </p:nvPicPr>
+        <p:blipFill>
+          <a:blip r:embed="rId3">
+            <a:duotone>
+              <a:prstClr val="black"/>
+              <a:srgbClr val="FFFF00">
+                <a:tint val="45000"/>
+                <a:satMod val="400000"/>
+              </a:srgbClr>
+            </a:duotone>
+            <a:extLst>
+              <a:ext uri="{28A0092B-C50C-407E-A947-70E740481C1C}">
+                <a14:useLocalDpi xmlns:a14="http://schemas.microsoft.com/office/drawing/2010/main" val="0"/>
+              </a:ext>
+            </a:extLst>
+          </a:blip>
+          <a:stretch>
+            <a:fillRect/>
+          </a:stretch>
+        </p:blipFill>
+        <p:spPr>
+          <a:xfrm>
+            <a:off x="3772306" y="2686879"/>
+            <a:ext cx="579596" cy="1038557"/>
+          </a:xfrm>
+          <a:prstGeom prst="rect">
+            <a:avLst/>
+          </a:prstGeom>
+        </p:spPr>
+      </p:pic>
+      <p:pic>
+        <p:nvPicPr>
+          <p:cNvPr id="27" name="Picture 26">
+            <a:extLst>
+              <a:ext uri="{FF2B5EF4-FFF2-40B4-BE49-F238E27FC236}">
+                <a16:creationId xmlns:a16="http://schemas.microsoft.com/office/drawing/2014/main" id="{8598E4CF-1A56-7446-ACF1-1B084F5E85F1}"/>
+              </a:ext>
+            </a:extLst>
+          </p:cNvPr>
+          <p:cNvPicPr>
+            <a:picLocks noChangeAspect="1"/>
+          </p:cNvPicPr>
+          <p:nvPr/>
+        </p:nvPicPr>
+        <p:blipFill>
+          <a:blip r:embed="rId4">
+            <a:duotone>
+              <a:prstClr val="black"/>
+              <a:srgbClr val="FF99CC">
+                <a:tint val="45000"/>
+                <a:satMod val="400000"/>
+              </a:srgbClr>
+            </a:duotone>
+            <a:extLst>
+              <a:ext uri="{28A0092B-C50C-407E-A947-70E740481C1C}">
+                <a14:useLocalDpi xmlns:a14="http://schemas.microsoft.com/office/drawing/2010/main" val="0"/>
+              </a:ext>
+            </a:extLst>
+          </a:blip>
+          <a:stretch>
+            <a:fillRect/>
+          </a:stretch>
+        </p:blipFill>
+        <p:spPr>
+          <a:xfrm>
+            <a:off x="7708968" y="2798104"/>
+            <a:ext cx="963338" cy="906671"/>
+          </a:xfrm>
+          <a:prstGeom prst="rect">
+            <a:avLst/>
+          </a:prstGeom>
+        </p:spPr>
+      </p:pic>
+      <p:pic>
+        <p:nvPicPr>
+          <p:cNvPr id="28" name="Picture 27">
+            <a:extLst>
+              <a:ext uri="{FF2B5EF4-FFF2-40B4-BE49-F238E27FC236}">
+                <a16:creationId xmlns:a16="http://schemas.microsoft.com/office/drawing/2014/main" id="{39FDEB21-1C62-404F-8BB4-E907BFFA76C6}"/>
+              </a:ext>
+            </a:extLst>
+          </p:cNvPr>
+          <p:cNvPicPr>
+            <a:picLocks noChangeAspect="1"/>
+          </p:cNvPicPr>
+          <p:nvPr/>
+        </p:nvPicPr>
+        <p:blipFill>
+          <a:blip r:embed="rId3">
+            <a:duotone>
+              <a:prstClr val="black"/>
+              <a:srgbClr val="FFFF00">
+                <a:tint val="45000"/>
+                <a:satMod val="400000"/>
+              </a:srgbClr>
+            </a:duotone>
+            <a:extLst>
+              <a:ext uri="{28A0092B-C50C-407E-A947-70E740481C1C}">
+                <a14:useLocalDpi xmlns:a14="http://schemas.microsoft.com/office/drawing/2010/main" val="0"/>
+              </a:ext>
+            </a:extLst>
+          </a:blip>
+          <a:stretch>
+            <a:fillRect/>
+          </a:stretch>
+        </p:blipFill>
+        <p:spPr>
+          <a:xfrm>
+            <a:off x="3772306" y="1570436"/>
+            <a:ext cx="579596" cy="1038557"/>
+          </a:xfrm>
+          <a:prstGeom prst="rect">
+            <a:avLst/>
+          </a:prstGeom>
+        </p:spPr>
+      </p:pic>
+      <p:pic>
+        <p:nvPicPr>
+          <p:cNvPr id="29" name="Picture 28">
+            <a:extLst>
+              <a:ext uri="{FF2B5EF4-FFF2-40B4-BE49-F238E27FC236}">
+                <a16:creationId xmlns:a16="http://schemas.microsoft.com/office/drawing/2014/main" id="{7DA2E763-E8BE-BB4E-B2EE-33E9C839B06A}"/>
+              </a:ext>
+            </a:extLst>
+          </p:cNvPr>
+          <p:cNvPicPr>
+            <a:picLocks noChangeAspect="1"/>
+          </p:cNvPicPr>
+          <p:nvPr/>
+        </p:nvPicPr>
+        <p:blipFill>
+          <a:blip r:embed="rId3">
+            <a:duotone>
+              <a:prstClr val="black"/>
+              <a:srgbClr val="FFFF00">
+                <a:tint val="45000"/>
+                <a:satMod val="400000"/>
+              </a:srgbClr>
+            </a:duotone>
+            <a:extLst>
+              <a:ext uri="{28A0092B-C50C-407E-A947-70E740481C1C}">
+                <a14:useLocalDpi xmlns:a14="http://schemas.microsoft.com/office/drawing/2010/main" val="0"/>
+              </a:ext>
+            </a:extLst>
+          </a:blip>
+          <a:stretch>
+            <a:fillRect/>
+          </a:stretch>
+        </p:blipFill>
+        <p:spPr>
+          <a:xfrm>
+            <a:off x="3772306" y="3847089"/>
+            <a:ext cx="579596" cy="1038557"/>
+          </a:xfrm>
+          <a:prstGeom prst="rect">
+            <a:avLst/>
+          </a:prstGeom>
+        </p:spPr>
+      </p:pic>
+      <p:pic>
+        <p:nvPicPr>
+          <p:cNvPr id="30" name="Picture 29">
+            <a:extLst>
+              <a:ext uri="{FF2B5EF4-FFF2-40B4-BE49-F238E27FC236}">
+                <a16:creationId xmlns:a16="http://schemas.microsoft.com/office/drawing/2014/main" id="{CC4456C2-EADF-6341-B667-023DBA74DC68}"/>
+              </a:ext>
+            </a:extLst>
+          </p:cNvPr>
+          <p:cNvPicPr>
+            <a:picLocks noChangeAspect="1"/>
+          </p:cNvPicPr>
+          <p:nvPr/>
+        </p:nvPicPr>
+        <p:blipFill>
+          <a:blip r:embed="rId3">
+            <a:duotone>
+              <a:prstClr val="black"/>
+              <a:srgbClr val="FFFF00">
+                <a:tint val="45000"/>
+                <a:satMod val="400000"/>
+              </a:srgbClr>
+            </a:duotone>
+            <a:extLst>
+              <a:ext uri="{28A0092B-C50C-407E-A947-70E740481C1C}">
+                <a14:useLocalDpi xmlns:a14="http://schemas.microsoft.com/office/drawing/2010/main" val="0"/>
+              </a:ext>
+            </a:extLst>
+          </a:blip>
+          <a:stretch>
+            <a:fillRect/>
+          </a:stretch>
+        </p:blipFill>
+        <p:spPr>
+          <a:xfrm>
+            <a:off x="4797961" y="2686879"/>
+            <a:ext cx="579596" cy="1038557"/>
+          </a:xfrm>
+          <a:prstGeom prst="rect">
+            <a:avLst/>
+          </a:prstGeom>
+        </p:spPr>
+      </p:pic>
+      <p:pic>
+        <p:nvPicPr>
+          <p:cNvPr id="31" name="Picture 30">
+            <a:extLst>
+              <a:ext uri="{FF2B5EF4-FFF2-40B4-BE49-F238E27FC236}">
+                <a16:creationId xmlns:a16="http://schemas.microsoft.com/office/drawing/2014/main" id="{BF0BFB68-7A92-7141-9A7E-82293FDA604E}"/>
+              </a:ext>
+            </a:extLst>
+          </p:cNvPr>
+          <p:cNvPicPr>
+            <a:picLocks noChangeAspect="1"/>
+          </p:cNvPicPr>
+          <p:nvPr/>
+        </p:nvPicPr>
+        <p:blipFill>
+          <a:blip r:embed="rId3">
+            <a:duotone>
+              <a:prstClr val="black"/>
+              <a:srgbClr val="FFFF00">
+                <a:tint val="45000"/>
+                <a:satMod val="400000"/>
+              </a:srgbClr>
+            </a:duotone>
+            <a:extLst>
+              <a:ext uri="{28A0092B-C50C-407E-A947-70E740481C1C}">
+                <a14:useLocalDpi xmlns:a14="http://schemas.microsoft.com/office/drawing/2010/main" val="0"/>
+              </a:ext>
+            </a:extLst>
+          </a:blip>
+          <a:stretch>
+            <a:fillRect/>
+          </a:stretch>
+        </p:blipFill>
+        <p:spPr>
+          <a:xfrm>
+            <a:off x="4797961" y="1570436"/>
+            <a:ext cx="579596" cy="1038557"/>
+          </a:xfrm>
+          <a:prstGeom prst="rect">
+            <a:avLst/>
+          </a:prstGeom>
+        </p:spPr>
+      </p:pic>
+      <p:pic>
+        <p:nvPicPr>
+          <p:cNvPr id="33" name="Picture 32">
+            <a:extLst>
+              <a:ext uri="{FF2B5EF4-FFF2-40B4-BE49-F238E27FC236}">
+                <a16:creationId xmlns:a16="http://schemas.microsoft.com/office/drawing/2014/main" id="{EAE65E39-EFF3-7D46-8D2A-B9DB8AEE91AA}"/>
+              </a:ext>
+            </a:extLst>
+          </p:cNvPr>
+          <p:cNvPicPr>
+            <a:picLocks noChangeAspect="1"/>
+          </p:cNvPicPr>
+          <p:nvPr/>
+        </p:nvPicPr>
+        <p:blipFill>
+          <a:blip r:embed="rId3">
+            <a:duotone>
+              <a:prstClr val="black"/>
+              <a:srgbClr val="FFFF00">
+                <a:tint val="45000"/>
+                <a:satMod val="400000"/>
+              </a:srgbClr>
+            </a:duotone>
+            <a:extLst>
+              <a:ext uri="{28A0092B-C50C-407E-A947-70E740481C1C}">
+                <a14:useLocalDpi xmlns:a14="http://schemas.microsoft.com/office/drawing/2010/main" val="0"/>
+              </a:ext>
+            </a:extLst>
+          </a:blip>
+          <a:stretch>
+            <a:fillRect/>
+          </a:stretch>
+        </p:blipFill>
+        <p:spPr>
+          <a:xfrm>
+            <a:off x="4797961" y="3847089"/>
+            <a:ext cx="579596" cy="1038557"/>
+          </a:xfrm>
+          <a:prstGeom prst="rect">
+            <a:avLst/>
+          </a:prstGeom>
+        </p:spPr>
+      </p:pic>
+      <p:pic>
+        <p:nvPicPr>
+          <p:cNvPr id="35" name="Picture 34">
+            <a:extLst>
+              <a:ext uri="{FF2B5EF4-FFF2-40B4-BE49-F238E27FC236}">
+                <a16:creationId xmlns:a16="http://schemas.microsoft.com/office/drawing/2014/main" id="{3B452770-52C8-0949-BC08-F3284A5B25D7}"/>
+              </a:ext>
+            </a:extLst>
+          </p:cNvPr>
+          <p:cNvPicPr>
+            <a:picLocks noChangeAspect="1"/>
+          </p:cNvPicPr>
+          <p:nvPr/>
+        </p:nvPicPr>
+        <p:blipFill>
+          <a:blip r:embed="rId4">
+            <a:duotone>
+              <a:prstClr val="black"/>
+              <a:srgbClr val="FF99CC">
+                <a:tint val="45000"/>
+                <a:satMod val="400000"/>
+              </a:srgbClr>
+            </a:duotone>
+            <a:extLst>
+              <a:ext uri="{28A0092B-C50C-407E-A947-70E740481C1C}">
+                <a14:useLocalDpi xmlns:a14="http://schemas.microsoft.com/office/drawing/2010/main" val="0"/>
+              </a:ext>
+            </a:extLst>
+          </a:blip>
+          <a:stretch>
+            <a:fillRect/>
+          </a:stretch>
+        </p:blipFill>
+        <p:spPr>
+          <a:xfrm>
+            <a:off x="8820450" y="2855329"/>
+            <a:ext cx="963338" cy="906671"/>
+          </a:xfrm>
+          <a:prstGeom prst="rect">
+            <a:avLst/>
+          </a:prstGeom>
+        </p:spPr>
+      </p:pic>
+      <p:pic>
+        <p:nvPicPr>
+          <p:cNvPr id="36" name="Picture 35">
+            <a:extLst>
+              <a:ext uri="{FF2B5EF4-FFF2-40B4-BE49-F238E27FC236}">
+                <a16:creationId xmlns:a16="http://schemas.microsoft.com/office/drawing/2014/main" id="{2A1F3277-AFDA-AA4B-8124-69815847CA92}"/>
+              </a:ext>
+            </a:extLst>
+          </p:cNvPr>
+          <p:cNvPicPr>
+            <a:picLocks noChangeAspect="1"/>
+          </p:cNvPicPr>
+          <p:nvPr/>
+        </p:nvPicPr>
+        <p:blipFill>
+          <a:blip r:embed="rId4">
+            <a:duotone>
+              <a:prstClr val="black"/>
+              <a:srgbClr val="FF99CC">
+                <a:tint val="45000"/>
+                <a:satMod val="400000"/>
+              </a:srgbClr>
+            </a:duotone>
+            <a:extLst>
+              <a:ext uri="{28A0092B-C50C-407E-A947-70E740481C1C}">
+                <a14:useLocalDpi xmlns:a14="http://schemas.microsoft.com/office/drawing/2010/main" val="0"/>
+              </a:ext>
+            </a:extLst>
+          </a:blip>
+          <a:stretch>
+            <a:fillRect/>
+          </a:stretch>
+        </p:blipFill>
+        <p:spPr>
+          <a:xfrm>
+            <a:off x="6597486" y="2855329"/>
+            <a:ext cx="963338" cy="906671"/>
+          </a:xfrm>
+          <a:prstGeom prst="rect">
+            <a:avLst/>
+          </a:prstGeom>
+        </p:spPr>
+      </p:pic>
+      <p:pic>
+        <p:nvPicPr>
+          <p:cNvPr id="37" name="Picture 36">
+            <a:extLst>
+              <a:ext uri="{FF2B5EF4-FFF2-40B4-BE49-F238E27FC236}">
+                <a16:creationId xmlns:a16="http://schemas.microsoft.com/office/drawing/2014/main" id="{624FCACE-0561-D049-9851-447F012AFF0B}"/>
+              </a:ext>
+            </a:extLst>
+          </p:cNvPr>
+          <p:cNvPicPr>
+            <a:picLocks noChangeAspect="1"/>
+          </p:cNvPicPr>
+          <p:nvPr/>
+        </p:nvPicPr>
+        <p:blipFill>
+          <a:blip r:embed="rId4">
+            <a:duotone>
+              <a:prstClr val="black"/>
+              <a:srgbClr val="FFFF00">
+                <a:tint val="45000"/>
+                <a:satMod val="400000"/>
+              </a:srgbClr>
+            </a:duotone>
+            <a:extLst>
+              <a:ext uri="{28A0092B-C50C-407E-A947-70E740481C1C}">
+                <a14:useLocalDpi xmlns:a14="http://schemas.microsoft.com/office/drawing/2010/main" val="0"/>
+              </a:ext>
+            </a:extLst>
+          </a:blip>
+          <a:stretch>
+            <a:fillRect/>
+          </a:stretch>
+        </p:blipFill>
+        <p:spPr>
+          <a:xfrm>
+            <a:off x="2574997" y="2749501"/>
+            <a:ext cx="963338" cy="906671"/>
+          </a:xfrm>
+          <a:prstGeom prst="rect">
+            <a:avLst/>
+          </a:prstGeom>
+        </p:spPr>
+      </p:pic>
+      <p:pic>
+        <p:nvPicPr>
+          <p:cNvPr id="38" name="Picture 37">
+            <a:extLst>
+              <a:ext uri="{FF2B5EF4-FFF2-40B4-BE49-F238E27FC236}">
+                <a16:creationId xmlns:a16="http://schemas.microsoft.com/office/drawing/2014/main" id="{5ACB5B21-F32C-D94C-8BC0-5F67BDFF219B}"/>
+              </a:ext>
+            </a:extLst>
+          </p:cNvPr>
+          <p:cNvPicPr>
+            <a:picLocks noChangeAspect="1"/>
+          </p:cNvPicPr>
+          <p:nvPr/>
+        </p:nvPicPr>
+        <p:blipFill>
+          <a:blip r:embed="rId4">
+            <a:duotone>
+              <a:prstClr val="black"/>
+              <a:srgbClr val="FFFF00">
+                <a:tint val="45000"/>
+                <a:satMod val="400000"/>
+              </a:srgbClr>
+            </a:duotone>
+            <a:extLst>
+              <a:ext uri="{28A0092B-C50C-407E-A947-70E740481C1C}">
+                <a14:useLocalDpi xmlns:a14="http://schemas.microsoft.com/office/drawing/2010/main" val="0"/>
+              </a:ext>
+            </a:extLst>
+          </a:blip>
+          <a:stretch>
+            <a:fillRect/>
+          </a:stretch>
+        </p:blipFill>
+        <p:spPr>
+          <a:xfrm>
+            <a:off x="2574997" y="1653719"/>
+            <a:ext cx="963338" cy="906671"/>
+          </a:xfrm>
+          <a:prstGeom prst="rect">
+            <a:avLst/>
+          </a:prstGeom>
+        </p:spPr>
+      </p:pic>
+      <p:pic>
+        <p:nvPicPr>
+          <p:cNvPr id="39" name="Picture 38">
+            <a:extLst>
+              <a:ext uri="{FF2B5EF4-FFF2-40B4-BE49-F238E27FC236}">
+                <a16:creationId xmlns:a16="http://schemas.microsoft.com/office/drawing/2014/main" id="{7C9D97ED-D339-2D48-9963-170E2C47BE63}"/>
+              </a:ext>
+            </a:extLst>
+          </p:cNvPr>
+          <p:cNvPicPr>
+            <a:picLocks noChangeAspect="1"/>
+          </p:cNvPicPr>
+          <p:nvPr/>
+        </p:nvPicPr>
+        <p:blipFill>
+          <a:blip r:embed="rId4">
+            <a:duotone>
+              <a:prstClr val="black"/>
+              <a:srgbClr val="FFFF00">
+                <a:tint val="45000"/>
+                <a:satMod val="400000"/>
+              </a:srgbClr>
+            </a:duotone>
+            <a:extLst>
+              <a:ext uri="{28A0092B-C50C-407E-A947-70E740481C1C}">
+                <a14:useLocalDpi xmlns:a14="http://schemas.microsoft.com/office/drawing/2010/main" val="0"/>
+              </a:ext>
+            </a:extLst>
+          </a:blip>
+          <a:stretch>
+            <a:fillRect/>
+          </a:stretch>
+        </p:blipFill>
+        <p:spPr>
+          <a:xfrm>
+            <a:off x="2574997" y="3843767"/>
+            <a:ext cx="963338" cy="906671"/>
+          </a:xfrm>
+          <a:prstGeom prst="rect">
+            <a:avLst/>
+          </a:prstGeom>
+        </p:spPr>
+      </p:pic>
+      <p:pic>
+        <p:nvPicPr>
+          <p:cNvPr id="40" name="Picture 39">
+            <a:extLst>
+              <a:ext uri="{FF2B5EF4-FFF2-40B4-BE49-F238E27FC236}">
+                <a16:creationId xmlns:a16="http://schemas.microsoft.com/office/drawing/2014/main" id="{8FD9A4D7-25CA-CA44-9497-F8E36EBA2BEA}"/>
+              </a:ext>
+            </a:extLst>
+          </p:cNvPr>
+          <p:cNvPicPr>
+            <a:picLocks noChangeAspect="1"/>
+          </p:cNvPicPr>
+          <p:nvPr/>
+        </p:nvPicPr>
+        <p:blipFill>
+          <a:blip r:embed="rId3">
+            <a:duotone>
+              <a:prstClr val="black"/>
+              <a:srgbClr val="FF99CC">
+                <a:tint val="45000"/>
+                <a:satMod val="400000"/>
+              </a:srgbClr>
+            </a:duotone>
+            <a:extLst>
+              <a:ext uri="{28A0092B-C50C-407E-A947-70E740481C1C}">
+                <a14:useLocalDpi xmlns:a14="http://schemas.microsoft.com/office/drawing/2010/main" val="0"/>
+              </a:ext>
+            </a:extLst>
+          </a:blip>
+          <a:stretch>
+            <a:fillRect/>
+          </a:stretch>
+        </p:blipFill>
+        <p:spPr>
+          <a:xfrm>
+            <a:off x="7859514" y="1542494"/>
+            <a:ext cx="579596" cy="1038557"/>
+          </a:xfrm>
+          <a:prstGeom prst="rect">
+            <a:avLst/>
+          </a:prstGeom>
+        </p:spPr>
+      </p:pic>
+      <p:pic>
+        <p:nvPicPr>
+          <p:cNvPr id="61" name="Picture 60">
+            <a:extLst>
+              <a:ext uri="{FF2B5EF4-FFF2-40B4-BE49-F238E27FC236}">
+                <a16:creationId xmlns:a16="http://schemas.microsoft.com/office/drawing/2014/main" id="{02C3B3AB-773D-814F-AAEA-9FAF2D1CA066}"/>
+              </a:ext>
+            </a:extLst>
+          </p:cNvPr>
+          <p:cNvPicPr>
+            <a:picLocks noChangeAspect="1"/>
+          </p:cNvPicPr>
+          <p:nvPr/>
+        </p:nvPicPr>
+        <p:blipFill>
+          <a:blip r:embed="rId3">
+            <a:duotone>
+              <a:prstClr val="black"/>
+              <a:srgbClr val="FF99CC">
+                <a:tint val="45000"/>
+                <a:satMod val="400000"/>
+              </a:srgbClr>
+            </a:duotone>
+            <a:extLst>
+              <a:ext uri="{28A0092B-C50C-407E-A947-70E740481C1C}">
+                <a14:useLocalDpi xmlns:a14="http://schemas.microsoft.com/office/drawing/2010/main" val="0"/>
+              </a:ext>
+            </a:extLst>
+          </a:blip>
+          <a:stretch>
+            <a:fillRect/>
+          </a:stretch>
+        </p:blipFill>
+        <p:spPr>
+          <a:xfrm>
+            <a:off x="7859514" y="3819147"/>
+            <a:ext cx="579596" cy="1038557"/>
+          </a:xfrm>
+          <a:prstGeom prst="rect">
+            <a:avLst/>
+          </a:prstGeom>
+        </p:spPr>
+      </p:pic>
+      <p:pic>
+        <p:nvPicPr>
+          <p:cNvPr id="62" name="Picture 61">
+            <a:extLst>
+              <a:ext uri="{FF2B5EF4-FFF2-40B4-BE49-F238E27FC236}">
+                <a16:creationId xmlns:a16="http://schemas.microsoft.com/office/drawing/2014/main" id="{CD134E95-487D-6F48-8030-A867D8192C7D}"/>
+              </a:ext>
+            </a:extLst>
+          </p:cNvPr>
+          <p:cNvPicPr>
+            <a:picLocks noChangeAspect="1"/>
+          </p:cNvPicPr>
+          <p:nvPr/>
+        </p:nvPicPr>
+        <p:blipFill>
+          <a:blip r:embed="rId3">
+            <a:duotone>
+              <a:prstClr val="black"/>
+              <a:srgbClr val="FF99CC">
+                <a:tint val="45000"/>
+                <a:satMod val="400000"/>
+              </a:srgbClr>
+            </a:duotone>
+            <a:extLst>
+              <a:ext uri="{28A0092B-C50C-407E-A947-70E740481C1C}">
+                <a14:useLocalDpi xmlns:a14="http://schemas.microsoft.com/office/drawing/2010/main" val="0"/>
+              </a:ext>
+            </a:extLst>
+          </a:blip>
+          <a:stretch>
+            <a:fillRect/>
+          </a:stretch>
+        </p:blipFill>
+        <p:spPr>
+          <a:xfrm>
+            <a:off x="8885169" y="1542494"/>
+            <a:ext cx="579596" cy="1038557"/>
+          </a:xfrm>
+          <a:prstGeom prst="rect">
+            <a:avLst/>
+          </a:prstGeom>
+        </p:spPr>
+      </p:pic>
+      <p:pic>
+        <p:nvPicPr>
+          <p:cNvPr id="63" name="Picture 62">
+            <a:extLst>
+              <a:ext uri="{FF2B5EF4-FFF2-40B4-BE49-F238E27FC236}">
+                <a16:creationId xmlns:a16="http://schemas.microsoft.com/office/drawing/2014/main" id="{A5FC5810-4C66-984E-ACD8-AF7E669E8D80}"/>
+              </a:ext>
+            </a:extLst>
+          </p:cNvPr>
+          <p:cNvPicPr>
+            <a:picLocks noChangeAspect="1"/>
+          </p:cNvPicPr>
+          <p:nvPr/>
+        </p:nvPicPr>
+        <p:blipFill>
+          <a:blip r:embed="rId3">
+            <a:duotone>
+              <a:prstClr val="black"/>
+              <a:srgbClr val="FF99CC">
+                <a:tint val="45000"/>
+                <a:satMod val="400000"/>
+              </a:srgbClr>
+            </a:duotone>
+            <a:extLst>
+              <a:ext uri="{28A0092B-C50C-407E-A947-70E740481C1C}">
+                <a14:useLocalDpi xmlns:a14="http://schemas.microsoft.com/office/drawing/2010/main" val="0"/>
+              </a:ext>
+            </a:extLst>
+          </a:blip>
+          <a:stretch>
+            <a:fillRect/>
+          </a:stretch>
+        </p:blipFill>
+        <p:spPr>
+          <a:xfrm>
+            <a:off x="8885169" y="3819147"/>
+            <a:ext cx="579596" cy="1038557"/>
+          </a:xfrm>
+          <a:prstGeom prst="rect">
+            <a:avLst/>
+          </a:prstGeom>
+        </p:spPr>
+      </p:pic>
+      <p:pic>
+        <p:nvPicPr>
+          <p:cNvPr id="64" name="Picture 63">
+            <a:extLst>
+              <a:ext uri="{FF2B5EF4-FFF2-40B4-BE49-F238E27FC236}">
+                <a16:creationId xmlns:a16="http://schemas.microsoft.com/office/drawing/2014/main" id="{A135A972-31F0-A044-9F3D-03F701161535}"/>
+              </a:ext>
+            </a:extLst>
+          </p:cNvPr>
+          <p:cNvPicPr>
+            <a:picLocks noChangeAspect="1"/>
+          </p:cNvPicPr>
+          <p:nvPr/>
+        </p:nvPicPr>
+        <p:blipFill>
+          <a:blip r:embed="rId3">
+            <a:duotone>
+              <a:prstClr val="black"/>
+              <a:srgbClr val="FF99CC">
+                <a:tint val="45000"/>
+                <a:satMod val="400000"/>
+              </a:srgbClr>
+            </a:duotone>
+            <a:extLst>
+              <a:ext uri="{28A0092B-C50C-407E-A947-70E740481C1C}">
+                <a14:useLocalDpi xmlns:a14="http://schemas.microsoft.com/office/drawing/2010/main" val="0"/>
+              </a:ext>
+            </a:extLst>
+          </a:blip>
+          <a:stretch>
+            <a:fillRect/>
+          </a:stretch>
+        </p:blipFill>
+        <p:spPr>
+          <a:xfrm>
+            <a:off x="6799029" y="1521833"/>
+            <a:ext cx="579596" cy="1038557"/>
+          </a:xfrm>
+          <a:prstGeom prst="rect">
+            <a:avLst/>
+          </a:prstGeom>
+        </p:spPr>
+      </p:pic>
+      <p:pic>
+        <p:nvPicPr>
+          <p:cNvPr id="65" name="Picture 64">
+            <a:extLst>
+              <a:ext uri="{FF2B5EF4-FFF2-40B4-BE49-F238E27FC236}">
+                <a16:creationId xmlns:a16="http://schemas.microsoft.com/office/drawing/2014/main" id="{6C02EA87-A872-7348-8F14-366B54DB0EF6}"/>
+              </a:ext>
+            </a:extLst>
+          </p:cNvPr>
+          <p:cNvPicPr>
+            <a:picLocks noChangeAspect="1"/>
+          </p:cNvPicPr>
+          <p:nvPr/>
+        </p:nvPicPr>
+        <p:blipFill>
+          <a:blip r:embed="rId3">
+            <a:duotone>
+              <a:prstClr val="black"/>
+              <a:srgbClr val="FF99CC">
+                <a:tint val="45000"/>
+                <a:satMod val="400000"/>
+              </a:srgbClr>
+            </a:duotone>
+            <a:extLst>
+              <a:ext uri="{28A0092B-C50C-407E-A947-70E740481C1C}">
+                <a14:useLocalDpi xmlns:a14="http://schemas.microsoft.com/office/drawing/2010/main" val="0"/>
+              </a:ext>
+            </a:extLst>
+          </a:blip>
+          <a:stretch>
+            <a:fillRect/>
+          </a:stretch>
+        </p:blipFill>
+        <p:spPr>
+          <a:xfrm>
+            <a:off x="6799029" y="3798486"/>
+            <a:ext cx="579596" cy="1038557"/>
+          </a:xfrm>
+          <a:prstGeom prst="rect">
+            <a:avLst/>
+          </a:prstGeom>
+        </p:spPr>
+      </p:pic>
+    </p:spTree>
+    <p:extLst>
+      <p:ext uri="{BB962C8B-B14F-4D97-AF65-F5344CB8AC3E}">
+        <p14:creationId xmlns:p14="http://schemas.microsoft.com/office/powerpoint/2010/main" val="1788501027"/>
+      </p:ext>
+    </p:extLst>
+  </p:cSld>
+  <p:clrMapOvr>
+    <a:masterClrMapping/>
+  </p:clrMapOvr>
+</p:sld>
+</file>
+
+<file path=ppt/slides/slide56.xml><?xml version="1.0" encoding="utf-8"?>
+<p:sld xmlns:a="http://schemas.openxmlformats.org/drawingml/2006/main" xmlns:r="http://schemas.openxmlformats.org/officeDocument/2006/relationships" xmlns:p="http://schemas.openxmlformats.org/presentationml/2006/main">
+  <p:cSld>
+    <p:spTree>
+      <p:nvGrpSpPr>
+        <p:cNvPr id="1" name=""/>
+        <p:cNvGrpSpPr/>
+        <p:nvPr/>
+      </p:nvGrpSpPr>
+      <p:grpSpPr>
+        <a:xfrm>
+          <a:off x="0" y="0"/>
+          <a:ext cx="0" cy="0"/>
+          <a:chOff x="0" y="0"/>
+          <a:chExt cx="0" cy="0"/>
+        </a:xfrm>
+      </p:grpSpPr>
+      <p:sp>
+        <p:nvSpPr>
+          <p:cNvPr id="34" name="TextBox 33"/>
+          <p:cNvSpPr txBox="1"/>
+          <p:nvPr/>
+        </p:nvSpPr>
+        <p:spPr>
+          <a:xfrm>
+            <a:off x="-1" y="0"/>
+            <a:ext cx="6188529" cy="523220"/>
+          </a:xfrm>
+          <a:prstGeom prst="rect">
+            <a:avLst/>
+          </a:prstGeom>
+          <a:noFill/>
+        </p:spPr>
+        <p:txBody>
+          <a:bodyPr wrap="square" rtlCol="0">
+            <a:spAutoFit/>
+          </a:bodyPr>
+          <a:lstStyle/>
+          <a:p>
+            <a:r>
+              <a:rPr lang="en-GB" sz="2800" dirty="0"/>
+              <a:t>Guesser Training 4 – none ambiguous</a:t>
+            </a:r>
+          </a:p>
+        </p:txBody>
+      </p:sp>
+      <p:sp>
+        <p:nvSpPr>
+          <p:cNvPr id="41" name="TextBox 40">
+            <a:extLst>
+              <a:ext uri="{FF2B5EF4-FFF2-40B4-BE49-F238E27FC236}">
+                <a16:creationId xmlns:a16="http://schemas.microsoft.com/office/drawing/2014/main" id="{ACA4C32D-846A-5640-99D6-B15DA7393D6B}"/>
+              </a:ext>
+            </a:extLst>
+          </p:cNvPr>
+          <p:cNvSpPr txBox="1"/>
+          <p:nvPr/>
+        </p:nvSpPr>
+        <p:spPr>
+          <a:xfrm>
+            <a:off x="492369" y="5891322"/>
+            <a:ext cx="11230708" cy="523220"/>
+          </a:xfrm>
+          <a:prstGeom prst="rect">
+            <a:avLst/>
+          </a:prstGeom>
+          <a:noFill/>
+        </p:spPr>
+        <p:txBody>
+          <a:bodyPr wrap="square" rtlCol="0">
+            <a:spAutoFit/>
+          </a:bodyPr>
+          <a:lstStyle/>
+          <a:p>
+            <a:r>
+              <a:rPr lang="en-GB" sz="2800" dirty="0"/>
+              <a:t>The green card is the card where none of the objects are pink. </a:t>
+            </a:r>
+          </a:p>
+        </p:txBody>
+      </p:sp>
+      <p:sp>
+        <p:nvSpPr>
+          <p:cNvPr id="32" name="Rectangle 31">
+            <a:extLst>
+              <a:ext uri="{FF2B5EF4-FFF2-40B4-BE49-F238E27FC236}">
+                <a16:creationId xmlns:a16="http://schemas.microsoft.com/office/drawing/2014/main" id="{9FFDBD2C-96C6-9741-A123-C7CDAB356DB1}"/>
+              </a:ext>
+            </a:extLst>
+          </p:cNvPr>
+          <p:cNvSpPr>
+            <a:spLocks/>
+          </p:cNvSpPr>
+          <p:nvPr/>
+        </p:nvSpPr>
+        <p:spPr>
+          <a:xfrm>
+            <a:off x="2115147" y="1408383"/>
+            <a:ext cx="3600000" cy="3600000"/>
+          </a:xfrm>
+          <a:prstGeom prst="rect">
+            <a:avLst/>
+          </a:prstGeom>
+          <a:noFill/>
+          <a:ln w="190500">
+            <a:solidFill>
+              <a:schemeClr val="tx1">
+                <a:lumMod val="85000"/>
+                <a:lumOff val="15000"/>
+              </a:schemeClr>
+            </a:solidFill>
+          </a:ln>
+        </p:spPr>
+        <p:style>
+          <a:lnRef idx="2">
+            <a:schemeClr val="accent1">
+              <a:shade val="50000"/>
+            </a:schemeClr>
+          </a:lnRef>
+          <a:fillRef idx="1">
+            <a:schemeClr val="accent1"/>
+          </a:fillRef>
+          <a:effectRef idx="0">
+            <a:schemeClr val="accent1"/>
+          </a:effectRef>
+          <a:fontRef idx="minor">
+            <a:schemeClr val="lt1"/>
+          </a:fontRef>
+        </p:style>
+        <p:txBody>
+          <a:bodyPr rtlCol="0" anchor="ctr"/>
+          <a:lstStyle/>
+          <a:p>
+            <a:pPr algn="ctr"/>
+            <a:endParaRPr lang="en-GB"/>
+          </a:p>
+        </p:txBody>
+      </p:sp>
+      <p:sp>
+        <p:nvSpPr>
+          <p:cNvPr id="42" name="Rectangle 41">
+            <a:extLst>
+              <a:ext uri="{FF2B5EF4-FFF2-40B4-BE49-F238E27FC236}">
+                <a16:creationId xmlns:a16="http://schemas.microsoft.com/office/drawing/2014/main" id="{722541D6-67B5-BE4B-8DC4-0E6D9695090A}"/>
+              </a:ext>
+            </a:extLst>
+          </p:cNvPr>
+          <p:cNvSpPr>
+            <a:spLocks/>
+          </p:cNvSpPr>
+          <p:nvPr/>
+        </p:nvSpPr>
+        <p:spPr>
+          <a:xfrm>
+            <a:off x="6243680" y="1406158"/>
+            <a:ext cx="3600000" cy="3600000"/>
+          </a:xfrm>
+          <a:prstGeom prst="rect">
+            <a:avLst/>
+          </a:prstGeom>
+          <a:noFill/>
+          <a:ln w="190500">
+            <a:solidFill>
+              <a:schemeClr val="tx1">
+                <a:lumMod val="85000"/>
+                <a:lumOff val="15000"/>
+              </a:schemeClr>
+            </a:solidFill>
+          </a:ln>
+        </p:spPr>
+        <p:style>
+          <a:lnRef idx="2">
+            <a:schemeClr val="accent1">
+              <a:shade val="50000"/>
+            </a:schemeClr>
+          </a:lnRef>
+          <a:fillRef idx="1">
+            <a:schemeClr val="accent1"/>
+          </a:fillRef>
+          <a:effectRef idx="0">
+            <a:schemeClr val="accent1"/>
+          </a:effectRef>
+          <a:fontRef idx="minor">
+            <a:schemeClr val="lt1"/>
+          </a:fontRef>
+        </p:style>
+        <p:txBody>
+          <a:bodyPr rtlCol="0" anchor="ctr"/>
+          <a:lstStyle/>
+          <a:p>
+            <a:pPr algn="ctr"/>
+            <a:endParaRPr lang="en-GB" dirty="0">
+              <a:solidFill>
+                <a:schemeClr val="bg2">
+                  <a:lumMod val="75000"/>
+                </a:schemeClr>
+              </a:solidFill>
+              <a:latin typeface="Arial" panose="020B0604020202020204" pitchFamily="34" charset="0"/>
+              <a:cs typeface="Arial" panose="020B0604020202020204" pitchFamily="34" charset="0"/>
+            </a:endParaRPr>
+          </a:p>
+        </p:txBody>
+      </p:sp>
+      <p:pic>
+        <p:nvPicPr>
+          <p:cNvPr id="43" name="Picture 42">
+            <a:extLst>
+              <a:ext uri="{FF2B5EF4-FFF2-40B4-BE49-F238E27FC236}">
+                <a16:creationId xmlns:a16="http://schemas.microsoft.com/office/drawing/2014/main" id="{0529B86B-3D25-0C4C-8FD8-C9F8E53867CE}"/>
+              </a:ext>
+            </a:extLst>
+          </p:cNvPr>
+          <p:cNvPicPr>
+            <a:picLocks noChangeAspect="1"/>
+          </p:cNvPicPr>
+          <p:nvPr/>
+        </p:nvPicPr>
+        <p:blipFill>
+          <a:blip r:embed="rId3" cstate="print">
+            <a:duotone>
+              <a:prstClr val="black"/>
+              <a:srgbClr val="FFFF00">
+                <a:tint val="45000"/>
+                <a:satMod val="400000"/>
+              </a:srgbClr>
+            </a:duotone>
+            <a:extLst>
+              <a:ext uri="{28A0092B-C50C-407E-A947-70E740481C1C}">
+                <a14:useLocalDpi xmlns:a14="http://schemas.microsoft.com/office/drawing/2010/main" val="0"/>
+              </a:ext>
+            </a:extLst>
+          </a:blip>
+          <a:stretch>
+            <a:fillRect/>
+          </a:stretch>
+        </p:blipFill>
+        <p:spPr>
+          <a:xfrm>
+            <a:off x="3322502" y="4006611"/>
+            <a:ext cx="1166465" cy="612386"/>
+          </a:xfrm>
+          <a:prstGeom prst="rect">
+            <a:avLst/>
+          </a:prstGeom>
+        </p:spPr>
+      </p:pic>
+      <p:pic>
+        <p:nvPicPr>
+          <p:cNvPr id="44" name="Picture 43">
+            <a:extLst>
+              <a:ext uri="{FF2B5EF4-FFF2-40B4-BE49-F238E27FC236}">
+                <a16:creationId xmlns:a16="http://schemas.microsoft.com/office/drawing/2014/main" id="{A701CCC2-5EB0-BF45-8CD8-DF0A199EBFFE}"/>
+              </a:ext>
+            </a:extLst>
+          </p:cNvPr>
+          <p:cNvPicPr>
+            <a:picLocks noChangeAspect="1"/>
+          </p:cNvPicPr>
+          <p:nvPr/>
+        </p:nvPicPr>
+        <p:blipFill>
+          <a:blip r:embed="rId3" cstate="print">
+            <a:duotone>
+              <a:prstClr val="black"/>
+              <a:srgbClr val="FFFF00">
+                <a:tint val="45000"/>
+                <a:satMod val="400000"/>
+              </a:srgbClr>
+            </a:duotone>
+            <a:extLst>
+              <a:ext uri="{28A0092B-C50C-407E-A947-70E740481C1C}">
+                <a14:useLocalDpi xmlns:a14="http://schemas.microsoft.com/office/drawing/2010/main" val="0"/>
+              </a:ext>
+            </a:extLst>
+          </a:blip>
+          <a:stretch>
+            <a:fillRect/>
+          </a:stretch>
+        </p:blipFill>
+        <p:spPr>
+          <a:xfrm>
+            <a:off x="2208289" y="4006611"/>
+            <a:ext cx="1166465" cy="612386"/>
+          </a:xfrm>
+          <a:prstGeom prst="rect">
+            <a:avLst/>
+          </a:prstGeom>
+        </p:spPr>
+      </p:pic>
+      <p:pic>
+        <p:nvPicPr>
+          <p:cNvPr id="45" name="Picture 44">
+            <a:extLst>
+              <a:ext uri="{FF2B5EF4-FFF2-40B4-BE49-F238E27FC236}">
+                <a16:creationId xmlns:a16="http://schemas.microsoft.com/office/drawing/2014/main" id="{B39F8657-75C7-5542-99F5-6AE378EA96D4}"/>
+              </a:ext>
+            </a:extLst>
+          </p:cNvPr>
+          <p:cNvPicPr>
+            <a:picLocks noChangeAspect="1"/>
+          </p:cNvPicPr>
+          <p:nvPr/>
+        </p:nvPicPr>
+        <p:blipFill>
+          <a:blip r:embed="rId3" cstate="print">
+            <a:duotone>
+              <a:prstClr val="black"/>
+              <a:srgbClr val="FFFF00">
+                <a:tint val="45000"/>
+                <a:satMod val="400000"/>
+              </a:srgbClr>
+            </a:duotone>
+            <a:extLst>
+              <a:ext uri="{28A0092B-C50C-407E-A947-70E740481C1C}">
+                <a14:useLocalDpi xmlns:a14="http://schemas.microsoft.com/office/drawing/2010/main" val="0"/>
+              </a:ext>
+            </a:extLst>
+          </a:blip>
+          <a:stretch>
+            <a:fillRect/>
+          </a:stretch>
+        </p:blipFill>
+        <p:spPr>
+          <a:xfrm>
+            <a:off x="4436715" y="4006611"/>
+            <a:ext cx="1166465" cy="612386"/>
+          </a:xfrm>
+          <a:prstGeom prst="rect">
+            <a:avLst/>
+          </a:prstGeom>
+        </p:spPr>
+      </p:pic>
+      <p:pic>
+        <p:nvPicPr>
+          <p:cNvPr id="46" name="Picture 45">
+            <a:extLst>
+              <a:ext uri="{FF2B5EF4-FFF2-40B4-BE49-F238E27FC236}">
+                <a16:creationId xmlns:a16="http://schemas.microsoft.com/office/drawing/2014/main" id="{0F1801C2-11B5-6A44-9A9B-15963659DF27}"/>
+              </a:ext>
+            </a:extLst>
+          </p:cNvPr>
+          <p:cNvPicPr>
+            <a:picLocks noChangeAspect="1"/>
+          </p:cNvPicPr>
+          <p:nvPr/>
+        </p:nvPicPr>
+        <p:blipFill>
+          <a:blip r:embed="rId3" cstate="print">
+            <a:duotone>
+              <a:prstClr val="black"/>
+              <a:srgbClr val="FFFF00">
+                <a:tint val="45000"/>
+                <a:satMod val="400000"/>
+              </a:srgbClr>
+            </a:duotone>
+            <a:extLst>
+              <a:ext uri="{28A0092B-C50C-407E-A947-70E740481C1C}">
+                <a14:useLocalDpi xmlns:a14="http://schemas.microsoft.com/office/drawing/2010/main" val="0"/>
+              </a:ext>
+            </a:extLst>
+          </a:blip>
+          <a:stretch>
+            <a:fillRect/>
+          </a:stretch>
+        </p:blipFill>
+        <p:spPr>
+          <a:xfrm>
+            <a:off x="3374754" y="2938382"/>
+            <a:ext cx="1166465" cy="612386"/>
+          </a:xfrm>
+          <a:prstGeom prst="rect">
+            <a:avLst/>
+          </a:prstGeom>
+        </p:spPr>
+      </p:pic>
+      <p:pic>
+        <p:nvPicPr>
+          <p:cNvPr id="47" name="Picture 46">
+            <a:extLst>
+              <a:ext uri="{FF2B5EF4-FFF2-40B4-BE49-F238E27FC236}">
+                <a16:creationId xmlns:a16="http://schemas.microsoft.com/office/drawing/2014/main" id="{CF83EFD9-0F5E-934A-8F2D-1AE7C960C66C}"/>
+              </a:ext>
+            </a:extLst>
+          </p:cNvPr>
+          <p:cNvPicPr>
+            <a:picLocks noChangeAspect="1"/>
+          </p:cNvPicPr>
+          <p:nvPr/>
+        </p:nvPicPr>
+        <p:blipFill>
+          <a:blip r:embed="rId3" cstate="print">
+            <a:duotone>
+              <a:prstClr val="black"/>
+              <a:srgbClr val="FF99CC">
+                <a:tint val="45000"/>
+                <a:satMod val="400000"/>
+              </a:srgbClr>
+            </a:duotone>
+            <a:extLst>
+              <a:ext uri="{28A0092B-C50C-407E-A947-70E740481C1C}">
+                <a14:useLocalDpi xmlns:a14="http://schemas.microsoft.com/office/drawing/2010/main" val="0"/>
+              </a:ext>
+            </a:extLst>
+          </a:blip>
+          <a:stretch>
+            <a:fillRect/>
+          </a:stretch>
+        </p:blipFill>
+        <p:spPr>
+          <a:xfrm>
+            <a:off x="2260541" y="2938382"/>
+            <a:ext cx="1166465" cy="612386"/>
+          </a:xfrm>
+          <a:prstGeom prst="rect">
+            <a:avLst/>
+          </a:prstGeom>
+        </p:spPr>
+      </p:pic>
+      <p:pic>
+        <p:nvPicPr>
+          <p:cNvPr id="48" name="Picture 47">
+            <a:extLst>
+              <a:ext uri="{FF2B5EF4-FFF2-40B4-BE49-F238E27FC236}">
+                <a16:creationId xmlns:a16="http://schemas.microsoft.com/office/drawing/2014/main" id="{11306861-AC87-D34E-81DB-2666C3A17155}"/>
+              </a:ext>
+            </a:extLst>
+          </p:cNvPr>
+          <p:cNvPicPr>
+            <a:picLocks noChangeAspect="1"/>
+          </p:cNvPicPr>
+          <p:nvPr/>
+        </p:nvPicPr>
+        <p:blipFill>
+          <a:blip r:embed="rId3" cstate="print">
+            <a:duotone>
+              <a:prstClr val="black"/>
+              <a:srgbClr val="FFFF00">
+                <a:tint val="45000"/>
+                <a:satMod val="400000"/>
+              </a:srgbClr>
+            </a:duotone>
+            <a:extLst>
+              <a:ext uri="{28A0092B-C50C-407E-A947-70E740481C1C}">
+                <a14:useLocalDpi xmlns:a14="http://schemas.microsoft.com/office/drawing/2010/main" val="0"/>
+              </a:ext>
+            </a:extLst>
+          </a:blip>
+          <a:stretch>
+            <a:fillRect/>
+          </a:stretch>
+        </p:blipFill>
+        <p:spPr>
+          <a:xfrm>
+            <a:off x="4488967" y="2938382"/>
+            <a:ext cx="1166465" cy="612386"/>
+          </a:xfrm>
+          <a:prstGeom prst="rect">
+            <a:avLst/>
+          </a:prstGeom>
+        </p:spPr>
+      </p:pic>
+      <p:pic>
+        <p:nvPicPr>
+          <p:cNvPr id="49" name="Picture 48">
+            <a:extLst>
+              <a:ext uri="{FF2B5EF4-FFF2-40B4-BE49-F238E27FC236}">
+                <a16:creationId xmlns:a16="http://schemas.microsoft.com/office/drawing/2014/main" id="{C19371E9-CF56-0F45-852A-3044D7A49822}"/>
+              </a:ext>
+            </a:extLst>
+          </p:cNvPr>
+          <p:cNvPicPr>
+            <a:picLocks noChangeAspect="1"/>
+          </p:cNvPicPr>
+          <p:nvPr/>
+        </p:nvPicPr>
+        <p:blipFill>
+          <a:blip r:embed="rId3" cstate="print">
+            <a:duotone>
+              <a:prstClr val="black"/>
+              <a:srgbClr val="FF99CC">
+                <a:tint val="45000"/>
+                <a:satMod val="400000"/>
+              </a:srgbClr>
+            </a:duotone>
+            <a:extLst>
+              <a:ext uri="{28A0092B-C50C-407E-A947-70E740481C1C}">
+                <a14:useLocalDpi xmlns:a14="http://schemas.microsoft.com/office/drawing/2010/main" val="0"/>
+              </a:ext>
+            </a:extLst>
+          </a:blip>
+          <a:stretch>
+            <a:fillRect/>
+          </a:stretch>
+        </p:blipFill>
+        <p:spPr>
+          <a:xfrm>
+            <a:off x="3322502" y="1864226"/>
+            <a:ext cx="1166465" cy="612386"/>
+          </a:xfrm>
+          <a:prstGeom prst="rect">
+            <a:avLst/>
+          </a:prstGeom>
+        </p:spPr>
+      </p:pic>
+      <p:pic>
+        <p:nvPicPr>
+          <p:cNvPr id="50" name="Picture 49">
+            <a:extLst>
+              <a:ext uri="{FF2B5EF4-FFF2-40B4-BE49-F238E27FC236}">
+                <a16:creationId xmlns:a16="http://schemas.microsoft.com/office/drawing/2014/main" id="{C847A2AF-C6F9-634D-9284-B0759ABC8215}"/>
+              </a:ext>
+            </a:extLst>
+          </p:cNvPr>
+          <p:cNvPicPr>
+            <a:picLocks noChangeAspect="1"/>
+          </p:cNvPicPr>
+          <p:nvPr/>
+        </p:nvPicPr>
+        <p:blipFill>
+          <a:blip r:embed="rId3" cstate="print">
+            <a:duotone>
+              <a:prstClr val="black"/>
+              <a:srgbClr val="FF99CC">
+                <a:tint val="45000"/>
+                <a:satMod val="400000"/>
+              </a:srgbClr>
+            </a:duotone>
+            <a:extLst>
+              <a:ext uri="{28A0092B-C50C-407E-A947-70E740481C1C}">
+                <a14:useLocalDpi xmlns:a14="http://schemas.microsoft.com/office/drawing/2010/main" val="0"/>
+              </a:ext>
+            </a:extLst>
+          </a:blip>
+          <a:stretch>
+            <a:fillRect/>
+          </a:stretch>
+        </p:blipFill>
+        <p:spPr>
+          <a:xfrm>
+            <a:off x="2208289" y="1864226"/>
+            <a:ext cx="1166465" cy="612386"/>
+          </a:xfrm>
+          <a:prstGeom prst="rect">
+            <a:avLst/>
+          </a:prstGeom>
+        </p:spPr>
+      </p:pic>
+      <p:pic>
+        <p:nvPicPr>
+          <p:cNvPr id="51" name="Picture 50">
+            <a:extLst>
+              <a:ext uri="{FF2B5EF4-FFF2-40B4-BE49-F238E27FC236}">
+                <a16:creationId xmlns:a16="http://schemas.microsoft.com/office/drawing/2014/main" id="{5BAAD532-CD02-034B-A8BD-A77D2007B063}"/>
+              </a:ext>
+            </a:extLst>
+          </p:cNvPr>
+          <p:cNvPicPr>
+            <a:picLocks noChangeAspect="1"/>
+          </p:cNvPicPr>
+          <p:nvPr/>
+        </p:nvPicPr>
+        <p:blipFill>
+          <a:blip r:embed="rId3" cstate="print">
+            <a:duotone>
+              <a:prstClr val="black"/>
+              <a:srgbClr val="FF99CC">
+                <a:tint val="45000"/>
+                <a:satMod val="400000"/>
+              </a:srgbClr>
+            </a:duotone>
+            <a:extLst>
+              <a:ext uri="{28A0092B-C50C-407E-A947-70E740481C1C}">
+                <a14:useLocalDpi xmlns:a14="http://schemas.microsoft.com/office/drawing/2010/main" val="0"/>
+              </a:ext>
+            </a:extLst>
+          </a:blip>
+          <a:stretch>
+            <a:fillRect/>
+          </a:stretch>
+        </p:blipFill>
+        <p:spPr>
+          <a:xfrm>
+            <a:off x="4436715" y="1864226"/>
+            <a:ext cx="1166465" cy="612386"/>
+          </a:xfrm>
+          <a:prstGeom prst="rect">
+            <a:avLst/>
+          </a:prstGeom>
+        </p:spPr>
+      </p:pic>
+      <p:pic>
+        <p:nvPicPr>
+          <p:cNvPr id="52" name="Picture 51">
+            <a:extLst>
+              <a:ext uri="{FF2B5EF4-FFF2-40B4-BE49-F238E27FC236}">
+                <a16:creationId xmlns:a16="http://schemas.microsoft.com/office/drawing/2014/main" id="{DCD8726A-5705-B94F-96AF-0A0E9EF14BAE}"/>
+              </a:ext>
+            </a:extLst>
+          </p:cNvPr>
+          <p:cNvPicPr>
+            <a:picLocks noChangeAspect="1"/>
+          </p:cNvPicPr>
+          <p:nvPr/>
+        </p:nvPicPr>
+        <p:blipFill>
+          <a:blip r:embed="rId4" cstate="print">
+            <a:duotone>
+              <a:prstClr val="black"/>
+              <a:srgbClr val="FF99CC">
+                <a:tint val="45000"/>
+                <a:satMod val="400000"/>
+              </a:srgbClr>
+            </a:duotone>
+            <a:extLst>
+              <a:ext uri="{28A0092B-C50C-407E-A947-70E740481C1C}">
+                <a14:useLocalDpi xmlns:a14="http://schemas.microsoft.com/office/drawing/2010/main" val="0"/>
+              </a:ext>
+            </a:extLst>
+          </a:blip>
+          <a:stretch>
+            <a:fillRect/>
+          </a:stretch>
+        </p:blipFill>
+        <p:spPr>
+          <a:xfrm>
+            <a:off x="7632717" y="2691149"/>
+            <a:ext cx="838860" cy="1034468"/>
+          </a:xfrm>
+          <a:prstGeom prst="rect">
+            <a:avLst/>
+          </a:prstGeom>
+        </p:spPr>
+      </p:pic>
+      <p:pic>
+        <p:nvPicPr>
+          <p:cNvPr id="53" name="Picture 52">
+            <a:extLst>
+              <a:ext uri="{FF2B5EF4-FFF2-40B4-BE49-F238E27FC236}">
+                <a16:creationId xmlns:a16="http://schemas.microsoft.com/office/drawing/2014/main" id="{61C75551-6E70-0844-B43A-0F1BE84C50D9}"/>
+              </a:ext>
+            </a:extLst>
+          </p:cNvPr>
+          <p:cNvPicPr>
+            <a:picLocks noChangeAspect="1"/>
+          </p:cNvPicPr>
+          <p:nvPr/>
+        </p:nvPicPr>
+        <p:blipFill>
+          <a:blip r:embed="rId4" cstate="print">
+            <a:duotone>
+              <a:prstClr val="black"/>
+              <a:srgbClr val="FF99CC">
+                <a:tint val="45000"/>
+                <a:satMod val="400000"/>
+              </a:srgbClr>
+            </a:duotone>
+            <a:extLst>
+              <a:ext uri="{28A0092B-C50C-407E-A947-70E740481C1C}">
+                <a14:useLocalDpi xmlns:a14="http://schemas.microsoft.com/office/drawing/2010/main" val="0"/>
+              </a:ext>
+            </a:extLst>
+          </a:blip>
+          <a:stretch>
+            <a:fillRect/>
+          </a:stretch>
+        </p:blipFill>
+        <p:spPr>
+          <a:xfrm>
+            <a:off x="7632717" y="1609560"/>
+            <a:ext cx="838860" cy="1034468"/>
+          </a:xfrm>
+          <a:prstGeom prst="rect">
+            <a:avLst/>
+          </a:prstGeom>
+        </p:spPr>
+      </p:pic>
+      <p:pic>
+        <p:nvPicPr>
+          <p:cNvPr id="54" name="Picture 53">
+            <a:extLst>
+              <a:ext uri="{FF2B5EF4-FFF2-40B4-BE49-F238E27FC236}">
+                <a16:creationId xmlns:a16="http://schemas.microsoft.com/office/drawing/2014/main" id="{A768E4E1-1616-3B4C-AFDC-9DDBF75C044F}"/>
+              </a:ext>
+            </a:extLst>
+          </p:cNvPr>
+          <p:cNvPicPr>
+            <a:picLocks noChangeAspect="1"/>
+          </p:cNvPicPr>
+          <p:nvPr/>
+        </p:nvPicPr>
+        <p:blipFill>
+          <a:blip r:embed="rId4" cstate="print">
+            <a:duotone>
+              <a:prstClr val="black"/>
+              <a:srgbClr val="FF99CC">
+                <a:tint val="45000"/>
+                <a:satMod val="400000"/>
+              </a:srgbClr>
+            </a:duotone>
+            <a:extLst>
+              <a:ext uri="{28A0092B-C50C-407E-A947-70E740481C1C}">
+                <a14:useLocalDpi xmlns:a14="http://schemas.microsoft.com/office/drawing/2010/main" val="0"/>
+              </a:ext>
+            </a:extLst>
+          </a:blip>
+          <a:stretch>
+            <a:fillRect/>
+          </a:stretch>
+        </p:blipFill>
+        <p:spPr>
+          <a:xfrm>
+            <a:off x="7632717" y="3772738"/>
+            <a:ext cx="838860" cy="1034468"/>
+          </a:xfrm>
+          <a:prstGeom prst="rect">
+            <a:avLst/>
+          </a:prstGeom>
+        </p:spPr>
+      </p:pic>
+      <p:pic>
+        <p:nvPicPr>
+          <p:cNvPr id="55" name="Picture 54">
+            <a:extLst>
+              <a:ext uri="{FF2B5EF4-FFF2-40B4-BE49-F238E27FC236}">
+                <a16:creationId xmlns:a16="http://schemas.microsoft.com/office/drawing/2014/main" id="{79EC6C1B-1A9D-B542-813A-664D462DC383}"/>
+              </a:ext>
+            </a:extLst>
+          </p:cNvPr>
+          <p:cNvPicPr>
+            <a:picLocks noChangeAspect="1"/>
+          </p:cNvPicPr>
+          <p:nvPr/>
+        </p:nvPicPr>
+        <p:blipFill>
+          <a:blip r:embed="rId4" cstate="print">
+            <a:duotone>
+              <a:prstClr val="black"/>
+              <a:srgbClr val="FFFF00">
+                <a:tint val="45000"/>
+                <a:satMod val="400000"/>
+              </a:srgbClr>
+            </a:duotone>
+            <a:extLst>
+              <a:ext uri="{28A0092B-C50C-407E-A947-70E740481C1C}">
+                <a14:useLocalDpi xmlns:a14="http://schemas.microsoft.com/office/drawing/2010/main" val="0"/>
+              </a:ext>
+            </a:extLst>
+          </a:blip>
+          <a:stretch>
+            <a:fillRect/>
+          </a:stretch>
+        </p:blipFill>
+        <p:spPr>
+          <a:xfrm>
+            <a:off x="8742432" y="2691149"/>
+            <a:ext cx="838860" cy="1034468"/>
+          </a:xfrm>
+          <a:prstGeom prst="rect">
+            <a:avLst/>
+          </a:prstGeom>
+        </p:spPr>
+      </p:pic>
+      <p:pic>
+        <p:nvPicPr>
+          <p:cNvPr id="56" name="Picture 55">
+            <a:extLst>
+              <a:ext uri="{FF2B5EF4-FFF2-40B4-BE49-F238E27FC236}">
+                <a16:creationId xmlns:a16="http://schemas.microsoft.com/office/drawing/2014/main" id="{FA79DBEF-B68D-274F-B134-3F7FD363103F}"/>
+              </a:ext>
+            </a:extLst>
+          </p:cNvPr>
+          <p:cNvPicPr>
+            <a:picLocks noChangeAspect="1"/>
+          </p:cNvPicPr>
+          <p:nvPr/>
+        </p:nvPicPr>
+        <p:blipFill>
+          <a:blip r:embed="rId4" cstate="print">
+            <a:duotone>
+              <a:prstClr val="black"/>
+              <a:srgbClr val="FFFF00">
+                <a:tint val="45000"/>
+                <a:satMod val="400000"/>
+              </a:srgbClr>
+            </a:duotone>
+            <a:extLst>
+              <a:ext uri="{28A0092B-C50C-407E-A947-70E740481C1C}">
+                <a14:useLocalDpi xmlns:a14="http://schemas.microsoft.com/office/drawing/2010/main" val="0"/>
+              </a:ext>
+            </a:extLst>
+          </a:blip>
+          <a:stretch>
+            <a:fillRect/>
+          </a:stretch>
+        </p:blipFill>
+        <p:spPr>
+          <a:xfrm>
+            <a:off x="8742432" y="1609560"/>
+            <a:ext cx="838860" cy="1034468"/>
+          </a:xfrm>
+          <a:prstGeom prst="rect">
+            <a:avLst/>
+          </a:prstGeom>
+        </p:spPr>
+      </p:pic>
+      <p:pic>
+        <p:nvPicPr>
+          <p:cNvPr id="57" name="Picture 56">
+            <a:extLst>
+              <a:ext uri="{FF2B5EF4-FFF2-40B4-BE49-F238E27FC236}">
+                <a16:creationId xmlns:a16="http://schemas.microsoft.com/office/drawing/2014/main" id="{82661E9F-886C-0646-AFD7-83EF2A90F02B}"/>
+              </a:ext>
+            </a:extLst>
+          </p:cNvPr>
+          <p:cNvPicPr>
+            <a:picLocks noChangeAspect="1"/>
+          </p:cNvPicPr>
+          <p:nvPr/>
+        </p:nvPicPr>
+        <p:blipFill>
+          <a:blip r:embed="rId4" cstate="print">
+            <a:duotone>
+              <a:prstClr val="black"/>
+              <a:srgbClr val="FFFF00">
+                <a:tint val="45000"/>
+                <a:satMod val="400000"/>
+              </a:srgbClr>
+            </a:duotone>
+            <a:extLst>
+              <a:ext uri="{28A0092B-C50C-407E-A947-70E740481C1C}">
+                <a14:useLocalDpi xmlns:a14="http://schemas.microsoft.com/office/drawing/2010/main" val="0"/>
+              </a:ext>
+            </a:extLst>
+          </a:blip>
+          <a:stretch>
+            <a:fillRect/>
+          </a:stretch>
+        </p:blipFill>
+        <p:spPr>
+          <a:xfrm>
+            <a:off x="8742432" y="3772738"/>
+            <a:ext cx="838860" cy="1034468"/>
+          </a:xfrm>
+          <a:prstGeom prst="rect">
+            <a:avLst/>
+          </a:prstGeom>
+        </p:spPr>
+      </p:pic>
+      <p:pic>
+        <p:nvPicPr>
+          <p:cNvPr id="58" name="Picture 57">
+            <a:extLst>
+              <a:ext uri="{FF2B5EF4-FFF2-40B4-BE49-F238E27FC236}">
+                <a16:creationId xmlns:a16="http://schemas.microsoft.com/office/drawing/2014/main" id="{61D48A41-217E-644F-9061-68D6F92481E9}"/>
+              </a:ext>
+            </a:extLst>
+          </p:cNvPr>
+          <p:cNvPicPr>
+            <a:picLocks noChangeAspect="1"/>
+          </p:cNvPicPr>
+          <p:nvPr/>
+        </p:nvPicPr>
+        <p:blipFill>
+          <a:blip r:embed="rId4" cstate="print">
+            <a:duotone>
+              <a:prstClr val="black"/>
+              <a:srgbClr val="FFFF00">
+                <a:tint val="45000"/>
+                <a:satMod val="400000"/>
+              </a:srgbClr>
+            </a:duotone>
+            <a:extLst>
+              <a:ext uri="{28A0092B-C50C-407E-A947-70E740481C1C}">
+                <a14:useLocalDpi xmlns:a14="http://schemas.microsoft.com/office/drawing/2010/main" val="0"/>
+              </a:ext>
+            </a:extLst>
+          </a:blip>
+          <a:stretch>
+            <a:fillRect/>
+          </a:stretch>
+        </p:blipFill>
+        <p:spPr>
+          <a:xfrm>
+            <a:off x="6523002" y="2691149"/>
+            <a:ext cx="838860" cy="1034468"/>
+          </a:xfrm>
+          <a:prstGeom prst="rect">
+            <a:avLst/>
+          </a:prstGeom>
+        </p:spPr>
+      </p:pic>
+      <p:pic>
+        <p:nvPicPr>
+          <p:cNvPr id="59" name="Picture 58">
+            <a:extLst>
+              <a:ext uri="{FF2B5EF4-FFF2-40B4-BE49-F238E27FC236}">
+                <a16:creationId xmlns:a16="http://schemas.microsoft.com/office/drawing/2014/main" id="{794F8F2C-EB7D-C247-99A7-73DFDE6DF8E7}"/>
+              </a:ext>
+            </a:extLst>
+          </p:cNvPr>
+          <p:cNvPicPr>
+            <a:picLocks noChangeAspect="1"/>
+          </p:cNvPicPr>
+          <p:nvPr/>
+        </p:nvPicPr>
+        <p:blipFill>
+          <a:blip r:embed="rId4" cstate="print">
+            <a:duotone>
+              <a:prstClr val="black"/>
+              <a:srgbClr val="FF99CC">
+                <a:tint val="45000"/>
+                <a:satMod val="400000"/>
+              </a:srgbClr>
+            </a:duotone>
+            <a:extLst>
+              <a:ext uri="{28A0092B-C50C-407E-A947-70E740481C1C}">
+                <a14:useLocalDpi xmlns:a14="http://schemas.microsoft.com/office/drawing/2010/main" val="0"/>
+              </a:ext>
+            </a:extLst>
+          </a:blip>
+          <a:stretch>
+            <a:fillRect/>
+          </a:stretch>
+        </p:blipFill>
+        <p:spPr>
+          <a:xfrm>
+            <a:off x="6523002" y="1609560"/>
+            <a:ext cx="838860" cy="1034468"/>
+          </a:xfrm>
+          <a:prstGeom prst="rect">
+            <a:avLst/>
+          </a:prstGeom>
+        </p:spPr>
+      </p:pic>
+      <p:pic>
+        <p:nvPicPr>
+          <p:cNvPr id="60" name="Picture 59">
+            <a:extLst>
+              <a:ext uri="{FF2B5EF4-FFF2-40B4-BE49-F238E27FC236}">
+                <a16:creationId xmlns:a16="http://schemas.microsoft.com/office/drawing/2014/main" id="{5F761D64-C844-044B-A3C6-747C9DF34094}"/>
+              </a:ext>
+            </a:extLst>
+          </p:cNvPr>
+          <p:cNvPicPr>
+            <a:picLocks noChangeAspect="1"/>
+          </p:cNvPicPr>
+          <p:nvPr/>
+        </p:nvPicPr>
+        <p:blipFill>
+          <a:blip r:embed="rId4" cstate="print">
+            <a:duotone>
+              <a:prstClr val="black"/>
+              <a:srgbClr val="FFFF00">
+                <a:tint val="45000"/>
+                <a:satMod val="400000"/>
+              </a:srgbClr>
+            </a:duotone>
+            <a:extLst>
+              <a:ext uri="{28A0092B-C50C-407E-A947-70E740481C1C}">
+                <a14:useLocalDpi xmlns:a14="http://schemas.microsoft.com/office/drawing/2010/main" val="0"/>
+              </a:ext>
+            </a:extLst>
+          </a:blip>
+          <a:stretch>
+            <a:fillRect/>
+          </a:stretch>
+        </p:blipFill>
+        <p:spPr>
+          <a:xfrm>
+            <a:off x="6523002" y="3772738"/>
+            <a:ext cx="838860" cy="1034468"/>
+          </a:xfrm>
+          <a:prstGeom prst="rect">
+            <a:avLst/>
+          </a:prstGeom>
+        </p:spPr>
+      </p:pic>
+    </p:spTree>
+    <p:extLst>
+      <p:ext uri="{BB962C8B-B14F-4D97-AF65-F5344CB8AC3E}">
+        <p14:creationId xmlns:p14="http://schemas.microsoft.com/office/powerpoint/2010/main" val="2493921179"/>
+      </p:ext>
+    </p:extLst>
+  </p:cSld>
+  <p:clrMapOvr>
+    <a:masterClrMapping/>
+  </p:clrMapOvr>
+</p:sld>
+</file>
+
 <file path=ppt/slides/slide6.xml><?xml version="1.0" encoding="utf-8"?>
 <p:sld xmlns:a="http://schemas.openxmlformats.org/drawingml/2006/main" xmlns:r="http://schemas.openxmlformats.org/officeDocument/2006/relationships" xmlns:p="http://schemas.openxmlformats.org/presentationml/2006/main">
   <p:cSld>

</xml_diff>